<commit_message>
Update presentation with generator info
</commit_message>
<xml_diff>
--- a/presentation/pres.pptx
+++ b/presentation/pres.pptx
@@ -13,8 +13,9 @@
     <p:sldId id="260" r:id="rId7"/>
     <p:sldId id="262" r:id="rId8"/>
     <p:sldId id="263" r:id="rId9"/>
-    <p:sldId id="264" r:id="rId10"/>
-    <p:sldId id="265" r:id="rId11"/>
+    <p:sldId id="266" r:id="rId10"/>
+    <p:sldId id="264" r:id="rId11"/>
+    <p:sldId id="265" r:id="rId12"/>
   </p:sldIdLst>
   <p:sldSz cx="9144000" cy="6858000" type="screen4x3"/>
   <p:notesSz cx="6858000" cy="9144000"/>
@@ -3817,6 +3818,73 @@
           <a:p>
             <a:r>
               <a:rPr lang="en-US" dirty="0" smtClean="0"/>
+              <a:t>Results</a:t>
+            </a:r>
+            <a:endParaRPr lang="en-US" dirty="0"/>
+          </a:p>
+        </p:txBody>
+      </p:sp>
+      <p:sp>
+        <p:nvSpPr>
+          <p:cNvPr id="3" name="Content Placeholder 2"/>
+          <p:cNvSpPr>
+            <a:spLocks noGrp="1"/>
+          </p:cNvSpPr>
+          <p:nvPr>
+            <p:ph sz="quarter" idx="1"/>
+          </p:nvPr>
+        </p:nvSpPr>
+        <p:spPr/>
+        <p:txBody>
+          <a:bodyPr/>
+          <a:lstStyle/>
+          <a:p>
+            <a:endParaRPr lang="en-US" dirty="0"/>
+          </a:p>
+        </p:txBody>
+      </p:sp>
+    </p:spTree>
+  </p:cSld>
+  <p:clrMapOvr>
+    <a:masterClrMapping/>
+  </p:clrMapOvr>
+</p:sld>
+</file>
+
+<file path=ppt/slides/slide11.xml><?xml version="1.0" encoding="utf-8"?>
+<p:sld xmlns:a="http://schemas.openxmlformats.org/drawingml/2006/main" xmlns:r="http://schemas.openxmlformats.org/officeDocument/2006/relationships" xmlns:p="http://schemas.openxmlformats.org/presentationml/2006/main">
+  <p:cSld>
+    <p:spTree>
+      <p:nvGrpSpPr>
+        <p:cNvPr id="1" name=""/>
+        <p:cNvGrpSpPr/>
+        <p:nvPr/>
+      </p:nvGrpSpPr>
+      <p:grpSpPr>
+        <a:xfrm>
+          <a:off x="0" y="0"/>
+          <a:ext cx="0" cy="0"/>
+          <a:chOff x="0" y="0"/>
+          <a:chExt cx="0" cy="0"/>
+        </a:xfrm>
+      </p:grpSpPr>
+      <p:sp>
+        <p:nvSpPr>
+          <p:cNvPr id="2" name="Title 1"/>
+          <p:cNvSpPr>
+            <a:spLocks noGrp="1"/>
+          </p:cNvSpPr>
+          <p:nvPr>
+            <p:ph type="title"/>
+          </p:nvPr>
+        </p:nvSpPr>
+        <p:spPr/>
+        <p:txBody>
+          <a:bodyPr/>
+          <a:lstStyle/>
+          <a:p>
+            <a:r>
+              <a:rPr lang="en-US" dirty="0" smtClean="0"/>
               <a:t>Conclusion</a:t>
             </a:r>
             <a:endParaRPr lang="en-US" dirty="0"/>
@@ -3838,7 +3906,7 @@
           <a:bodyPr/>
           <a:lstStyle/>
           <a:p>
-            <a:endParaRPr lang="en-US"/>
+            <a:endParaRPr lang="en-US" dirty="0"/>
           </a:p>
         </p:txBody>
       </p:sp>
@@ -4081,7 +4149,56 @@
           <a:bodyPr/>
           <a:lstStyle/>
           <a:p>
+            <a:r>
+              <a:rPr lang="en-US" dirty="0" smtClean="0"/>
+              <a:t>Sequence defined by the formula for a line:</a:t>
+            </a:r>
+            <a:br>
+              <a:rPr lang="en-US" dirty="0" smtClean="0"/>
+            </a:br>
+            <a:r>
+              <a:rPr lang="en-US" dirty="0" smtClean="0"/>
+              <a:t>	</a:t>
+            </a:r>
+            <a:r>
+              <a:rPr lang="pt-BR" dirty="0" smtClean="0"/>
+              <a:t>X</a:t>
+            </a:r>
+            <a:r>
+              <a:rPr lang="pt-BR" baseline="-25000" dirty="0" smtClean="0"/>
+              <a:t>n+1</a:t>
+            </a:r>
+            <a:r>
+              <a:rPr lang="pt-BR" dirty="0" smtClean="0"/>
+              <a:t> = (aX</a:t>
+            </a:r>
+            <a:r>
+              <a:rPr lang="pt-BR" baseline="-25000" dirty="0" smtClean="0"/>
+              <a:t>n</a:t>
+            </a:r>
+            <a:r>
+              <a:rPr lang="pt-BR" dirty="0" smtClean="0"/>
+              <a:t> + c) mod m</a:t>
+            </a:r>
+          </a:p>
+          <a:p>
+            <a:r>
+              <a:rPr lang="en-US" dirty="0" smtClean="0"/>
+              <a:t>Popular parameter sets include MINSTD and RANDU</a:t>
+            </a:r>
             <a:endParaRPr lang="en-US" dirty="0"/>
+          </a:p>
+          <a:p>
+            <a:r>
+              <a:rPr lang="en-US" dirty="0" smtClean="0"/>
+              <a:t>Strengths: Lightweight, stores little state, fast and easy to compute</a:t>
+            </a:r>
+          </a:p>
+          <a:p>
+            <a:r>
+              <a:rPr lang="en-US" dirty="0" smtClean="0"/>
+              <a:t>Weaknesses: Short period, outputs are planar and have poor distribution</a:t>
+            </a:r>
           </a:p>
         </p:txBody>
       </p:sp>
@@ -4148,7 +4265,42 @@
           <a:bodyPr/>
           <a:lstStyle/>
           <a:p>
-            <a:endParaRPr lang="en-US"/>
+            <a:r>
+              <a:rPr lang="en-US" dirty="0" smtClean="0"/>
+              <a:t>In general, </a:t>
+            </a:r>
+            <a:r>
+              <a:rPr lang="en-US" dirty="0" smtClean="0"/>
+              <a:t>s</a:t>
+            </a:r>
+            <a:r>
+              <a:rPr lang="en-US" dirty="0" smtClean="0"/>
+              <a:t>equence produced by shifting and </a:t>
+            </a:r>
+            <a:r>
+              <a:rPr lang="en-US" dirty="0" err="1" smtClean="0"/>
+              <a:t>XORing</a:t>
+            </a:r>
+            <a:r>
+              <a:rPr lang="en-US" dirty="0" smtClean="0"/>
+              <a:t> together past values</a:t>
+            </a:r>
+          </a:p>
+          <a:p>
+            <a:endParaRPr lang="en-US" dirty="0" smtClean="0"/>
+          </a:p>
+          <a:p>
+            <a:r>
+              <a:rPr lang="en-US" dirty="0" smtClean="0"/>
+              <a:t>Strengths: Stores relatively little state, fast performance, good period to performance ratio, generally high quality outputs</a:t>
+            </a:r>
+          </a:p>
+          <a:p>
+            <a:r>
+              <a:rPr lang="en-US" dirty="0" smtClean="0"/>
+              <a:t>Weaknesses: Overall short period length</a:t>
+            </a:r>
+            <a:endParaRPr lang="en-US" dirty="0"/>
           </a:p>
         </p:txBody>
       </p:sp>
@@ -4215,7 +4367,87 @@
           <a:bodyPr/>
           <a:lstStyle/>
           <a:p>
-            <a:endParaRPr lang="en-US"/>
+            <a:r>
+              <a:rPr lang="pt-BR" dirty="0" smtClean="0"/>
+              <a:t>Has the general form:</a:t>
+            </a:r>
+            <a:br>
+              <a:rPr lang="pt-BR" dirty="0" smtClean="0"/>
+            </a:br>
+            <a:r>
+              <a:rPr lang="pt-BR" dirty="0" smtClean="0"/>
+              <a:t>	X</a:t>
+            </a:r>
+            <a:r>
+              <a:rPr lang="pt-BR" baseline="-25000" dirty="0" smtClean="0"/>
+              <a:t>n</a:t>
+            </a:r>
+            <a:r>
+              <a:rPr lang="pt-BR" dirty="0" smtClean="0"/>
+              <a:t> = </a:t>
+            </a:r>
+            <a:r>
+              <a:rPr lang="pt-BR" dirty="0" smtClean="0"/>
+              <a:t>(</a:t>
+            </a:r>
+            <a:r>
+              <a:rPr lang="pt-BR" dirty="0" smtClean="0"/>
+              <a:t>X</a:t>
+            </a:r>
+            <a:r>
+              <a:rPr lang="pt-BR" baseline="-25000" dirty="0" smtClean="0"/>
+              <a:t>n</a:t>
+            </a:r>
+            <a:r>
+              <a:rPr lang="pt-BR" baseline="-25000" dirty="0" smtClean="0"/>
+              <a:t>−r</a:t>
+            </a:r>
+            <a:r>
+              <a:rPr lang="pt-BR" dirty="0" smtClean="0"/>
+              <a:t> </a:t>
+            </a:r>
+            <a:r>
+              <a:rPr lang="pt-BR" dirty="0" smtClean="0"/>
+              <a:t>* X</a:t>
+            </a:r>
+            <a:r>
+              <a:rPr lang="pt-BR" baseline="-25000" dirty="0" smtClean="0"/>
+              <a:t>n</a:t>
+            </a:r>
+            <a:r>
+              <a:rPr lang="pt-BR" baseline="-25000" dirty="0" smtClean="0"/>
+              <a:t>−</a:t>
+            </a:r>
+            <a:r>
+              <a:rPr lang="pt-BR" baseline="-25000" dirty="0" smtClean="0"/>
+              <a:t>s</a:t>
+            </a:r>
+            <a:r>
+              <a:rPr lang="pt-BR" dirty="0" smtClean="0"/>
+              <a:t>) mod m, 0 &lt; s &lt; r</a:t>
+            </a:r>
+          </a:p>
+          <a:p>
+            <a:r>
+              <a:rPr lang="en-US" dirty="0" smtClean="0"/>
+              <a:t>Strengths</a:t>
+            </a:r>
+            <a:r>
+              <a:rPr lang="en-US" dirty="0" smtClean="0"/>
+              <a:t>: Generally fast performance, flexible</a:t>
+            </a:r>
+            <a:endParaRPr lang="en-US" dirty="0" smtClean="0"/>
+          </a:p>
+          <a:p>
+            <a:r>
+              <a:rPr lang="en-US" dirty="0" smtClean="0"/>
+              <a:t>Weaknesses</a:t>
+            </a:r>
+            <a:r>
+              <a:rPr lang="en-US" dirty="0" smtClean="0"/>
+              <a:t>: Stores a sizeable amount of state, output quality highly dependent on seeding method and parameter selection</a:t>
+            </a:r>
+            <a:endParaRPr lang="en-US" dirty="0" smtClean="0"/>
           </a:p>
         </p:txBody>
       </p:sp>
@@ -4282,7 +4514,146 @@
           <a:bodyPr/>
           <a:lstStyle/>
           <a:p>
-            <a:endParaRPr lang="en-US"/>
+            <a:r>
+              <a:rPr lang="pt-BR" dirty="0" smtClean="0"/>
+              <a:t>Has the general form:</a:t>
+            </a:r>
+            <a:br>
+              <a:rPr lang="pt-BR" dirty="0" smtClean="0"/>
+            </a:br>
+            <a:r>
+              <a:rPr lang="pt-BR" dirty="0" smtClean="0"/>
+              <a:t>	X</a:t>
+            </a:r>
+            <a:r>
+              <a:rPr lang="pt-BR" baseline="-25000" dirty="0" smtClean="0"/>
+              <a:t>n+1</a:t>
+            </a:r>
+            <a:r>
+              <a:rPr lang="pt-BR" dirty="0" smtClean="0"/>
+              <a:t> </a:t>
+            </a:r>
+            <a:r>
+              <a:rPr lang="pt-BR" dirty="0" smtClean="0"/>
+              <a:t>= (</a:t>
+            </a:r>
+            <a:r>
+              <a:rPr lang="pt-BR" dirty="0" smtClean="0"/>
+              <a:t>aX</a:t>
+            </a:r>
+            <a:r>
+              <a:rPr lang="pt-BR" baseline="-25000" dirty="0" smtClean="0"/>
+              <a:t>n</a:t>
+            </a:r>
+            <a:r>
+              <a:rPr lang="pt-BR" baseline="-25000" dirty="0" smtClean="0"/>
+              <a:t>−r</a:t>
+            </a:r>
+            <a:r>
+              <a:rPr lang="pt-BR" dirty="0" smtClean="0"/>
+              <a:t> + </a:t>
+            </a:r>
+            <a:r>
+              <a:rPr lang="pt-BR" dirty="0" smtClean="0"/>
+              <a:t>c</a:t>
+            </a:r>
+            <a:r>
+              <a:rPr lang="pt-BR" baseline="-25000" dirty="0" smtClean="0"/>
+              <a:t>n</a:t>
+            </a:r>
+            <a:r>
+              <a:rPr lang="pt-BR" dirty="0" smtClean="0"/>
+              <a:t>) </a:t>
+            </a:r>
+            <a:r>
+              <a:rPr lang="pt-BR" dirty="0" smtClean="0"/>
+              <a:t>mod </a:t>
+            </a:r>
+            <a:r>
+              <a:rPr lang="pt-BR" dirty="0" smtClean="0"/>
+              <a:t>m</a:t>
+            </a:r>
+          </a:p>
+          <a:p>
+            <a:r>
+              <a:rPr lang="pt-BR" dirty="0" smtClean="0"/>
+              <a:t>In practice, Complementary Multiply with Carry is used:</a:t>
+            </a:r>
+            <a:r>
+              <a:rPr lang="pt-BR" dirty="0" smtClean="0"/>
+              <a:t/>
+            </a:r>
+            <a:br>
+              <a:rPr lang="pt-BR" dirty="0" smtClean="0"/>
+            </a:br>
+            <a:r>
+              <a:rPr lang="pt-BR" dirty="0" smtClean="0"/>
+              <a:t>	X</a:t>
+            </a:r>
+            <a:r>
+              <a:rPr lang="pt-BR" baseline="-25000" dirty="0" smtClean="0"/>
+              <a:t>n+1</a:t>
+            </a:r>
+            <a:r>
+              <a:rPr lang="pt-BR" dirty="0" smtClean="0"/>
+              <a:t> = </a:t>
+            </a:r>
+            <a:r>
+              <a:rPr lang="pt-BR" dirty="0" smtClean="0"/>
+              <a:t>(b - 1) - (aX</a:t>
+            </a:r>
+            <a:r>
+              <a:rPr lang="pt-BR" baseline="-25000" dirty="0" smtClean="0"/>
+              <a:t>n</a:t>
+            </a:r>
+            <a:r>
+              <a:rPr lang="pt-BR" baseline="-25000" dirty="0" smtClean="0"/>
+              <a:t>−r</a:t>
+            </a:r>
+            <a:r>
+              <a:rPr lang="pt-BR" dirty="0" smtClean="0"/>
+              <a:t> + c</a:t>
+            </a:r>
+            <a:r>
+              <a:rPr lang="pt-BR" baseline="-25000" dirty="0" smtClean="0"/>
+              <a:t>n</a:t>
+            </a:r>
+            <a:r>
+              <a:rPr lang="pt-BR" dirty="0" smtClean="0"/>
+              <a:t>) mod </a:t>
+            </a:r>
+            <a:r>
+              <a:rPr lang="pt-BR" dirty="0" smtClean="0"/>
+              <a:t>m</a:t>
+            </a:r>
+          </a:p>
+          <a:p>
+            <a:r>
+              <a:rPr lang="en-US" dirty="0" smtClean="0"/>
+              <a:t>Strengths</a:t>
+            </a:r>
+            <a:r>
+              <a:rPr lang="en-US" dirty="0" smtClean="0"/>
+              <a:t>: Very long period, relatively fast, high quality outputs</a:t>
+            </a:r>
+            <a:endParaRPr lang="en-US" dirty="0" smtClean="0"/>
+          </a:p>
+          <a:p>
+            <a:r>
+              <a:rPr lang="en-US" dirty="0" smtClean="0"/>
+              <a:t>Weaknesses</a:t>
+            </a:r>
+            <a:r>
+              <a:rPr lang="en-US" dirty="0" smtClean="0"/>
+              <a:t>: Stores a fair amount of state, difficult to seed</a:t>
+            </a:r>
+            <a:endParaRPr lang="en-US" dirty="0" smtClean="0"/>
+          </a:p>
+          <a:p>
+            <a:endParaRPr lang="pt-BR" dirty="0" smtClean="0"/>
+          </a:p>
+          <a:p>
+            <a:endParaRPr lang="en-US" dirty="0"/>
           </a:p>
         </p:txBody>
       </p:sp>
@@ -4350,13 +4721,368 @@
         </p:nvSpPr>
         <p:spPr/>
         <p:txBody>
-          <a:bodyPr/>
+          <a:bodyPr>
+            <a:normAutofit/>
+          </a:bodyPr>
+          <a:lstStyle/>
+          <a:p>
+            <a:r>
+              <a:rPr lang="en-US" dirty="0" smtClean="0"/>
+              <a:t>Underlying state sequence has form:</a:t>
+            </a:r>
+            <a:br>
+              <a:rPr lang="en-US" dirty="0" smtClean="0"/>
+            </a:br>
+            <a:r>
+              <a:rPr lang="en-US" dirty="0" smtClean="0"/>
+              <a:t>	</a:t>
+            </a:r>
+            <a:r>
+              <a:rPr lang="pl-PL" dirty="0" smtClean="0"/>
+              <a:t>X</a:t>
+            </a:r>
+            <a:r>
+              <a:rPr lang="pl-PL" baseline="-25000" dirty="0" smtClean="0"/>
+              <a:t>k+n</a:t>
+            </a:r>
+            <a:r>
+              <a:rPr lang="pl-PL" dirty="0" smtClean="0"/>
+              <a:t> = X</a:t>
+            </a:r>
+            <a:r>
+              <a:rPr lang="pl-PL" baseline="-25000" dirty="0" smtClean="0"/>
+              <a:t>k+m</a:t>
+            </a:r>
+            <a:r>
+              <a:rPr lang="pl-PL" dirty="0" smtClean="0"/>
+              <a:t> ⊕</a:t>
+            </a:r>
+            <a:r>
+              <a:rPr lang="en-US" dirty="0" smtClean="0"/>
+              <a:t>(</a:t>
+            </a:r>
+            <a:r>
+              <a:rPr lang="en-US" dirty="0" err="1" smtClean="0"/>
+              <a:t>X</a:t>
+            </a:r>
+            <a:r>
+              <a:rPr lang="en-US" baseline="30000" dirty="0" err="1" smtClean="0"/>
+              <a:t>u</a:t>
+            </a:r>
+            <a:r>
+              <a:rPr lang="en-US" baseline="-25000" dirty="0" err="1" smtClean="0"/>
+              <a:t>k</a:t>
+            </a:r>
+            <a:r>
+              <a:rPr lang="en-US" dirty="0" smtClean="0"/>
+              <a:t> | X</a:t>
+            </a:r>
+            <a:r>
+              <a:rPr lang="en-US" baseline="30000" dirty="0" smtClean="0"/>
+              <a:t>l</a:t>
+            </a:r>
+            <a:r>
+              <a:rPr lang="en-US" baseline="-25000" dirty="0" smtClean="0"/>
+              <a:t>k+1</a:t>
+            </a:r>
+            <a:r>
+              <a:rPr lang="en-US" dirty="0" smtClean="0"/>
+              <a:t>)A</a:t>
+            </a:r>
+          </a:p>
+          <a:p>
+            <a:r>
+              <a:rPr lang="en-US" dirty="0" smtClean="0"/>
+              <a:t>Results produced by a tempering function on the state:</a:t>
+            </a:r>
+            <a:br>
+              <a:rPr lang="en-US" dirty="0" smtClean="0"/>
+            </a:br>
+            <a:r>
+              <a:rPr lang="en-US" sz="2000" dirty="0" smtClean="0"/>
+              <a:t>	</a:t>
+            </a:r>
+            <a:r>
+              <a:rPr lang="es-ES" sz="2000" dirty="0" smtClean="0"/>
+              <a:t>y := x ⊕ (x &gt;&gt; u</a:t>
+            </a:r>
+            <a:r>
+              <a:rPr lang="es-ES" sz="2000" dirty="0" smtClean="0"/>
+              <a:t>)</a:t>
+            </a:r>
+            <a:br>
+              <a:rPr lang="es-ES" sz="2000" dirty="0" smtClean="0"/>
+            </a:br>
+            <a:r>
+              <a:rPr lang="es-ES" sz="2000" dirty="0" smtClean="0"/>
+              <a:t>	</a:t>
+            </a:r>
+            <a:r>
+              <a:rPr lang="es-ES" sz="2000" dirty="0" smtClean="0"/>
+              <a:t>y := y ⊕ ((y &lt;&lt; s) · b</a:t>
+            </a:r>
+            <a:r>
+              <a:rPr lang="es-ES" sz="2000" dirty="0" smtClean="0"/>
+              <a:t>)</a:t>
+            </a:r>
+            <a:br>
+              <a:rPr lang="es-ES" sz="2000" dirty="0" smtClean="0"/>
+            </a:br>
+            <a:r>
+              <a:rPr lang="es-ES" sz="2000" dirty="0" smtClean="0"/>
+              <a:t>	y </a:t>
+            </a:r>
+            <a:r>
+              <a:rPr lang="es-ES" sz="2000" dirty="0" smtClean="0"/>
+              <a:t>:= y ⊕ ((y &lt;&lt; t) · c</a:t>
+            </a:r>
+            <a:r>
+              <a:rPr lang="es-ES" sz="2000" dirty="0" smtClean="0"/>
+              <a:t>)</a:t>
+            </a:r>
+            <a:br>
+              <a:rPr lang="es-ES" sz="2000" dirty="0" smtClean="0"/>
+            </a:br>
+            <a:r>
+              <a:rPr lang="es-ES" sz="2000" dirty="0" smtClean="0"/>
+              <a:t>	</a:t>
+            </a:r>
+            <a:r>
+              <a:rPr lang="es-ES" sz="2000" dirty="0" smtClean="0"/>
+              <a:t>y := y ⊕ (y &gt;&gt; l) </a:t>
+            </a:r>
+            <a:endParaRPr lang="pl-PL" sz="2000" dirty="0" smtClean="0"/>
+          </a:p>
+          <a:p>
+            <a:endParaRPr lang="es-ES" dirty="0" smtClean="0"/>
+          </a:p>
+        </p:txBody>
+      </p:sp>
+      <p:sp>
+        <p:nvSpPr>
+          <p:cNvPr id="3074" name="Rectangle 2"/>
+          <p:cNvSpPr>
+            <a:spLocks noChangeArrowheads="1"/>
+          </p:cNvSpPr>
+          <p:nvPr/>
+        </p:nvSpPr>
+        <p:spPr bwMode="auto">
+          <a:xfrm>
+            <a:off x="0" y="0"/>
+            <a:ext cx="9144000" cy="457200"/>
+          </a:xfrm>
+          <a:prstGeom prst="rect">
+            <a:avLst/>
+          </a:prstGeom>
+          <a:noFill/>
+          <a:ln w="9525">
+            <a:noFill/>
+            <a:miter lim="800000"/>
+            <a:headEnd/>
+            <a:tailEnd/>
+          </a:ln>
+          <a:effectLst/>
+        </p:spPr>
+        <p:txBody>
+          <a:bodyPr vert="horz" wrap="none" lIns="91440" tIns="45720" rIns="91440" bIns="45720" numCol="1" anchor="ctr" anchorCtr="0" compatLnSpc="1">
+            <a:prstTxWarp prst="textNoShape">
+              <a:avLst/>
+            </a:prstTxWarp>
+            <a:spAutoFit/>
+          </a:bodyPr>
           <a:lstStyle/>
           <a:p>
             <a:endParaRPr lang="en-US"/>
           </a:p>
         </p:txBody>
       </p:sp>
+      <p:pic>
+        <p:nvPicPr>
+          <p:cNvPr id="3073" name="Picture 1"/>
+          <p:cNvPicPr>
+            <a:picLocks noChangeAspect="1" noChangeArrowheads="1"/>
+          </p:cNvPicPr>
+          <p:nvPr/>
+        </p:nvPicPr>
+        <p:blipFill>
+          <a:blip r:embed="rId2">
+            <a:clrChange>
+              <a:clrFrom>
+                <a:srgbClr val="FFFFFF"/>
+              </a:clrFrom>
+              <a:clrTo>
+                <a:srgbClr val="FFFFFF">
+                  <a:alpha val="0"/>
+                </a:srgbClr>
+              </a:clrTo>
+            </a:clrChange>
+          </a:blip>
+          <a:srcRect/>
+          <a:stretch>
+            <a:fillRect/>
+          </a:stretch>
+        </p:blipFill>
+        <p:spPr bwMode="auto">
+          <a:xfrm>
+            <a:off x="0" y="457200"/>
+            <a:ext cx="171450" cy="190500"/>
+          </a:xfrm>
+          <a:prstGeom prst="rect">
+            <a:avLst/>
+          </a:prstGeom>
+          <a:noFill/>
+        </p:spPr>
+      </p:pic>
+      <p:sp>
+        <p:nvSpPr>
+          <p:cNvPr id="3076" name="Rectangle 4"/>
+          <p:cNvSpPr>
+            <a:spLocks noChangeArrowheads="1"/>
+          </p:cNvSpPr>
+          <p:nvPr/>
+        </p:nvSpPr>
+        <p:spPr bwMode="auto">
+          <a:xfrm>
+            <a:off x="0" y="0"/>
+            <a:ext cx="9144000" cy="457200"/>
+          </a:xfrm>
+          <a:prstGeom prst="rect">
+            <a:avLst/>
+          </a:prstGeom>
+          <a:noFill/>
+          <a:ln w="9525">
+            <a:noFill/>
+            <a:miter lim="800000"/>
+            <a:headEnd/>
+            <a:tailEnd/>
+          </a:ln>
+          <a:effectLst/>
+        </p:spPr>
+        <p:txBody>
+          <a:bodyPr vert="horz" wrap="none" lIns="91440" tIns="45720" rIns="91440" bIns="45720" numCol="1" anchor="ctr" anchorCtr="0" compatLnSpc="1">
+            <a:prstTxWarp prst="textNoShape">
+              <a:avLst/>
+            </a:prstTxWarp>
+            <a:spAutoFit/>
+          </a:bodyPr>
+          <a:lstStyle/>
+          <a:p>
+            <a:endParaRPr lang="en-US"/>
+          </a:p>
+        </p:txBody>
+      </p:sp>
+      <p:pic>
+        <p:nvPicPr>
+          <p:cNvPr id="3075" name="Picture 3"/>
+          <p:cNvPicPr>
+            <a:picLocks noChangeAspect="1" noChangeArrowheads="1"/>
+          </p:cNvPicPr>
+          <p:nvPr/>
+        </p:nvPicPr>
+        <p:blipFill>
+          <a:blip r:embed="rId2">
+            <a:clrChange>
+              <a:clrFrom>
+                <a:srgbClr val="FFFFFF"/>
+              </a:clrFrom>
+              <a:clrTo>
+                <a:srgbClr val="FFFFFF">
+                  <a:alpha val="0"/>
+                </a:srgbClr>
+              </a:clrTo>
+            </a:clrChange>
+          </a:blip>
+          <a:srcRect/>
+          <a:stretch>
+            <a:fillRect/>
+          </a:stretch>
+        </p:blipFill>
+        <p:spPr bwMode="auto">
+          <a:xfrm>
+            <a:off x="0" y="457200"/>
+            <a:ext cx="171450" cy="190500"/>
+          </a:xfrm>
+          <a:prstGeom prst="rect">
+            <a:avLst/>
+          </a:prstGeom>
+          <a:noFill/>
+        </p:spPr>
+      </p:pic>
+      <p:sp>
+        <p:nvSpPr>
+          <p:cNvPr id="3078" name="Rectangle 6"/>
+          <p:cNvSpPr>
+            <a:spLocks noChangeArrowheads="1"/>
+          </p:cNvSpPr>
+          <p:nvPr/>
+        </p:nvSpPr>
+        <p:spPr bwMode="auto">
+          <a:xfrm>
+            <a:off x="0" y="0"/>
+            <a:ext cx="9144000" cy="457200"/>
+          </a:xfrm>
+          <a:prstGeom prst="rect">
+            <a:avLst/>
+          </a:prstGeom>
+          <a:noFill/>
+          <a:ln w="9525">
+            <a:noFill/>
+            <a:miter lim="800000"/>
+            <a:headEnd/>
+            <a:tailEnd/>
+          </a:ln>
+          <a:effectLst/>
+        </p:spPr>
+        <p:txBody>
+          <a:bodyPr vert="horz" wrap="none" lIns="91440" tIns="45720" rIns="91440" bIns="45720" numCol="1" anchor="ctr" anchorCtr="0" compatLnSpc="1">
+            <a:prstTxWarp prst="textNoShape">
+              <a:avLst/>
+            </a:prstTxWarp>
+            <a:spAutoFit/>
+          </a:bodyPr>
+          <a:lstStyle/>
+          <a:p>
+            <a:endParaRPr lang="en-US"/>
+          </a:p>
+        </p:txBody>
+      </p:sp>
+      <p:pic>
+        <p:nvPicPr>
+          <p:cNvPr id="3077" name="Picture 5"/>
+          <p:cNvPicPr>
+            <a:picLocks noChangeAspect="1" noChangeArrowheads="1"/>
+          </p:cNvPicPr>
+          <p:nvPr/>
+        </p:nvPicPr>
+        <p:blipFill>
+          <a:blip r:embed="rId2">
+            <a:clrChange>
+              <a:clrFrom>
+                <a:srgbClr val="FFFFFF"/>
+              </a:clrFrom>
+              <a:clrTo>
+                <a:srgbClr val="FFFFFF">
+                  <a:alpha val="0"/>
+                </a:srgbClr>
+              </a:clrTo>
+            </a:clrChange>
+          </a:blip>
+          <a:srcRect/>
+          <a:stretch>
+            <a:fillRect/>
+          </a:stretch>
+        </p:blipFill>
+        <p:spPr bwMode="auto">
+          <a:xfrm>
+            <a:off x="0" y="457200"/>
+            <a:ext cx="171450" cy="190500"/>
+          </a:xfrm>
+          <a:prstGeom prst="rect">
+            <a:avLst/>
+          </a:prstGeom>
+          <a:noFill/>
+        </p:spPr>
+      </p:pic>
     </p:spTree>
   </p:cSld>
   <p:clrMapOvr>
@@ -4398,8 +5124,12 @@
           <a:lstStyle/>
           <a:p>
             <a:r>
+              <a:rPr lang="en-US" dirty="0" err="1" smtClean="0"/>
+              <a:t>Mersenne</a:t>
+            </a:r>
+            <a:r>
               <a:rPr lang="en-US" dirty="0" smtClean="0"/>
-              <a:t>Results</a:t>
+              <a:t> Twister</a:t>
             </a:r>
             <a:endParaRPr lang="en-US" dirty="0"/>
           </a:p>
@@ -4417,13 +5147,274 @@
         </p:nvSpPr>
         <p:spPr/>
         <p:txBody>
-          <a:bodyPr/>
-          <a:lstStyle/>
-          <a:p>
-            <a:endParaRPr lang="en-US" dirty="0"/>
-          </a:p>
-        </p:txBody>
-      </p:sp>
+          <a:bodyPr>
+            <a:normAutofit/>
+          </a:bodyPr>
+          <a:lstStyle/>
+          <a:p>
+            <a:r>
+              <a:rPr lang="en-US" dirty="0" smtClean="0"/>
+              <a:t>Strengths</a:t>
+            </a:r>
+            <a:r>
+              <a:rPr lang="en-US" dirty="0" smtClean="0"/>
+              <a:t>: Very large period, high quality </a:t>
+            </a:r>
+            <a:r>
+              <a:rPr lang="en-US" dirty="0" err="1" smtClean="0"/>
+              <a:t>equidistributed</a:t>
+            </a:r>
+            <a:r>
+              <a:rPr lang="en-US" dirty="0" smtClean="0"/>
+              <a:t> outputs</a:t>
+            </a:r>
+            <a:endParaRPr lang="en-US" dirty="0" smtClean="0"/>
+          </a:p>
+          <a:p>
+            <a:r>
+              <a:rPr lang="en-US" dirty="0" smtClean="0"/>
+              <a:t>Weaknesses</a:t>
+            </a:r>
+            <a:r>
+              <a:rPr lang="en-US" dirty="0" smtClean="0"/>
+              <a:t>: Complex and slow, requires a great deal of memory to store state</a:t>
+            </a:r>
+            <a:r>
+              <a:rPr lang="en-US" smtClean="0"/>
+              <a:t>, difficult to seed</a:t>
+            </a:r>
+            <a:endParaRPr lang="en-US" dirty="0" smtClean="0"/>
+          </a:p>
+          <a:p>
+            <a:endParaRPr lang="es-ES" dirty="0" smtClean="0"/>
+          </a:p>
+        </p:txBody>
+      </p:sp>
+      <p:sp>
+        <p:nvSpPr>
+          <p:cNvPr id="3074" name="Rectangle 2"/>
+          <p:cNvSpPr>
+            <a:spLocks noChangeArrowheads="1"/>
+          </p:cNvSpPr>
+          <p:nvPr/>
+        </p:nvSpPr>
+        <p:spPr bwMode="auto">
+          <a:xfrm>
+            <a:off x="0" y="0"/>
+            <a:ext cx="9144000" cy="457200"/>
+          </a:xfrm>
+          <a:prstGeom prst="rect">
+            <a:avLst/>
+          </a:prstGeom>
+          <a:noFill/>
+          <a:ln w="9525">
+            <a:noFill/>
+            <a:miter lim="800000"/>
+            <a:headEnd/>
+            <a:tailEnd/>
+          </a:ln>
+          <a:effectLst/>
+        </p:spPr>
+        <p:txBody>
+          <a:bodyPr vert="horz" wrap="none" lIns="91440" tIns="45720" rIns="91440" bIns="45720" numCol="1" anchor="ctr" anchorCtr="0" compatLnSpc="1">
+            <a:prstTxWarp prst="textNoShape">
+              <a:avLst/>
+            </a:prstTxWarp>
+            <a:spAutoFit/>
+          </a:bodyPr>
+          <a:lstStyle/>
+          <a:p>
+            <a:endParaRPr lang="en-US"/>
+          </a:p>
+        </p:txBody>
+      </p:sp>
+      <p:pic>
+        <p:nvPicPr>
+          <p:cNvPr id="3073" name="Picture 1"/>
+          <p:cNvPicPr>
+            <a:picLocks noChangeAspect="1" noChangeArrowheads="1"/>
+          </p:cNvPicPr>
+          <p:nvPr/>
+        </p:nvPicPr>
+        <p:blipFill>
+          <a:blip r:embed="rId2">
+            <a:clrChange>
+              <a:clrFrom>
+                <a:srgbClr val="FFFFFF"/>
+              </a:clrFrom>
+              <a:clrTo>
+                <a:srgbClr val="FFFFFF">
+                  <a:alpha val="0"/>
+                </a:srgbClr>
+              </a:clrTo>
+            </a:clrChange>
+          </a:blip>
+          <a:srcRect/>
+          <a:stretch>
+            <a:fillRect/>
+          </a:stretch>
+        </p:blipFill>
+        <p:spPr bwMode="auto">
+          <a:xfrm>
+            <a:off x="0" y="457200"/>
+            <a:ext cx="171450" cy="190500"/>
+          </a:xfrm>
+          <a:prstGeom prst="rect">
+            <a:avLst/>
+          </a:prstGeom>
+          <a:noFill/>
+        </p:spPr>
+      </p:pic>
+      <p:sp>
+        <p:nvSpPr>
+          <p:cNvPr id="3076" name="Rectangle 4"/>
+          <p:cNvSpPr>
+            <a:spLocks noChangeArrowheads="1"/>
+          </p:cNvSpPr>
+          <p:nvPr/>
+        </p:nvSpPr>
+        <p:spPr bwMode="auto">
+          <a:xfrm>
+            <a:off x="0" y="0"/>
+            <a:ext cx="9144000" cy="457200"/>
+          </a:xfrm>
+          <a:prstGeom prst="rect">
+            <a:avLst/>
+          </a:prstGeom>
+          <a:noFill/>
+          <a:ln w="9525">
+            <a:noFill/>
+            <a:miter lim="800000"/>
+            <a:headEnd/>
+            <a:tailEnd/>
+          </a:ln>
+          <a:effectLst/>
+        </p:spPr>
+        <p:txBody>
+          <a:bodyPr vert="horz" wrap="none" lIns="91440" tIns="45720" rIns="91440" bIns="45720" numCol="1" anchor="ctr" anchorCtr="0" compatLnSpc="1">
+            <a:prstTxWarp prst="textNoShape">
+              <a:avLst/>
+            </a:prstTxWarp>
+            <a:spAutoFit/>
+          </a:bodyPr>
+          <a:lstStyle/>
+          <a:p>
+            <a:endParaRPr lang="en-US"/>
+          </a:p>
+        </p:txBody>
+      </p:sp>
+      <p:pic>
+        <p:nvPicPr>
+          <p:cNvPr id="3075" name="Picture 3"/>
+          <p:cNvPicPr>
+            <a:picLocks noChangeAspect="1" noChangeArrowheads="1"/>
+          </p:cNvPicPr>
+          <p:nvPr/>
+        </p:nvPicPr>
+        <p:blipFill>
+          <a:blip r:embed="rId2">
+            <a:clrChange>
+              <a:clrFrom>
+                <a:srgbClr val="FFFFFF"/>
+              </a:clrFrom>
+              <a:clrTo>
+                <a:srgbClr val="FFFFFF">
+                  <a:alpha val="0"/>
+                </a:srgbClr>
+              </a:clrTo>
+            </a:clrChange>
+          </a:blip>
+          <a:srcRect/>
+          <a:stretch>
+            <a:fillRect/>
+          </a:stretch>
+        </p:blipFill>
+        <p:spPr bwMode="auto">
+          <a:xfrm>
+            <a:off x="0" y="457200"/>
+            <a:ext cx="171450" cy="190500"/>
+          </a:xfrm>
+          <a:prstGeom prst="rect">
+            <a:avLst/>
+          </a:prstGeom>
+          <a:noFill/>
+        </p:spPr>
+      </p:pic>
+      <p:sp>
+        <p:nvSpPr>
+          <p:cNvPr id="3078" name="Rectangle 6"/>
+          <p:cNvSpPr>
+            <a:spLocks noChangeArrowheads="1"/>
+          </p:cNvSpPr>
+          <p:nvPr/>
+        </p:nvSpPr>
+        <p:spPr bwMode="auto">
+          <a:xfrm>
+            <a:off x="0" y="0"/>
+            <a:ext cx="9144000" cy="457200"/>
+          </a:xfrm>
+          <a:prstGeom prst="rect">
+            <a:avLst/>
+          </a:prstGeom>
+          <a:noFill/>
+          <a:ln w="9525">
+            <a:noFill/>
+            <a:miter lim="800000"/>
+            <a:headEnd/>
+            <a:tailEnd/>
+          </a:ln>
+          <a:effectLst/>
+        </p:spPr>
+        <p:txBody>
+          <a:bodyPr vert="horz" wrap="none" lIns="91440" tIns="45720" rIns="91440" bIns="45720" numCol="1" anchor="ctr" anchorCtr="0" compatLnSpc="1">
+            <a:prstTxWarp prst="textNoShape">
+              <a:avLst/>
+            </a:prstTxWarp>
+            <a:spAutoFit/>
+          </a:bodyPr>
+          <a:lstStyle/>
+          <a:p>
+            <a:endParaRPr lang="en-US"/>
+          </a:p>
+        </p:txBody>
+      </p:sp>
+      <p:pic>
+        <p:nvPicPr>
+          <p:cNvPr id="3077" name="Picture 5"/>
+          <p:cNvPicPr>
+            <a:picLocks noChangeAspect="1" noChangeArrowheads="1"/>
+          </p:cNvPicPr>
+          <p:nvPr/>
+        </p:nvPicPr>
+        <p:blipFill>
+          <a:blip r:embed="rId2">
+            <a:clrChange>
+              <a:clrFrom>
+                <a:srgbClr val="FFFFFF"/>
+              </a:clrFrom>
+              <a:clrTo>
+                <a:srgbClr val="FFFFFF">
+                  <a:alpha val="0"/>
+                </a:srgbClr>
+              </a:clrTo>
+            </a:clrChange>
+          </a:blip>
+          <a:srcRect/>
+          <a:stretch>
+            <a:fillRect/>
+          </a:stretch>
+        </p:blipFill>
+        <p:spPr bwMode="auto">
+          <a:xfrm>
+            <a:off x="0" y="457200"/>
+            <a:ext cx="171450" cy="190500"/>
+          </a:xfrm>
+          <a:prstGeom prst="rect">
+            <a:avLst/>
+          </a:prstGeom>
+          <a:noFill/>
+        </p:spPr>
+      </p:pic>
     </p:spTree>
   </p:cSld>
   <p:clrMapOvr>

</xml_diff>

<commit_message>
Update generator slides in presentation
</commit_message>
<xml_diff>
--- a/presentation/pres.pptx
+++ b/presentation/pres.pptx
@@ -4,18 +4,24 @@
   <p:sldMasterIdLst>
     <p:sldMasterId id="2147483684" r:id="rId1"/>
   </p:sldMasterIdLst>
+  <p:notesMasterIdLst>
+    <p:notesMasterId r:id="rId16"/>
+  </p:notesMasterIdLst>
   <p:sldIdLst>
     <p:sldId id="256" r:id="rId2"/>
     <p:sldId id="257" r:id="rId3"/>
     <p:sldId id="258" r:id="rId4"/>
     <p:sldId id="259" r:id="rId5"/>
-    <p:sldId id="261" r:id="rId6"/>
-    <p:sldId id="260" r:id="rId7"/>
-    <p:sldId id="262" r:id="rId8"/>
-    <p:sldId id="263" r:id="rId9"/>
-    <p:sldId id="266" r:id="rId10"/>
-    <p:sldId id="264" r:id="rId11"/>
-    <p:sldId id="265" r:id="rId12"/>
+    <p:sldId id="267" r:id="rId6"/>
+    <p:sldId id="261" r:id="rId7"/>
+    <p:sldId id="260" r:id="rId8"/>
+    <p:sldId id="269" r:id="rId9"/>
+    <p:sldId id="262" r:id="rId10"/>
+    <p:sldId id="263" r:id="rId11"/>
+    <p:sldId id="268" r:id="rId12"/>
+    <p:sldId id="266" r:id="rId13"/>
+    <p:sldId id="264" r:id="rId14"/>
+    <p:sldId id="265" r:id="rId15"/>
   </p:sldIdLst>
   <p:sldSz cx="9144000" cy="6858000" type="screen4x3"/>
   <p:notesSz cx="6858000" cy="9144000"/>
@@ -115,6 +121,434 @@
     </a:lvl9pPr>
   </p:defaultTextStyle>
 </p:presentation>
+</file>
+
+<file path=ppt/notesMasters/notesMaster1.xml><?xml version="1.0" encoding="utf-8"?>
+<p:notesMaster xmlns:a="http://schemas.openxmlformats.org/drawingml/2006/main" xmlns:r="http://schemas.openxmlformats.org/officeDocument/2006/relationships" xmlns:p="http://schemas.openxmlformats.org/presentationml/2006/main">
+  <p:cSld>
+    <p:bg>
+      <p:bgRef idx="1001">
+        <a:schemeClr val="bg1"/>
+      </p:bgRef>
+    </p:bg>
+    <p:spTree>
+      <p:nvGrpSpPr>
+        <p:cNvPr id="1" name=""/>
+        <p:cNvGrpSpPr/>
+        <p:nvPr/>
+      </p:nvGrpSpPr>
+      <p:grpSpPr>
+        <a:xfrm>
+          <a:off x="0" y="0"/>
+          <a:ext cx="0" cy="0"/>
+          <a:chOff x="0" y="0"/>
+          <a:chExt cx="0" cy="0"/>
+        </a:xfrm>
+      </p:grpSpPr>
+      <p:sp>
+        <p:nvSpPr>
+          <p:cNvPr id="2" name="Header Placeholder 1"/>
+          <p:cNvSpPr>
+            <a:spLocks noGrp="1"/>
+          </p:cNvSpPr>
+          <p:nvPr>
+            <p:ph type="hdr" sz="quarter"/>
+          </p:nvPr>
+        </p:nvSpPr>
+        <p:spPr>
+          <a:xfrm>
+            <a:off x="0" y="0"/>
+            <a:ext cx="2971800" cy="457200"/>
+          </a:xfrm>
+          <a:prstGeom prst="rect">
+            <a:avLst/>
+          </a:prstGeom>
+        </p:spPr>
+        <p:txBody>
+          <a:bodyPr vert="horz" lIns="91440" tIns="45720" rIns="91440" bIns="45720" rtlCol="0"/>
+          <a:lstStyle>
+            <a:lvl1pPr algn="l">
+              <a:defRPr sz="1200"/>
+            </a:lvl1pPr>
+          </a:lstStyle>
+          <a:p>
+            <a:endParaRPr lang="en-US"/>
+          </a:p>
+        </p:txBody>
+      </p:sp>
+      <p:sp>
+        <p:nvSpPr>
+          <p:cNvPr id="3" name="Date Placeholder 2"/>
+          <p:cNvSpPr>
+            <a:spLocks noGrp="1"/>
+          </p:cNvSpPr>
+          <p:nvPr>
+            <p:ph type="dt" idx="1"/>
+          </p:nvPr>
+        </p:nvSpPr>
+        <p:spPr>
+          <a:xfrm>
+            <a:off x="3884613" y="0"/>
+            <a:ext cx="2971800" cy="457200"/>
+          </a:xfrm>
+          <a:prstGeom prst="rect">
+            <a:avLst/>
+          </a:prstGeom>
+        </p:spPr>
+        <p:txBody>
+          <a:bodyPr vert="horz" lIns="91440" tIns="45720" rIns="91440" bIns="45720" rtlCol="0"/>
+          <a:lstStyle>
+            <a:lvl1pPr algn="r">
+              <a:defRPr sz="1200"/>
+            </a:lvl1pPr>
+          </a:lstStyle>
+          <a:p>
+            <a:fld id="{D343ACFE-C986-4655-9665-E2DF4EB3913C}" type="datetimeFigureOut">
+              <a:rPr lang="en-US" smtClean="0"/>
+              <a:t>12/4/2014</a:t>
+            </a:fld>
+            <a:endParaRPr lang="en-US"/>
+          </a:p>
+        </p:txBody>
+      </p:sp>
+      <p:sp>
+        <p:nvSpPr>
+          <p:cNvPr id="4" name="Slide Image Placeholder 3"/>
+          <p:cNvSpPr>
+            <a:spLocks noGrp="1" noRot="1" noChangeAspect="1"/>
+          </p:cNvSpPr>
+          <p:nvPr>
+            <p:ph type="sldImg" idx="2"/>
+          </p:nvPr>
+        </p:nvSpPr>
+        <p:spPr>
+          <a:xfrm>
+            <a:off x="1143000" y="685800"/>
+            <a:ext cx="4572000" cy="3429000"/>
+          </a:xfrm>
+          <a:prstGeom prst="rect">
+            <a:avLst/>
+          </a:prstGeom>
+          <a:noFill/>
+          <a:ln w="12700">
+            <a:solidFill>
+              <a:prstClr val="black"/>
+            </a:solidFill>
+          </a:ln>
+        </p:spPr>
+        <p:txBody>
+          <a:bodyPr vert="horz" lIns="91440" tIns="45720" rIns="91440" bIns="45720" rtlCol="0" anchor="ctr"/>
+          <a:lstStyle/>
+          <a:p>
+            <a:endParaRPr lang="en-US"/>
+          </a:p>
+        </p:txBody>
+      </p:sp>
+      <p:sp>
+        <p:nvSpPr>
+          <p:cNvPr id="5" name="Notes Placeholder 4"/>
+          <p:cNvSpPr>
+            <a:spLocks noGrp="1"/>
+          </p:cNvSpPr>
+          <p:nvPr>
+            <p:ph type="body" sz="quarter" idx="3"/>
+          </p:nvPr>
+        </p:nvSpPr>
+        <p:spPr>
+          <a:xfrm>
+            <a:off x="685800" y="4343400"/>
+            <a:ext cx="5486400" cy="4114800"/>
+          </a:xfrm>
+          <a:prstGeom prst="rect">
+            <a:avLst/>
+          </a:prstGeom>
+        </p:spPr>
+        <p:txBody>
+          <a:bodyPr vert="horz" lIns="91440" tIns="45720" rIns="91440" bIns="45720" rtlCol="0">
+            <a:normAutofit/>
+          </a:bodyPr>
+          <a:lstStyle/>
+          <a:p>
+            <a:pPr lvl="0"/>
+            <a:r>
+              <a:rPr lang="en-US" smtClean="0"/>
+              <a:t>Click to edit Master text styles</a:t>
+            </a:r>
+          </a:p>
+          <a:p>
+            <a:pPr lvl="1"/>
+            <a:r>
+              <a:rPr lang="en-US" smtClean="0"/>
+              <a:t>Second level</a:t>
+            </a:r>
+          </a:p>
+          <a:p>
+            <a:pPr lvl="2"/>
+            <a:r>
+              <a:rPr lang="en-US" smtClean="0"/>
+              <a:t>Third level</a:t>
+            </a:r>
+          </a:p>
+          <a:p>
+            <a:pPr lvl="3"/>
+            <a:r>
+              <a:rPr lang="en-US" smtClean="0"/>
+              <a:t>Fourth level</a:t>
+            </a:r>
+          </a:p>
+          <a:p>
+            <a:pPr lvl="4"/>
+            <a:r>
+              <a:rPr lang="en-US" smtClean="0"/>
+              <a:t>Fifth level</a:t>
+            </a:r>
+            <a:endParaRPr lang="en-US"/>
+          </a:p>
+        </p:txBody>
+      </p:sp>
+      <p:sp>
+        <p:nvSpPr>
+          <p:cNvPr id="6" name="Footer Placeholder 5"/>
+          <p:cNvSpPr>
+            <a:spLocks noGrp="1"/>
+          </p:cNvSpPr>
+          <p:nvPr>
+            <p:ph type="ftr" sz="quarter" idx="4"/>
+          </p:nvPr>
+        </p:nvSpPr>
+        <p:spPr>
+          <a:xfrm>
+            <a:off x="0" y="8685213"/>
+            <a:ext cx="2971800" cy="457200"/>
+          </a:xfrm>
+          <a:prstGeom prst="rect">
+            <a:avLst/>
+          </a:prstGeom>
+        </p:spPr>
+        <p:txBody>
+          <a:bodyPr vert="horz" lIns="91440" tIns="45720" rIns="91440" bIns="45720" rtlCol="0" anchor="b"/>
+          <a:lstStyle>
+            <a:lvl1pPr algn="l">
+              <a:defRPr sz="1200"/>
+            </a:lvl1pPr>
+          </a:lstStyle>
+          <a:p>
+            <a:endParaRPr lang="en-US"/>
+          </a:p>
+        </p:txBody>
+      </p:sp>
+      <p:sp>
+        <p:nvSpPr>
+          <p:cNvPr id="7" name="Slide Number Placeholder 6"/>
+          <p:cNvSpPr>
+            <a:spLocks noGrp="1"/>
+          </p:cNvSpPr>
+          <p:nvPr>
+            <p:ph type="sldNum" sz="quarter" idx="5"/>
+          </p:nvPr>
+        </p:nvSpPr>
+        <p:spPr>
+          <a:xfrm>
+            <a:off x="3884613" y="8685213"/>
+            <a:ext cx="2971800" cy="457200"/>
+          </a:xfrm>
+          <a:prstGeom prst="rect">
+            <a:avLst/>
+          </a:prstGeom>
+        </p:spPr>
+        <p:txBody>
+          <a:bodyPr vert="horz" lIns="91440" tIns="45720" rIns="91440" bIns="45720" rtlCol="0" anchor="b"/>
+          <a:lstStyle>
+            <a:lvl1pPr algn="r">
+              <a:defRPr sz="1200"/>
+            </a:lvl1pPr>
+          </a:lstStyle>
+          <a:p>
+            <a:fld id="{429E84A2-4872-4E06-AFDF-C221812919E9}" type="slidenum">
+              <a:rPr lang="en-US" smtClean="0"/>
+              <a:t>‹#›</a:t>
+            </a:fld>
+            <a:endParaRPr lang="en-US"/>
+          </a:p>
+        </p:txBody>
+      </p:sp>
+    </p:spTree>
+  </p:cSld>
+  <p:clrMap bg1="lt1" tx1="dk1" bg2="lt2" tx2="dk2" accent1="accent1" accent2="accent2" accent3="accent3" accent4="accent4" accent5="accent5" accent6="accent6" hlink="hlink" folHlink="folHlink"/>
+  <p:notesStyle>
+    <a:lvl1pPr marL="0" algn="l" defTabSz="914400" rtl="0" eaLnBrk="1" latinLnBrk="0" hangingPunct="1">
+      <a:defRPr sz="1200" kern="1200">
+        <a:solidFill>
+          <a:schemeClr val="tx1"/>
+        </a:solidFill>
+        <a:latin typeface="+mn-lt"/>
+        <a:ea typeface="+mn-ea"/>
+        <a:cs typeface="+mn-cs"/>
+      </a:defRPr>
+    </a:lvl1pPr>
+    <a:lvl2pPr marL="457200" algn="l" defTabSz="914400" rtl="0" eaLnBrk="1" latinLnBrk="0" hangingPunct="1">
+      <a:defRPr sz="1200" kern="1200">
+        <a:solidFill>
+          <a:schemeClr val="tx1"/>
+        </a:solidFill>
+        <a:latin typeface="+mn-lt"/>
+        <a:ea typeface="+mn-ea"/>
+        <a:cs typeface="+mn-cs"/>
+      </a:defRPr>
+    </a:lvl2pPr>
+    <a:lvl3pPr marL="914400" algn="l" defTabSz="914400" rtl="0" eaLnBrk="1" latinLnBrk="0" hangingPunct="1">
+      <a:defRPr sz="1200" kern="1200">
+        <a:solidFill>
+          <a:schemeClr val="tx1"/>
+        </a:solidFill>
+        <a:latin typeface="+mn-lt"/>
+        <a:ea typeface="+mn-ea"/>
+        <a:cs typeface="+mn-cs"/>
+      </a:defRPr>
+    </a:lvl3pPr>
+    <a:lvl4pPr marL="1371600" algn="l" defTabSz="914400" rtl="0" eaLnBrk="1" latinLnBrk="0" hangingPunct="1">
+      <a:defRPr sz="1200" kern="1200">
+        <a:solidFill>
+          <a:schemeClr val="tx1"/>
+        </a:solidFill>
+        <a:latin typeface="+mn-lt"/>
+        <a:ea typeface="+mn-ea"/>
+        <a:cs typeface="+mn-cs"/>
+      </a:defRPr>
+    </a:lvl4pPr>
+    <a:lvl5pPr marL="1828800" algn="l" defTabSz="914400" rtl="0" eaLnBrk="1" latinLnBrk="0" hangingPunct="1">
+      <a:defRPr sz="1200" kern="1200">
+        <a:solidFill>
+          <a:schemeClr val="tx1"/>
+        </a:solidFill>
+        <a:latin typeface="+mn-lt"/>
+        <a:ea typeface="+mn-ea"/>
+        <a:cs typeface="+mn-cs"/>
+      </a:defRPr>
+    </a:lvl5pPr>
+    <a:lvl6pPr marL="2286000" algn="l" defTabSz="914400" rtl="0" eaLnBrk="1" latinLnBrk="0" hangingPunct="1">
+      <a:defRPr sz="1200" kern="1200">
+        <a:solidFill>
+          <a:schemeClr val="tx1"/>
+        </a:solidFill>
+        <a:latin typeface="+mn-lt"/>
+        <a:ea typeface="+mn-ea"/>
+        <a:cs typeface="+mn-cs"/>
+      </a:defRPr>
+    </a:lvl6pPr>
+    <a:lvl7pPr marL="2743200" algn="l" defTabSz="914400" rtl="0" eaLnBrk="1" latinLnBrk="0" hangingPunct="1">
+      <a:defRPr sz="1200" kern="1200">
+        <a:solidFill>
+          <a:schemeClr val="tx1"/>
+        </a:solidFill>
+        <a:latin typeface="+mn-lt"/>
+        <a:ea typeface="+mn-ea"/>
+        <a:cs typeface="+mn-cs"/>
+      </a:defRPr>
+    </a:lvl7pPr>
+    <a:lvl8pPr marL="3200400" algn="l" defTabSz="914400" rtl="0" eaLnBrk="1" latinLnBrk="0" hangingPunct="1">
+      <a:defRPr sz="1200" kern="1200">
+        <a:solidFill>
+          <a:schemeClr val="tx1"/>
+        </a:solidFill>
+        <a:latin typeface="+mn-lt"/>
+        <a:ea typeface="+mn-ea"/>
+        <a:cs typeface="+mn-cs"/>
+      </a:defRPr>
+    </a:lvl8pPr>
+    <a:lvl9pPr marL="3657600" algn="l" defTabSz="914400" rtl="0" eaLnBrk="1" latinLnBrk="0" hangingPunct="1">
+      <a:defRPr sz="1200" kern="1200">
+        <a:solidFill>
+          <a:schemeClr val="tx1"/>
+        </a:solidFill>
+        <a:latin typeface="+mn-lt"/>
+        <a:ea typeface="+mn-ea"/>
+        <a:cs typeface="+mn-cs"/>
+      </a:defRPr>
+    </a:lvl9pPr>
+  </p:notesStyle>
+</p:notesMaster>
+</file>
+
+<file path=ppt/notesSlides/notesSlide1.xml><?xml version="1.0" encoding="utf-8"?>
+<p:notes xmlns:a="http://schemas.openxmlformats.org/drawingml/2006/main" xmlns:r="http://schemas.openxmlformats.org/officeDocument/2006/relationships" xmlns:p="http://schemas.openxmlformats.org/presentationml/2006/main">
+  <p:cSld>
+    <p:spTree>
+      <p:nvGrpSpPr>
+        <p:cNvPr id="1" name=""/>
+        <p:cNvGrpSpPr/>
+        <p:nvPr/>
+      </p:nvGrpSpPr>
+      <p:grpSpPr>
+        <a:xfrm>
+          <a:off x="0" y="0"/>
+          <a:ext cx="0" cy="0"/>
+          <a:chOff x="0" y="0"/>
+          <a:chExt cx="0" cy="0"/>
+        </a:xfrm>
+      </p:grpSpPr>
+      <p:sp>
+        <p:nvSpPr>
+          <p:cNvPr id="2" name="Slide Image Placeholder 1"/>
+          <p:cNvSpPr>
+            <a:spLocks noGrp="1" noRot="1" noChangeAspect="1"/>
+          </p:cNvSpPr>
+          <p:nvPr>
+            <p:ph type="sldImg"/>
+          </p:nvPr>
+        </p:nvSpPr>
+        <p:spPr/>
+      </p:sp>
+      <p:sp>
+        <p:nvSpPr>
+          <p:cNvPr id="3" name="Notes Placeholder 2"/>
+          <p:cNvSpPr>
+            <a:spLocks noGrp="1"/>
+          </p:cNvSpPr>
+          <p:nvPr>
+            <p:ph type="body" idx="1"/>
+          </p:nvPr>
+        </p:nvSpPr>
+        <p:spPr/>
+        <p:txBody>
+          <a:bodyPr>
+            <a:normAutofit/>
+          </a:bodyPr>
+          <a:lstStyle/>
+          <a:p>
+            <a:endParaRPr lang="en-US" dirty="0"/>
+          </a:p>
+        </p:txBody>
+      </p:sp>
+      <p:sp>
+        <p:nvSpPr>
+          <p:cNvPr id="4" name="Slide Number Placeholder 3"/>
+          <p:cNvSpPr>
+            <a:spLocks noGrp="1"/>
+          </p:cNvSpPr>
+          <p:nvPr>
+            <p:ph type="sldNum" sz="quarter" idx="10"/>
+          </p:nvPr>
+        </p:nvSpPr>
+        <p:spPr/>
+        <p:txBody>
+          <a:bodyPr/>
+          <a:lstStyle/>
+          <a:p>
+            <a:fld id="{429E84A2-4872-4E06-AFDF-C221812919E9}" type="slidenum">
+              <a:rPr lang="en-US" smtClean="0"/>
+              <a:t>10</a:t>
+            </a:fld>
+            <a:endParaRPr lang="en-US"/>
+          </a:p>
+        </p:txBody>
+      </p:sp>
+    </p:spTree>
+  </p:cSld>
+  <p:clrMapOvr>
+    <a:masterClrMapping/>
+  </p:clrMapOvr>
+</p:notes>
 </file>
 
 <file path=ppt/slideLayouts/slideLayout1.xml><?xml version="1.0" encoding="utf-8"?>
@@ -3817,8 +4251,16 @@
           <a:lstStyle/>
           <a:p>
             <a:r>
-              <a:rPr lang="en-US" dirty="0" smtClean="0"/>
-              <a:t>Results</a:t>
+              <a:rPr lang="en-US" dirty="0" err="1" smtClean="0"/>
+              <a:t>Mersenne</a:t>
+            </a:r>
+            <a:r>
+              <a:rPr lang="en-US" dirty="0" smtClean="0"/>
+              <a:t> </a:t>
+            </a:r>
+            <a:r>
+              <a:rPr lang="en-US" dirty="0" smtClean="0"/>
+              <a:t>Twister</a:t>
             </a:r>
             <a:endParaRPr lang="en-US" dirty="0"/>
           </a:p>
@@ -3836,10 +4278,418 @@
         </p:nvSpPr>
         <p:spPr/>
         <p:txBody>
-          <a:bodyPr/>
-          <a:lstStyle/>
-          <a:p>
-            <a:endParaRPr lang="en-US" dirty="0"/>
+          <a:bodyPr>
+            <a:normAutofit/>
+          </a:bodyPr>
+          <a:lstStyle/>
+          <a:p>
+            <a:r>
+              <a:rPr lang="en-US" dirty="0" smtClean="0"/>
+              <a:t>Underlying state sequence has form:</a:t>
+            </a:r>
+            <a:br>
+              <a:rPr lang="en-US" dirty="0" smtClean="0"/>
+            </a:br>
+            <a:r>
+              <a:rPr lang="en-US" dirty="0" smtClean="0"/>
+              <a:t>	</a:t>
+            </a:r>
+            <a:r>
+              <a:rPr lang="pl-PL" dirty="0" smtClean="0"/>
+              <a:t>X</a:t>
+            </a:r>
+            <a:r>
+              <a:rPr lang="pl-PL" baseline="-25000" dirty="0" smtClean="0"/>
+              <a:t>k+n</a:t>
+            </a:r>
+            <a:r>
+              <a:rPr lang="pl-PL" dirty="0" smtClean="0"/>
+              <a:t> = X</a:t>
+            </a:r>
+            <a:r>
+              <a:rPr lang="pl-PL" baseline="-25000" dirty="0" smtClean="0"/>
+              <a:t>k+m</a:t>
+            </a:r>
+            <a:r>
+              <a:rPr lang="pl-PL" dirty="0" smtClean="0"/>
+              <a:t> ⊕</a:t>
+            </a:r>
+            <a:r>
+              <a:rPr lang="en-US" dirty="0" smtClean="0"/>
+              <a:t>(</a:t>
+            </a:r>
+            <a:r>
+              <a:rPr lang="en-US" dirty="0" err="1" smtClean="0"/>
+              <a:t>X</a:t>
+            </a:r>
+            <a:r>
+              <a:rPr lang="en-US" baseline="30000" dirty="0" err="1" smtClean="0"/>
+              <a:t>u</a:t>
+            </a:r>
+            <a:r>
+              <a:rPr lang="en-US" baseline="-25000" dirty="0" err="1" smtClean="0"/>
+              <a:t>k</a:t>
+            </a:r>
+            <a:r>
+              <a:rPr lang="en-US" dirty="0" smtClean="0"/>
+              <a:t> | X</a:t>
+            </a:r>
+            <a:r>
+              <a:rPr lang="en-US" baseline="30000" dirty="0" smtClean="0"/>
+              <a:t>l</a:t>
+            </a:r>
+            <a:r>
+              <a:rPr lang="en-US" baseline="-25000" dirty="0" smtClean="0"/>
+              <a:t>k+1</a:t>
+            </a:r>
+            <a:r>
+              <a:rPr lang="en-US" dirty="0" smtClean="0"/>
+              <a:t>)A</a:t>
+            </a:r>
+          </a:p>
+          <a:p>
+            <a:r>
+              <a:rPr lang="en-US" dirty="0" smtClean="0"/>
+              <a:t>A is a matrix of form: </a:t>
+            </a:r>
+            <a:r>
+              <a:rPr lang="en-US" sz="6500" dirty="0" smtClean="0"/>
+              <a:t>[            ]</a:t>
+            </a:r>
+          </a:p>
+          <a:p>
+            <a:r>
+              <a:rPr lang="en-US" dirty="0" smtClean="0"/>
+              <a:t>Effectively a linear feedback shift register (LFSR) with transformed inputs on each XOR operation</a:t>
+            </a:r>
+          </a:p>
+          <a:p>
+            <a:r>
+              <a:rPr lang="en-US" dirty="0" smtClean="0"/>
+              <a:t>The expression (</a:t>
+            </a:r>
+            <a:r>
+              <a:rPr lang="en-US" dirty="0" err="1" smtClean="0"/>
+              <a:t>X</a:t>
+            </a:r>
+            <a:r>
+              <a:rPr lang="en-US" baseline="30000" dirty="0" err="1" smtClean="0"/>
+              <a:t>u</a:t>
+            </a:r>
+            <a:r>
+              <a:rPr lang="en-US" baseline="-25000" dirty="0" err="1" smtClean="0"/>
+              <a:t>k</a:t>
+            </a:r>
+            <a:r>
+              <a:rPr lang="en-US" dirty="0" smtClean="0"/>
+              <a:t> </a:t>
+            </a:r>
+            <a:r>
+              <a:rPr lang="en-US" dirty="0" smtClean="0"/>
+              <a:t>| </a:t>
+            </a:r>
+            <a:r>
+              <a:rPr lang="en-US" dirty="0" smtClean="0"/>
+              <a:t>X</a:t>
+            </a:r>
+            <a:r>
+              <a:rPr lang="en-US" baseline="30000" dirty="0" smtClean="0"/>
+              <a:t>l</a:t>
+            </a:r>
+            <a:r>
+              <a:rPr lang="en-US" baseline="-25000" dirty="0" smtClean="0"/>
+              <a:t>k+1</a:t>
+            </a:r>
+            <a:r>
+              <a:rPr lang="en-US" dirty="0" smtClean="0"/>
+              <a:t>)A concatenates two previous masked values, performs a right-shift, and applies an XOR mask on each bit</a:t>
+            </a:r>
+          </a:p>
+        </p:txBody>
+      </p:sp>
+      <p:sp>
+        <p:nvSpPr>
+          <p:cNvPr id="3074" name="Rectangle 2"/>
+          <p:cNvSpPr>
+            <a:spLocks noChangeArrowheads="1"/>
+          </p:cNvSpPr>
+          <p:nvPr/>
+        </p:nvSpPr>
+        <p:spPr bwMode="auto">
+          <a:xfrm>
+            <a:off x="0" y="0"/>
+            <a:ext cx="9144000" cy="457200"/>
+          </a:xfrm>
+          <a:prstGeom prst="rect">
+            <a:avLst/>
+          </a:prstGeom>
+          <a:noFill/>
+          <a:ln w="9525">
+            <a:noFill/>
+            <a:miter lim="800000"/>
+            <a:headEnd/>
+            <a:tailEnd/>
+          </a:ln>
+          <a:effectLst/>
+        </p:spPr>
+        <p:txBody>
+          <a:bodyPr vert="horz" wrap="none" lIns="91440" tIns="45720" rIns="91440" bIns="45720" numCol="1" anchor="ctr" anchorCtr="0" compatLnSpc="1">
+            <a:prstTxWarp prst="textNoShape">
+              <a:avLst/>
+            </a:prstTxWarp>
+            <a:spAutoFit/>
+          </a:bodyPr>
+          <a:lstStyle/>
+          <a:p>
+            <a:endParaRPr lang="en-US"/>
+          </a:p>
+        </p:txBody>
+      </p:sp>
+      <p:sp>
+        <p:nvSpPr>
+          <p:cNvPr id="3076" name="Rectangle 4"/>
+          <p:cNvSpPr>
+            <a:spLocks noChangeArrowheads="1"/>
+          </p:cNvSpPr>
+          <p:nvPr/>
+        </p:nvSpPr>
+        <p:spPr bwMode="auto">
+          <a:xfrm>
+            <a:off x="0" y="0"/>
+            <a:ext cx="9144000" cy="457200"/>
+          </a:xfrm>
+          <a:prstGeom prst="rect">
+            <a:avLst/>
+          </a:prstGeom>
+          <a:noFill/>
+          <a:ln w="9525">
+            <a:noFill/>
+            <a:miter lim="800000"/>
+            <a:headEnd/>
+            <a:tailEnd/>
+          </a:ln>
+          <a:effectLst/>
+        </p:spPr>
+        <p:txBody>
+          <a:bodyPr vert="horz" wrap="none" lIns="91440" tIns="45720" rIns="91440" bIns="45720" numCol="1" anchor="ctr" anchorCtr="0" compatLnSpc="1">
+            <a:prstTxWarp prst="textNoShape">
+              <a:avLst/>
+            </a:prstTxWarp>
+            <a:spAutoFit/>
+          </a:bodyPr>
+          <a:lstStyle/>
+          <a:p>
+            <a:endParaRPr lang="en-US"/>
+          </a:p>
+        </p:txBody>
+      </p:sp>
+      <p:sp>
+        <p:nvSpPr>
+          <p:cNvPr id="3078" name="Rectangle 6"/>
+          <p:cNvSpPr>
+            <a:spLocks noChangeArrowheads="1"/>
+          </p:cNvSpPr>
+          <p:nvPr/>
+        </p:nvSpPr>
+        <p:spPr bwMode="auto">
+          <a:xfrm>
+            <a:off x="0" y="0"/>
+            <a:ext cx="9144000" cy="457200"/>
+          </a:xfrm>
+          <a:prstGeom prst="rect">
+            <a:avLst/>
+          </a:prstGeom>
+          <a:noFill/>
+          <a:ln w="9525">
+            <a:noFill/>
+            <a:miter lim="800000"/>
+            <a:headEnd/>
+            <a:tailEnd/>
+          </a:ln>
+          <a:effectLst/>
+        </p:spPr>
+        <p:txBody>
+          <a:bodyPr vert="horz" wrap="none" lIns="91440" tIns="45720" rIns="91440" bIns="45720" numCol="1" anchor="ctr" anchorCtr="0" compatLnSpc="1">
+            <a:prstTxWarp prst="textNoShape">
+              <a:avLst/>
+            </a:prstTxWarp>
+            <a:spAutoFit/>
+          </a:bodyPr>
+          <a:lstStyle/>
+          <a:p>
+            <a:endParaRPr lang="en-US"/>
+          </a:p>
+        </p:txBody>
+      </p:sp>
+      <p:pic>
+        <p:nvPicPr>
+          <p:cNvPr id="3080" name="Picture 8"/>
+          <p:cNvPicPr>
+            <a:picLocks noChangeAspect="1" noChangeArrowheads="1"/>
+          </p:cNvPicPr>
+          <p:nvPr/>
+        </p:nvPicPr>
+        <p:blipFill>
+          <a:blip r:embed="rId3"/>
+          <a:srcRect/>
+          <a:stretch>
+            <a:fillRect/>
+          </a:stretch>
+        </p:blipFill>
+        <p:spPr bwMode="auto">
+          <a:xfrm>
+            <a:off x="5867400" y="381000"/>
+            <a:ext cx="2921418" cy="2114550"/>
+          </a:xfrm>
+          <a:prstGeom prst="rect">
+            <a:avLst/>
+          </a:prstGeom>
+          <a:noFill/>
+          <a:ln w="9525">
+            <a:noFill/>
+            <a:miter lim="800000"/>
+            <a:headEnd/>
+            <a:tailEnd/>
+          </a:ln>
+          <a:effectLst/>
+        </p:spPr>
+      </p:pic>
+      <p:sp>
+        <p:nvSpPr>
+          <p:cNvPr id="3082" name="Rectangle 10"/>
+          <p:cNvSpPr>
+            <a:spLocks noChangeArrowheads="1"/>
+          </p:cNvSpPr>
+          <p:nvPr/>
+        </p:nvSpPr>
+        <p:spPr bwMode="auto">
+          <a:xfrm>
+            <a:off x="0" y="0"/>
+            <a:ext cx="9144000" cy="457200"/>
+          </a:xfrm>
+          <a:prstGeom prst="rect">
+            <a:avLst/>
+          </a:prstGeom>
+          <a:noFill/>
+          <a:ln w="9525">
+            <a:noFill/>
+            <a:miter lim="800000"/>
+            <a:headEnd/>
+            <a:tailEnd/>
+          </a:ln>
+          <a:effectLst/>
+        </p:spPr>
+        <p:txBody>
+          <a:bodyPr vert="horz" wrap="none" lIns="914112" tIns="914112" rIns="914112" bIns="914112" numCol="1" anchor="ctr" anchorCtr="0" compatLnSpc="1">
+            <a:prstTxWarp prst="textNoShape">
+              <a:avLst/>
+            </a:prstTxWarp>
+            <a:spAutoFit/>
+          </a:bodyPr>
+          <a:lstStyle/>
+          <a:p>
+            <a:endParaRPr lang="en-US"/>
+          </a:p>
+        </p:txBody>
+      </p:sp>
+      <p:pic>
+        <p:nvPicPr>
+          <p:cNvPr id="3081" name="Picture 9"/>
+          <p:cNvPicPr>
+            <a:picLocks noChangeAspect="1" noChangeArrowheads="1"/>
+          </p:cNvPicPr>
+          <p:nvPr/>
+        </p:nvPicPr>
+        <p:blipFill>
+          <a:blip r:embed="rId4">
+            <a:clrChange>
+              <a:clrFrom>
+                <a:srgbClr val="FFFFFF"/>
+              </a:clrFrom>
+              <a:clrTo>
+                <a:srgbClr val="FFFFFF">
+                  <a:alpha val="0"/>
+                </a:srgbClr>
+              </a:clrTo>
+            </a:clrChange>
+          </a:blip>
+          <a:srcRect/>
+          <a:stretch>
+            <a:fillRect/>
+          </a:stretch>
+        </p:blipFill>
+        <p:spPr bwMode="auto">
+          <a:xfrm>
+            <a:off x="4214957" y="2419350"/>
+            <a:ext cx="1881043" cy="933450"/>
+          </a:xfrm>
+          <a:prstGeom prst="rect">
+            <a:avLst/>
+          </a:prstGeom>
+          <a:noFill/>
+        </p:spPr>
+      </p:pic>
+      <p:sp>
+        <p:nvSpPr>
+          <p:cNvPr id="3083" name="Rectangle 11"/>
+          <p:cNvSpPr>
+            <a:spLocks noChangeArrowheads="1"/>
+          </p:cNvSpPr>
+          <p:nvPr/>
+        </p:nvSpPr>
+        <p:spPr bwMode="auto">
+          <a:xfrm>
+            <a:off x="0" y="1085850"/>
+            <a:ext cx="9144000" cy="457200"/>
+          </a:xfrm>
+          <a:prstGeom prst="rect">
+            <a:avLst/>
+          </a:prstGeom>
+          <a:noFill/>
+          <a:ln w="9525">
+            <a:noFill/>
+            <a:miter lim="800000"/>
+            <a:headEnd/>
+            <a:tailEnd/>
+          </a:ln>
+          <a:effectLst/>
+        </p:spPr>
+        <p:txBody>
+          <a:bodyPr vert="horz" wrap="none" lIns="91440" tIns="45720" rIns="91440" bIns="45720" numCol="1" anchor="ctr" anchorCtr="0" compatLnSpc="1">
+            <a:prstTxWarp prst="textNoShape">
+              <a:avLst/>
+            </a:prstTxWarp>
+            <a:spAutoFit/>
+          </a:bodyPr>
+          <a:lstStyle/>
+          <a:p>
+            <a:pPr marL="0" marR="0" lvl="0" indent="0" algn="l" defTabSz="914400" rtl="0" eaLnBrk="1" fontAlgn="base" latinLnBrk="0" hangingPunct="1">
+              <a:lnSpc>
+                <a:spcPct val="100000"/>
+              </a:lnSpc>
+              <a:spcBef>
+                <a:spcPct val="0"/>
+              </a:spcBef>
+              <a:spcAft>
+                <a:spcPct val="0"/>
+              </a:spcAft>
+              <a:buClrTx/>
+              <a:buSzTx/>
+              <a:buFontTx/>
+              <a:buNone/>
+              <a:tabLst/>
+            </a:pPr>
+            <a:endParaRPr kumimoji="0" lang="en-US" sz="1800" b="0" i="0" u="none" strike="noStrike" cap="none" normalizeH="0" baseline="0" smtClean="0">
+              <a:ln>
+                <a:noFill/>
+              </a:ln>
+              <a:solidFill>
+                <a:schemeClr val="tx1"/>
+              </a:solidFill>
+              <a:effectLst/>
+              <a:latin typeface="Arial" pitchFamily="34" charset="0"/>
+              <a:cs typeface="Arial" pitchFamily="34" charset="0"/>
+            </a:endParaRPr>
           </a:p>
         </p:txBody>
       </p:sp>
@@ -3884,6 +4734,540 @@
           <a:lstStyle/>
           <a:p>
             <a:r>
+              <a:rPr lang="en-US" dirty="0" err="1" smtClean="0"/>
+              <a:t>Mersenne</a:t>
+            </a:r>
+            <a:r>
+              <a:rPr lang="en-US" dirty="0" smtClean="0"/>
+              <a:t> </a:t>
+            </a:r>
+            <a:r>
+              <a:rPr lang="en-US" dirty="0" smtClean="0"/>
+              <a:t>Twister</a:t>
+            </a:r>
+            <a:endParaRPr lang="en-US" dirty="0"/>
+          </a:p>
+        </p:txBody>
+      </p:sp>
+      <p:sp>
+        <p:nvSpPr>
+          <p:cNvPr id="3" name="Content Placeholder 2"/>
+          <p:cNvSpPr>
+            <a:spLocks noGrp="1"/>
+          </p:cNvSpPr>
+          <p:nvPr>
+            <p:ph sz="quarter" idx="1"/>
+          </p:nvPr>
+        </p:nvSpPr>
+        <p:spPr/>
+        <p:txBody>
+          <a:bodyPr>
+            <a:normAutofit/>
+          </a:bodyPr>
+          <a:lstStyle/>
+          <a:p>
+            <a:r>
+              <a:rPr lang="en-US" dirty="0" smtClean="0"/>
+              <a:t>Results produced by a tempering function on the state:</a:t>
+            </a:r>
+            <a:br>
+              <a:rPr lang="en-US" dirty="0" smtClean="0"/>
+            </a:br>
+            <a:r>
+              <a:rPr lang="en-US" sz="2000" dirty="0" smtClean="0"/>
+              <a:t>	</a:t>
+            </a:r>
+            <a:r>
+              <a:rPr lang="es-ES" sz="2000" dirty="0" smtClean="0"/>
+              <a:t>y := x ⊕ (x &gt;&gt; u)</a:t>
+            </a:r>
+            <a:br>
+              <a:rPr lang="es-ES" sz="2000" dirty="0" smtClean="0"/>
+            </a:br>
+            <a:r>
+              <a:rPr lang="es-ES" sz="2000" dirty="0" smtClean="0"/>
+              <a:t>	y := y ⊕ ((y &lt;&lt; s) · b)</a:t>
+            </a:r>
+            <a:br>
+              <a:rPr lang="es-ES" sz="2000" dirty="0" smtClean="0"/>
+            </a:br>
+            <a:r>
+              <a:rPr lang="es-ES" sz="2000" dirty="0" smtClean="0"/>
+              <a:t>	y := y ⊕ ((y &lt;&lt; t) · c)</a:t>
+            </a:r>
+            <a:br>
+              <a:rPr lang="es-ES" sz="2000" dirty="0" smtClean="0"/>
+            </a:br>
+            <a:r>
+              <a:rPr lang="es-ES" sz="2000" dirty="0" smtClean="0"/>
+              <a:t>	y := y ⊕ (y &gt;&gt; l) </a:t>
+            </a:r>
+            <a:endParaRPr lang="es-ES" sz="2000" dirty="0" smtClean="0"/>
+          </a:p>
+          <a:p>
+            <a:r>
+              <a:rPr lang="en-US" dirty="0" smtClean="0"/>
+              <a:t>This is done to ensure </a:t>
+            </a:r>
+            <a:r>
+              <a:rPr lang="en-US" dirty="0" err="1" smtClean="0"/>
+              <a:t>equidistributed</a:t>
+            </a:r>
+            <a:r>
+              <a:rPr lang="en-US" dirty="0" smtClean="0"/>
+              <a:t> outputs</a:t>
+            </a:r>
+          </a:p>
+          <a:p>
+            <a:r>
+              <a:rPr lang="en-US" dirty="0" smtClean="0"/>
+              <a:t>In practice, sequences are generated in batches and outputs are produced upon request using the tempering function</a:t>
+            </a:r>
+          </a:p>
+          <a:p>
+            <a:endParaRPr lang="pl-PL" dirty="0" smtClean="0"/>
+          </a:p>
+        </p:txBody>
+      </p:sp>
+      <p:sp>
+        <p:nvSpPr>
+          <p:cNvPr id="3074" name="Rectangle 2"/>
+          <p:cNvSpPr>
+            <a:spLocks noChangeArrowheads="1"/>
+          </p:cNvSpPr>
+          <p:nvPr/>
+        </p:nvSpPr>
+        <p:spPr bwMode="auto">
+          <a:xfrm>
+            <a:off x="0" y="0"/>
+            <a:ext cx="9144000" cy="457200"/>
+          </a:xfrm>
+          <a:prstGeom prst="rect">
+            <a:avLst/>
+          </a:prstGeom>
+          <a:noFill/>
+          <a:ln w="9525">
+            <a:noFill/>
+            <a:miter lim="800000"/>
+            <a:headEnd/>
+            <a:tailEnd/>
+          </a:ln>
+          <a:effectLst/>
+        </p:spPr>
+        <p:txBody>
+          <a:bodyPr vert="horz" wrap="none" lIns="91440" tIns="45720" rIns="91440" bIns="45720" numCol="1" anchor="ctr" anchorCtr="0" compatLnSpc="1">
+            <a:prstTxWarp prst="textNoShape">
+              <a:avLst/>
+            </a:prstTxWarp>
+            <a:spAutoFit/>
+          </a:bodyPr>
+          <a:lstStyle/>
+          <a:p>
+            <a:endParaRPr lang="en-US"/>
+          </a:p>
+        </p:txBody>
+      </p:sp>
+      <p:sp>
+        <p:nvSpPr>
+          <p:cNvPr id="3076" name="Rectangle 4"/>
+          <p:cNvSpPr>
+            <a:spLocks noChangeArrowheads="1"/>
+          </p:cNvSpPr>
+          <p:nvPr/>
+        </p:nvSpPr>
+        <p:spPr bwMode="auto">
+          <a:xfrm>
+            <a:off x="0" y="0"/>
+            <a:ext cx="9144000" cy="457200"/>
+          </a:xfrm>
+          <a:prstGeom prst="rect">
+            <a:avLst/>
+          </a:prstGeom>
+          <a:noFill/>
+          <a:ln w="9525">
+            <a:noFill/>
+            <a:miter lim="800000"/>
+            <a:headEnd/>
+            <a:tailEnd/>
+          </a:ln>
+          <a:effectLst/>
+        </p:spPr>
+        <p:txBody>
+          <a:bodyPr vert="horz" wrap="none" lIns="91440" tIns="45720" rIns="91440" bIns="45720" numCol="1" anchor="ctr" anchorCtr="0" compatLnSpc="1">
+            <a:prstTxWarp prst="textNoShape">
+              <a:avLst/>
+            </a:prstTxWarp>
+            <a:spAutoFit/>
+          </a:bodyPr>
+          <a:lstStyle/>
+          <a:p>
+            <a:endParaRPr lang="en-US"/>
+          </a:p>
+        </p:txBody>
+      </p:sp>
+      <p:sp>
+        <p:nvSpPr>
+          <p:cNvPr id="3078" name="Rectangle 6"/>
+          <p:cNvSpPr>
+            <a:spLocks noChangeArrowheads="1"/>
+          </p:cNvSpPr>
+          <p:nvPr/>
+        </p:nvSpPr>
+        <p:spPr bwMode="auto">
+          <a:xfrm>
+            <a:off x="0" y="0"/>
+            <a:ext cx="9144000" cy="457200"/>
+          </a:xfrm>
+          <a:prstGeom prst="rect">
+            <a:avLst/>
+          </a:prstGeom>
+          <a:noFill/>
+          <a:ln w="9525">
+            <a:noFill/>
+            <a:miter lim="800000"/>
+            <a:headEnd/>
+            <a:tailEnd/>
+          </a:ln>
+          <a:effectLst/>
+        </p:spPr>
+        <p:txBody>
+          <a:bodyPr vert="horz" wrap="none" lIns="91440" tIns="45720" rIns="91440" bIns="45720" numCol="1" anchor="ctr" anchorCtr="0" compatLnSpc="1">
+            <a:prstTxWarp prst="textNoShape">
+              <a:avLst/>
+            </a:prstTxWarp>
+            <a:spAutoFit/>
+          </a:bodyPr>
+          <a:lstStyle/>
+          <a:p>
+            <a:endParaRPr lang="en-US"/>
+          </a:p>
+        </p:txBody>
+      </p:sp>
+    </p:spTree>
+  </p:cSld>
+  <p:clrMapOvr>
+    <a:masterClrMapping/>
+  </p:clrMapOvr>
+</p:sld>
+</file>
+
+<file path=ppt/slides/slide12.xml><?xml version="1.0" encoding="utf-8"?>
+<p:sld xmlns:a="http://schemas.openxmlformats.org/drawingml/2006/main" xmlns:r="http://schemas.openxmlformats.org/officeDocument/2006/relationships" xmlns:p="http://schemas.openxmlformats.org/presentationml/2006/main">
+  <p:cSld>
+    <p:spTree>
+      <p:nvGrpSpPr>
+        <p:cNvPr id="1" name=""/>
+        <p:cNvGrpSpPr/>
+        <p:nvPr/>
+      </p:nvGrpSpPr>
+      <p:grpSpPr>
+        <a:xfrm>
+          <a:off x="0" y="0"/>
+          <a:ext cx="0" cy="0"/>
+          <a:chOff x="0" y="0"/>
+          <a:chExt cx="0" cy="0"/>
+        </a:xfrm>
+      </p:grpSpPr>
+      <p:sp>
+        <p:nvSpPr>
+          <p:cNvPr id="2" name="Title 1"/>
+          <p:cNvSpPr>
+            <a:spLocks noGrp="1"/>
+          </p:cNvSpPr>
+          <p:nvPr>
+            <p:ph type="title"/>
+          </p:nvPr>
+        </p:nvSpPr>
+        <p:spPr/>
+        <p:txBody>
+          <a:bodyPr/>
+          <a:lstStyle/>
+          <a:p>
+            <a:r>
+              <a:rPr lang="en-US" dirty="0" err="1" smtClean="0"/>
+              <a:t>Mersenne</a:t>
+            </a:r>
+            <a:r>
+              <a:rPr lang="en-US" dirty="0" smtClean="0"/>
+              <a:t> Twister</a:t>
+            </a:r>
+            <a:endParaRPr lang="en-US" dirty="0"/>
+          </a:p>
+        </p:txBody>
+      </p:sp>
+      <p:sp>
+        <p:nvSpPr>
+          <p:cNvPr id="3" name="Content Placeholder 2"/>
+          <p:cNvSpPr>
+            <a:spLocks noGrp="1"/>
+          </p:cNvSpPr>
+          <p:nvPr>
+            <p:ph sz="quarter" idx="1"/>
+          </p:nvPr>
+        </p:nvSpPr>
+        <p:spPr/>
+        <p:txBody>
+          <a:bodyPr>
+            <a:normAutofit/>
+          </a:bodyPr>
+          <a:lstStyle/>
+          <a:p>
+            <a:r>
+              <a:rPr lang="en-US" dirty="0" smtClean="0"/>
+              <a:t>Strengths</a:t>
+            </a:r>
+            <a:r>
+              <a:rPr lang="en-US" dirty="0" smtClean="0"/>
+              <a:t>: Very large period, high quality </a:t>
+            </a:r>
+            <a:r>
+              <a:rPr lang="en-US" dirty="0" err="1" smtClean="0"/>
+              <a:t>equidistributed</a:t>
+            </a:r>
+            <a:r>
+              <a:rPr lang="en-US" dirty="0" smtClean="0"/>
+              <a:t> outputs</a:t>
+            </a:r>
+            <a:endParaRPr lang="en-US" dirty="0" smtClean="0"/>
+          </a:p>
+          <a:p>
+            <a:r>
+              <a:rPr lang="en-US" dirty="0" smtClean="0"/>
+              <a:t>Weaknesses</a:t>
+            </a:r>
+            <a:r>
+              <a:rPr lang="en-US" dirty="0" smtClean="0"/>
+              <a:t>: Complex and slow, requires a great deal of memory to store state, difficult to seed</a:t>
+            </a:r>
+            <a:endParaRPr lang="en-US" dirty="0" smtClean="0"/>
+          </a:p>
+          <a:p>
+            <a:endParaRPr lang="es-ES" dirty="0" smtClean="0"/>
+          </a:p>
+        </p:txBody>
+      </p:sp>
+      <p:sp>
+        <p:nvSpPr>
+          <p:cNvPr id="3074" name="Rectangle 2"/>
+          <p:cNvSpPr>
+            <a:spLocks noChangeArrowheads="1"/>
+          </p:cNvSpPr>
+          <p:nvPr/>
+        </p:nvSpPr>
+        <p:spPr bwMode="auto">
+          <a:xfrm>
+            <a:off x="0" y="0"/>
+            <a:ext cx="9144000" cy="457200"/>
+          </a:xfrm>
+          <a:prstGeom prst="rect">
+            <a:avLst/>
+          </a:prstGeom>
+          <a:noFill/>
+          <a:ln w="9525">
+            <a:noFill/>
+            <a:miter lim="800000"/>
+            <a:headEnd/>
+            <a:tailEnd/>
+          </a:ln>
+          <a:effectLst/>
+        </p:spPr>
+        <p:txBody>
+          <a:bodyPr vert="horz" wrap="none" lIns="91440" tIns="45720" rIns="91440" bIns="45720" numCol="1" anchor="ctr" anchorCtr="0" compatLnSpc="1">
+            <a:prstTxWarp prst="textNoShape">
+              <a:avLst/>
+            </a:prstTxWarp>
+            <a:spAutoFit/>
+          </a:bodyPr>
+          <a:lstStyle/>
+          <a:p>
+            <a:endParaRPr lang="en-US"/>
+          </a:p>
+        </p:txBody>
+      </p:sp>
+      <p:sp>
+        <p:nvSpPr>
+          <p:cNvPr id="3076" name="Rectangle 4"/>
+          <p:cNvSpPr>
+            <a:spLocks noChangeArrowheads="1"/>
+          </p:cNvSpPr>
+          <p:nvPr/>
+        </p:nvSpPr>
+        <p:spPr bwMode="auto">
+          <a:xfrm>
+            <a:off x="0" y="0"/>
+            <a:ext cx="9144000" cy="457200"/>
+          </a:xfrm>
+          <a:prstGeom prst="rect">
+            <a:avLst/>
+          </a:prstGeom>
+          <a:noFill/>
+          <a:ln w="9525">
+            <a:noFill/>
+            <a:miter lim="800000"/>
+            <a:headEnd/>
+            <a:tailEnd/>
+          </a:ln>
+          <a:effectLst/>
+        </p:spPr>
+        <p:txBody>
+          <a:bodyPr vert="horz" wrap="none" lIns="91440" tIns="45720" rIns="91440" bIns="45720" numCol="1" anchor="ctr" anchorCtr="0" compatLnSpc="1">
+            <a:prstTxWarp prst="textNoShape">
+              <a:avLst/>
+            </a:prstTxWarp>
+            <a:spAutoFit/>
+          </a:bodyPr>
+          <a:lstStyle/>
+          <a:p>
+            <a:endParaRPr lang="en-US"/>
+          </a:p>
+        </p:txBody>
+      </p:sp>
+      <p:sp>
+        <p:nvSpPr>
+          <p:cNvPr id="3078" name="Rectangle 6"/>
+          <p:cNvSpPr>
+            <a:spLocks noChangeArrowheads="1"/>
+          </p:cNvSpPr>
+          <p:nvPr/>
+        </p:nvSpPr>
+        <p:spPr bwMode="auto">
+          <a:xfrm>
+            <a:off x="0" y="0"/>
+            <a:ext cx="9144000" cy="457200"/>
+          </a:xfrm>
+          <a:prstGeom prst="rect">
+            <a:avLst/>
+          </a:prstGeom>
+          <a:noFill/>
+          <a:ln w="9525">
+            <a:noFill/>
+            <a:miter lim="800000"/>
+            <a:headEnd/>
+            <a:tailEnd/>
+          </a:ln>
+          <a:effectLst/>
+        </p:spPr>
+        <p:txBody>
+          <a:bodyPr vert="horz" wrap="none" lIns="91440" tIns="45720" rIns="91440" bIns="45720" numCol="1" anchor="ctr" anchorCtr="0" compatLnSpc="1">
+            <a:prstTxWarp prst="textNoShape">
+              <a:avLst/>
+            </a:prstTxWarp>
+            <a:spAutoFit/>
+          </a:bodyPr>
+          <a:lstStyle/>
+          <a:p>
+            <a:endParaRPr lang="en-US"/>
+          </a:p>
+        </p:txBody>
+      </p:sp>
+    </p:spTree>
+  </p:cSld>
+  <p:clrMapOvr>
+    <a:masterClrMapping/>
+  </p:clrMapOvr>
+</p:sld>
+</file>
+
+<file path=ppt/slides/slide13.xml><?xml version="1.0" encoding="utf-8"?>
+<p:sld xmlns:a="http://schemas.openxmlformats.org/drawingml/2006/main" xmlns:r="http://schemas.openxmlformats.org/officeDocument/2006/relationships" xmlns:p="http://schemas.openxmlformats.org/presentationml/2006/main">
+  <p:cSld>
+    <p:spTree>
+      <p:nvGrpSpPr>
+        <p:cNvPr id="1" name=""/>
+        <p:cNvGrpSpPr/>
+        <p:nvPr/>
+      </p:nvGrpSpPr>
+      <p:grpSpPr>
+        <a:xfrm>
+          <a:off x="0" y="0"/>
+          <a:ext cx="0" cy="0"/>
+          <a:chOff x="0" y="0"/>
+          <a:chExt cx="0" cy="0"/>
+        </a:xfrm>
+      </p:grpSpPr>
+      <p:sp>
+        <p:nvSpPr>
+          <p:cNvPr id="2" name="Title 1"/>
+          <p:cNvSpPr>
+            <a:spLocks noGrp="1"/>
+          </p:cNvSpPr>
+          <p:nvPr>
+            <p:ph type="title"/>
+          </p:nvPr>
+        </p:nvSpPr>
+        <p:spPr/>
+        <p:txBody>
+          <a:bodyPr/>
+          <a:lstStyle/>
+          <a:p>
+            <a:r>
+              <a:rPr lang="en-US" dirty="0" smtClean="0"/>
+              <a:t>Results</a:t>
+            </a:r>
+            <a:endParaRPr lang="en-US" dirty="0"/>
+          </a:p>
+        </p:txBody>
+      </p:sp>
+      <p:sp>
+        <p:nvSpPr>
+          <p:cNvPr id="3" name="Content Placeholder 2"/>
+          <p:cNvSpPr>
+            <a:spLocks noGrp="1"/>
+          </p:cNvSpPr>
+          <p:nvPr>
+            <p:ph sz="quarter" idx="1"/>
+          </p:nvPr>
+        </p:nvSpPr>
+        <p:spPr/>
+        <p:txBody>
+          <a:bodyPr/>
+          <a:lstStyle/>
+          <a:p>
+            <a:endParaRPr lang="en-US" dirty="0"/>
+          </a:p>
+        </p:txBody>
+      </p:sp>
+    </p:spTree>
+  </p:cSld>
+  <p:clrMapOvr>
+    <a:masterClrMapping/>
+  </p:clrMapOvr>
+</p:sld>
+</file>
+
+<file path=ppt/slides/slide14.xml><?xml version="1.0" encoding="utf-8"?>
+<p:sld xmlns:a="http://schemas.openxmlformats.org/drawingml/2006/main" xmlns:r="http://schemas.openxmlformats.org/officeDocument/2006/relationships" xmlns:p="http://schemas.openxmlformats.org/presentationml/2006/main">
+  <p:cSld>
+    <p:spTree>
+      <p:nvGrpSpPr>
+        <p:cNvPr id="1" name=""/>
+        <p:cNvGrpSpPr/>
+        <p:nvPr/>
+      </p:nvGrpSpPr>
+      <p:grpSpPr>
+        <a:xfrm>
+          <a:off x="0" y="0"/>
+          <a:ext cx="0" cy="0"/>
+          <a:chOff x="0" y="0"/>
+          <a:chExt cx="0" cy="0"/>
+        </a:xfrm>
+      </p:grpSpPr>
+      <p:sp>
+        <p:nvSpPr>
+          <p:cNvPr id="2" name="Title 1"/>
+          <p:cNvSpPr>
+            <a:spLocks noGrp="1"/>
+          </p:cNvSpPr>
+          <p:nvPr>
+            <p:ph type="title"/>
+          </p:nvPr>
+        </p:nvSpPr>
+        <p:spPr/>
+        <p:txBody>
+          <a:bodyPr/>
+          <a:lstStyle/>
+          <a:p>
+            <a:r>
               <a:rPr lang="en-US" dirty="0" smtClean="0"/>
               <a:t>Conclusion</a:t>
             </a:r>
@@ -4197,7 +5581,7 @@
           <a:p>
             <a:r>
               <a:rPr lang="en-US" dirty="0" smtClean="0"/>
-              <a:t>Weaknesses: Short period, outputs are planar and have poor distribution</a:t>
+              <a:t>Weaknesses: Short period, outputs are planar and of poor quality</a:t>
             </a:r>
           </a:p>
         </p:txBody>
@@ -4243,8 +5627,8 @@
           <a:lstStyle/>
           <a:p>
             <a:r>
-              <a:rPr lang="en-US" dirty="0" err="1" smtClean="0"/>
-              <a:t>Xorshift</a:t>
+              <a:rPr lang="en-US" dirty="0" smtClean="0"/>
+              <a:t>Linear Congruent</a:t>
             </a:r>
             <a:endParaRPr lang="en-US" dirty="0"/>
           </a:p>
@@ -4267,43 +5651,49 @@
           <a:p>
             <a:r>
               <a:rPr lang="en-US" dirty="0" smtClean="0"/>
-              <a:t>In general, </a:t>
-            </a:r>
-            <a:r>
-              <a:rPr lang="en-US" dirty="0" smtClean="0"/>
-              <a:t>s</a:t>
-            </a:r>
-            <a:r>
-              <a:rPr lang="en-US" dirty="0" smtClean="0"/>
-              <a:t>equence produced by shifting and </a:t>
-            </a:r>
-            <a:r>
-              <a:rPr lang="en-US" dirty="0" err="1" smtClean="0"/>
-              <a:t>XORing</a:t>
-            </a:r>
-            <a:r>
-              <a:rPr lang="en-US" dirty="0" smtClean="0"/>
-              <a:t> together past values</a:t>
-            </a:r>
-          </a:p>
-          <a:p>
-            <a:endParaRPr lang="en-US" dirty="0" smtClean="0"/>
-          </a:p>
-          <a:p>
-            <a:r>
-              <a:rPr lang="en-US" dirty="0" smtClean="0"/>
-              <a:t>Strengths: Stores relatively little state, fast performance, good period to performance ratio, generally high quality outputs</a:t>
-            </a:r>
-          </a:p>
-          <a:p>
-            <a:r>
-              <a:rPr lang="en-US" dirty="0" smtClean="0"/>
-              <a:t>Weaknesses: Overall short period length</a:t>
-            </a:r>
-            <a:endParaRPr lang="en-US" dirty="0"/>
-          </a:p>
-        </p:txBody>
-      </p:sp>
+              <a:t>Overall outputs appear to be uniformly distributed</a:t>
+            </a:r>
+          </a:p>
+          <a:p>
+            <a:r>
+              <a:rPr lang="en-US" dirty="0" smtClean="0"/>
+              <a:t>Strong correlation between consecutive outputs</a:t>
+            </a:r>
+          </a:p>
+          <a:p>
+            <a:r>
+              <a:rPr lang="en-US" dirty="0" smtClean="0"/>
+              <a:t>Plotting consecutive outputs as ordered triples in 3-space reveals planar pattern</a:t>
+            </a:r>
+          </a:p>
+        </p:txBody>
+      </p:sp>
+      <p:pic>
+        <p:nvPicPr>
+          <p:cNvPr id="23554" name="Picture 2" descr="http://upload.wikimedia.org/wikipedia/commons/3/38/Randu.png"/>
+          <p:cNvPicPr>
+            <a:picLocks noChangeAspect="1" noChangeArrowheads="1"/>
+          </p:cNvPicPr>
+          <p:nvPr/>
+        </p:nvPicPr>
+        <p:blipFill>
+          <a:blip r:embed="rId2"/>
+          <a:srcRect/>
+          <a:stretch>
+            <a:fillRect/>
+          </a:stretch>
+        </p:blipFill>
+        <p:spPr bwMode="auto">
+          <a:xfrm>
+            <a:off x="1570704" y="3257848"/>
+            <a:ext cx="6121400" cy="3371552"/>
+          </a:xfrm>
+          <a:prstGeom prst="rect">
+            <a:avLst/>
+          </a:prstGeom>
+          <a:noFill/>
+        </p:spPr>
+      </p:pic>
     </p:spTree>
   </p:cSld>
   <p:clrMapOvr>
@@ -4345,8 +5735,8 @@
           <a:lstStyle/>
           <a:p>
             <a:r>
-              <a:rPr lang="en-US" dirty="0" smtClean="0"/>
-              <a:t>Lagged Fibonacci</a:t>
+              <a:rPr lang="en-US" dirty="0" err="1" smtClean="0"/>
+              <a:t>Xorshift</a:t>
             </a:r>
             <a:endParaRPr lang="en-US" dirty="0"/>
           </a:p>
@@ -4368,86 +5758,38 @@
           <a:lstStyle/>
           <a:p>
             <a:r>
-              <a:rPr lang="pt-BR" dirty="0" smtClean="0"/>
-              <a:t>Has the general form:</a:t>
-            </a:r>
-            <a:br>
-              <a:rPr lang="pt-BR" dirty="0" smtClean="0"/>
-            </a:br>
-            <a:r>
-              <a:rPr lang="pt-BR" dirty="0" smtClean="0"/>
-              <a:t>	X</a:t>
-            </a:r>
-            <a:r>
-              <a:rPr lang="pt-BR" baseline="-25000" dirty="0" smtClean="0"/>
-              <a:t>n</a:t>
-            </a:r>
-            <a:r>
-              <a:rPr lang="pt-BR" dirty="0" smtClean="0"/>
-              <a:t> = </a:t>
-            </a:r>
-            <a:r>
-              <a:rPr lang="pt-BR" dirty="0" smtClean="0"/>
-              <a:t>(</a:t>
-            </a:r>
-            <a:r>
-              <a:rPr lang="pt-BR" dirty="0" smtClean="0"/>
-              <a:t>X</a:t>
-            </a:r>
-            <a:r>
-              <a:rPr lang="pt-BR" baseline="-25000" dirty="0" smtClean="0"/>
-              <a:t>n</a:t>
-            </a:r>
-            <a:r>
-              <a:rPr lang="pt-BR" baseline="-25000" dirty="0" smtClean="0"/>
-              <a:t>−r</a:t>
-            </a:r>
-            <a:r>
-              <a:rPr lang="pt-BR" dirty="0" smtClean="0"/>
-              <a:t> </a:t>
-            </a:r>
-            <a:r>
-              <a:rPr lang="pt-BR" dirty="0" smtClean="0"/>
-              <a:t>* X</a:t>
-            </a:r>
-            <a:r>
-              <a:rPr lang="pt-BR" baseline="-25000" dirty="0" smtClean="0"/>
-              <a:t>n</a:t>
-            </a:r>
-            <a:r>
-              <a:rPr lang="pt-BR" baseline="-25000" dirty="0" smtClean="0"/>
-              <a:t>−</a:t>
-            </a:r>
-            <a:r>
-              <a:rPr lang="pt-BR" baseline="-25000" dirty="0" smtClean="0"/>
+              <a:rPr lang="en-US" dirty="0" smtClean="0"/>
+              <a:t>In general, </a:t>
+            </a:r>
+            <a:r>
+              <a:rPr lang="en-US" dirty="0" smtClean="0"/>
               <a:t>s</a:t>
             </a:r>
             <a:r>
-              <a:rPr lang="pt-BR" dirty="0" smtClean="0"/>
-              <a:t>) mod m, 0 &lt; s &lt; r</a:t>
-            </a:r>
-          </a:p>
-          <a:p>
-            <a:r>
-              <a:rPr lang="en-US" dirty="0" smtClean="0"/>
-              <a:t>Strengths</a:t>
-            </a:r>
-            <a:r>
-              <a:rPr lang="en-US" dirty="0" smtClean="0"/>
-              <a:t>: Generally fast performance, flexible</a:t>
-            </a:r>
-            <a:endParaRPr lang="en-US" dirty="0" smtClean="0"/>
-          </a:p>
-          <a:p>
-            <a:r>
-              <a:rPr lang="en-US" dirty="0" smtClean="0"/>
-              <a:t>Weaknesses</a:t>
-            </a:r>
-            <a:r>
-              <a:rPr lang="en-US" dirty="0" smtClean="0"/>
-              <a:t>: Stores a sizeable amount of state, output quality highly dependent on seeding method and parameter selection</a:t>
-            </a:r>
-            <a:endParaRPr lang="en-US" dirty="0" smtClean="0"/>
+              <a:rPr lang="en-US" dirty="0" smtClean="0"/>
+              <a:t>equence produced by shifting and </a:t>
+            </a:r>
+            <a:r>
+              <a:rPr lang="en-US" dirty="0" err="1" smtClean="0"/>
+              <a:t>XORing</a:t>
+            </a:r>
+            <a:r>
+              <a:rPr lang="en-US" dirty="0" smtClean="0"/>
+              <a:t> together past values</a:t>
+            </a:r>
+          </a:p>
+          <a:p>
+            <a:r>
+              <a:rPr lang="en-US" dirty="0" smtClean="0"/>
+              <a:t>Strengths: Stores relatively little state, fast performance, good period to performance ratio, generally high quality outputs</a:t>
+            </a:r>
+          </a:p>
+          <a:p>
+            <a:r>
+              <a:rPr lang="en-US" dirty="0" smtClean="0"/>
+              <a:t>Weaknesses: Overall short period length</a:t>
+            </a:r>
+            <a:endParaRPr lang="en-US" dirty="0"/>
           </a:p>
         </p:txBody>
       </p:sp>
@@ -4493,7 +5835,7 @@
           <a:p>
             <a:r>
               <a:rPr lang="en-US" dirty="0" smtClean="0"/>
-              <a:t>Multiply with Carry</a:t>
+              <a:t>Lagged Fibonacci</a:t>
             </a:r>
             <a:endParaRPr lang="en-US" dirty="0"/>
           </a:p>
@@ -4527,7 +5869,27 @@
             </a:r>
             <a:r>
               <a:rPr lang="pt-BR" baseline="-25000" dirty="0" smtClean="0"/>
-              <a:t>n+1</a:t>
+              <a:t>n</a:t>
+            </a:r>
+            <a:r>
+              <a:rPr lang="pt-BR" dirty="0" smtClean="0"/>
+              <a:t> = </a:t>
+            </a:r>
+            <a:r>
+              <a:rPr lang="pt-BR" dirty="0" smtClean="0"/>
+              <a:t>(</a:t>
+            </a:r>
+            <a:r>
+              <a:rPr lang="pt-BR" dirty="0" smtClean="0"/>
+              <a:t>X</a:t>
+            </a:r>
+            <a:r>
+              <a:rPr lang="pt-BR" baseline="-25000" dirty="0" smtClean="0"/>
+              <a:t>n</a:t>
+            </a:r>
+            <a:r>
+              <a:rPr lang="pt-BR" baseline="-25000" dirty="0" smtClean="0"/>
+              <a:t>−r</a:t>
             </a:r>
             <a:r>
               <a:rPr lang="pt-BR" dirty="0" smtClean="0"/>
@@ -4535,11 +5897,7 @@
             </a:r>
             <a:r>
               <a:rPr lang="pt-BR" dirty="0" smtClean="0"/>
-              <a:t>= (</a:t>
-            </a:r>
-            <a:r>
-              <a:rPr lang="pt-BR" dirty="0" smtClean="0"/>
-              <a:t>aX</a:t>
+              <a:t>* X</a:t>
             </a:r>
             <a:r>
               <a:rPr lang="pt-BR" baseline="-25000" dirty="0" smtClean="0"/>
@@ -4547,84 +5905,21 @@
             </a:r>
             <a:r>
               <a:rPr lang="pt-BR" baseline="-25000" dirty="0" smtClean="0"/>
-              <a:t>−r</a:t>
+              <a:t>−</a:t>
+            </a:r>
+            <a:r>
+              <a:rPr lang="pt-BR" baseline="-25000" dirty="0" smtClean="0"/>
+              <a:t>s</a:t>
             </a:r>
             <a:r>
               <a:rPr lang="pt-BR" dirty="0" smtClean="0"/>
-              <a:t> + </a:t>
-            </a:r>
+              <a:t>) mod m, 0 &lt; s &lt; r</a:t>
+            </a:r>
+          </a:p>
+          <a:p>
             <a:r>
               <a:rPr lang="pt-BR" dirty="0" smtClean="0"/>
-              <a:t>c</a:t>
-            </a:r>
-            <a:r>
-              <a:rPr lang="pt-BR" baseline="-25000" dirty="0" smtClean="0"/>
-              <a:t>n</a:t>
-            </a:r>
-            <a:r>
-              <a:rPr lang="pt-BR" dirty="0" smtClean="0"/>
-              <a:t>) </a:t>
-            </a:r>
-            <a:r>
-              <a:rPr lang="pt-BR" dirty="0" smtClean="0"/>
-              <a:t>mod </a:t>
-            </a:r>
-            <a:r>
-              <a:rPr lang="pt-BR" dirty="0" smtClean="0"/>
-              <a:t>m</a:t>
-            </a:r>
-          </a:p>
-          <a:p>
-            <a:r>
-              <a:rPr lang="pt-BR" dirty="0" smtClean="0"/>
-              <a:t>In practice, Complementary Multiply with Carry is used:</a:t>
-            </a:r>
-            <a:r>
-              <a:rPr lang="pt-BR" dirty="0" smtClean="0"/>
-              <a:t/>
-            </a:r>
-            <a:br>
-              <a:rPr lang="pt-BR" dirty="0" smtClean="0"/>
-            </a:br>
-            <a:r>
-              <a:rPr lang="pt-BR" dirty="0" smtClean="0"/>
-              <a:t>	X</a:t>
-            </a:r>
-            <a:r>
-              <a:rPr lang="pt-BR" baseline="-25000" dirty="0" smtClean="0"/>
-              <a:t>n+1</a:t>
-            </a:r>
-            <a:r>
-              <a:rPr lang="pt-BR" dirty="0" smtClean="0"/>
-              <a:t> = </a:t>
-            </a:r>
-            <a:r>
-              <a:rPr lang="pt-BR" dirty="0" smtClean="0"/>
-              <a:t>(b - 1) - (aX</a:t>
-            </a:r>
-            <a:r>
-              <a:rPr lang="pt-BR" baseline="-25000" dirty="0" smtClean="0"/>
-              <a:t>n</a:t>
-            </a:r>
-            <a:r>
-              <a:rPr lang="pt-BR" baseline="-25000" dirty="0" smtClean="0"/>
-              <a:t>−r</a:t>
-            </a:r>
-            <a:r>
-              <a:rPr lang="pt-BR" dirty="0" smtClean="0"/>
-              <a:t> + c</a:t>
-            </a:r>
-            <a:r>
-              <a:rPr lang="pt-BR" baseline="-25000" dirty="0" smtClean="0"/>
-              <a:t>n</a:t>
-            </a:r>
-            <a:r>
-              <a:rPr lang="pt-BR" dirty="0" smtClean="0"/>
-              <a:t>) mod </a:t>
-            </a:r>
-            <a:r>
-              <a:rPr lang="pt-BR" dirty="0" smtClean="0"/>
-              <a:t>m</a:t>
+              <a:t>r and s are lag parameters and determine the size of the state space and * can be any operation</a:t>
             </a:r>
           </a:p>
           <a:p>
@@ -4634,7 +5929,7 @@
             </a:r>
             <a:r>
               <a:rPr lang="en-US" dirty="0" smtClean="0"/>
-              <a:t>: Very long period, relatively fast, high quality outputs</a:t>
+              <a:t>: Generally fast performance, flexible</a:t>
             </a:r>
             <a:endParaRPr lang="en-US" dirty="0" smtClean="0"/>
           </a:p>
@@ -4645,15 +5940,9 @@
             </a:r>
             <a:r>
               <a:rPr lang="en-US" dirty="0" smtClean="0"/>
-              <a:t>: Stores a fair amount of state, difficult to seed</a:t>
+              <a:t>: Stores a sizeable amount of state, output quality highly dependent on seeding method and parameter selection</a:t>
             </a:r>
             <a:endParaRPr lang="en-US" dirty="0" smtClean="0"/>
-          </a:p>
-          <a:p>
-            <a:endParaRPr lang="pt-BR" dirty="0" smtClean="0"/>
-          </a:p>
-          <a:p>
-            <a:endParaRPr lang="en-US" dirty="0"/>
           </a:p>
         </p:txBody>
       </p:sp>
@@ -4698,391 +5987,160 @@
           <a:lstStyle/>
           <a:p>
             <a:r>
+              <a:rPr lang="en-US" dirty="0" smtClean="0"/>
+              <a:t>Lagged </a:t>
+            </a:r>
+            <a:r>
+              <a:rPr lang="en-US" dirty="0" smtClean="0"/>
+              <a:t>Fibonacci</a:t>
+            </a:r>
+            <a:endParaRPr lang="en-US" dirty="0"/>
+          </a:p>
+        </p:txBody>
+      </p:sp>
+      <p:sp>
+        <p:nvSpPr>
+          <p:cNvPr id="3" name="Content Placeholder 2"/>
+          <p:cNvSpPr>
+            <a:spLocks noGrp="1"/>
+          </p:cNvSpPr>
+          <p:nvPr>
+            <p:ph sz="quarter" idx="1"/>
+          </p:nvPr>
+        </p:nvSpPr>
+        <p:spPr/>
+        <p:txBody>
+          <a:bodyPr/>
+          <a:lstStyle/>
+          <a:p>
+            <a:r>
+              <a:rPr lang="pt-BR" dirty="0" smtClean="0"/>
+              <a:t>Subtract with Carry variant has form:</a:t>
+            </a:r>
+            <a:br>
+              <a:rPr lang="pt-BR" dirty="0" smtClean="0"/>
+            </a:br>
+            <a:r>
+              <a:rPr lang="pt-BR" dirty="0" smtClean="0"/>
+              <a:t>	X</a:t>
+            </a:r>
+            <a:r>
+              <a:rPr lang="pt-BR" baseline="-25000" dirty="0" smtClean="0"/>
+              <a:t>n</a:t>
+            </a:r>
+            <a:r>
+              <a:rPr lang="pt-BR" dirty="0" smtClean="0"/>
+              <a:t> = </a:t>
+            </a:r>
+            <a:r>
+              <a:rPr lang="pt-BR" dirty="0" smtClean="0"/>
+              <a:t>(</a:t>
+            </a:r>
+            <a:r>
+              <a:rPr lang="pt-BR" dirty="0" smtClean="0"/>
+              <a:t>X</a:t>
+            </a:r>
+            <a:r>
+              <a:rPr lang="pt-BR" baseline="-25000" dirty="0" smtClean="0"/>
+              <a:t>n</a:t>
+            </a:r>
+            <a:r>
+              <a:rPr lang="pt-BR" baseline="-25000" dirty="0" smtClean="0"/>
+              <a:t>−r</a:t>
+            </a:r>
+            <a:r>
+              <a:rPr lang="pt-BR" dirty="0" smtClean="0"/>
+              <a:t> -</a:t>
+            </a:r>
+            <a:r>
+              <a:rPr lang="pt-BR" dirty="0" smtClean="0"/>
+              <a:t> X</a:t>
+            </a:r>
+            <a:r>
+              <a:rPr lang="pt-BR" baseline="-25000" dirty="0" smtClean="0"/>
+              <a:t>n</a:t>
+            </a:r>
+            <a:r>
+              <a:rPr lang="pt-BR" baseline="-25000" dirty="0" smtClean="0"/>
+              <a:t>−</a:t>
+            </a:r>
+            <a:r>
+              <a:rPr lang="pt-BR" baseline="-25000" dirty="0" smtClean="0"/>
+              <a:t>s </a:t>
+            </a:r>
+            <a:r>
+              <a:rPr lang="pt-BR" dirty="0" smtClean="0"/>
+              <a:t>– c</a:t>
+            </a:r>
+            <a:r>
+              <a:rPr lang="pt-BR" baseline="-25000" dirty="0" smtClean="0"/>
+              <a:t>n-1</a:t>
+            </a:r>
+            <a:r>
+              <a:rPr lang="pt-BR" dirty="0" smtClean="0"/>
+              <a:t>) mod m, 0 &lt; s &lt; r</a:t>
+            </a:r>
+          </a:p>
+          <a:p>
+            <a:r>
               <a:rPr lang="en-US" dirty="0" err="1" smtClean="0"/>
-              <a:t>Mersenne</a:t>
-            </a:r>
-            <a:r>
-              <a:rPr lang="en-US" dirty="0" smtClean="0"/>
-              <a:t> Twister</a:t>
-            </a:r>
-            <a:endParaRPr lang="en-US" dirty="0"/>
-          </a:p>
-        </p:txBody>
-      </p:sp>
-      <p:sp>
-        <p:nvSpPr>
-          <p:cNvPr id="3" name="Content Placeholder 2"/>
-          <p:cNvSpPr>
-            <a:spLocks noGrp="1"/>
-          </p:cNvSpPr>
-          <p:nvPr>
-            <p:ph sz="quarter" idx="1"/>
-          </p:nvPr>
-        </p:nvSpPr>
-        <p:spPr/>
-        <p:txBody>
-          <a:bodyPr>
-            <a:normAutofit/>
-          </a:bodyPr>
-          <a:lstStyle/>
-          <a:p>
-            <a:r>
-              <a:rPr lang="en-US" dirty="0" smtClean="0"/>
-              <a:t>Underlying state sequence has form:</a:t>
-            </a:r>
-            <a:br>
-              <a:rPr lang="en-US" dirty="0" smtClean="0"/>
-            </a:br>
-            <a:r>
-              <a:rPr lang="en-US" dirty="0" smtClean="0"/>
-              <a:t>	</a:t>
-            </a:r>
-            <a:r>
-              <a:rPr lang="pl-PL" dirty="0" smtClean="0"/>
+              <a:t>c</a:t>
+            </a:r>
+            <a:r>
+              <a:rPr lang="en-US" baseline="-25000" dirty="0" err="1" smtClean="0"/>
+              <a:t>n</a:t>
+            </a:r>
+            <a:r>
+              <a:rPr lang="en-US" dirty="0" smtClean="0"/>
+              <a:t> = 1 if </a:t>
+            </a:r>
+            <a:r>
+              <a:rPr lang="pt-BR" dirty="0" smtClean="0"/>
               <a:t>X</a:t>
             </a:r>
             <a:r>
-              <a:rPr lang="pl-PL" baseline="-25000" dirty="0" smtClean="0"/>
-              <a:t>k+n</a:t>
-            </a:r>
-            <a:r>
-              <a:rPr lang="pl-PL" dirty="0" smtClean="0"/>
-              <a:t> = X</a:t>
-            </a:r>
-            <a:r>
-              <a:rPr lang="pl-PL" baseline="-25000" dirty="0" smtClean="0"/>
-              <a:t>k+m</a:t>
-            </a:r>
-            <a:r>
-              <a:rPr lang="pl-PL" dirty="0" smtClean="0"/>
-              <a:t> ⊕</a:t>
-            </a:r>
-            <a:r>
-              <a:rPr lang="en-US" dirty="0" smtClean="0"/>
-              <a:t>(</a:t>
-            </a:r>
-            <a:r>
-              <a:rPr lang="en-US" dirty="0" err="1" smtClean="0"/>
-              <a:t>X</a:t>
-            </a:r>
-            <a:r>
-              <a:rPr lang="en-US" baseline="30000" dirty="0" err="1" smtClean="0"/>
-              <a:t>u</a:t>
-            </a:r>
-            <a:r>
-              <a:rPr lang="en-US" baseline="-25000" dirty="0" err="1" smtClean="0"/>
-              <a:t>k</a:t>
-            </a:r>
-            <a:r>
-              <a:rPr lang="en-US" dirty="0" smtClean="0"/>
-              <a:t> | X</a:t>
-            </a:r>
-            <a:r>
-              <a:rPr lang="en-US" baseline="30000" dirty="0" smtClean="0"/>
-              <a:t>l</a:t>
-            </a:r>
-            <a:r>
-              <a:rPr lang="en-US" baseline="-25000" dirty="0" smtClean="0"/>
-              <a:t>k+1</a:t>
-            </a:r>
-            <a:r>
-              <a:rPr lang="en-US" dirty="0" smtClean="0"/>
-              <a:t>)A</a:t>
-            </a:r>
-          </a:p>
-          <a:p>
-            <a:r>
-              <a:rPr lang="en-US" dirty="0" smtClean="0"/>
-              <a:t>Results produced by a tempering function on the state:</a:t>
-            </a:r>
-            <a:br>
-              <a:rPr lang="en-US" dirty="0" smtClean="0"/>
-            </a:br>
-            <a:r>
-              <a:rPr lang="en-US" sz="2000" dirty="0" smtClean="0"/>
-              <a:t>	</a:t>
-            </a:r>
-            <a:r>
-              <a:rPr lang="es-ES" sz="2000" dirty="0" smtClean="0"/>
-              <a:t>y := x ⊕ (x &gt;&gt; u</a:t>
-            </a:r>
-            <a:r>
-              <a:rPr lang="es-ES" sz="2000" dirty="0" smtClean="0"/>
-              <a:t>)</a:t>
-            </a:r>
-            <a:br>
-              <a:rPr lang="es-ES" sz="2000" dirty="0" smtClean="0"/>
-            </a:br>
-            <a:r>
-              <a:rPr lang="es-ES" sz="2000" dirty="0" smtClean="0"/>
-              <a:t>	</a:t>
-            </a:r>
-            <a:r>
-              <a:rPr lang="es-ES" sz="2000" dirty="0" smtClean="0"/>
-              <a:t>y := y ⊕ ((y &lt;&lt; s) · b</a:t>
-            </a:r>
-            <a:r>
-              <a:rPr lang="es-ES" sz="2000" dirty="0" smtClean="0"/>
-              <a:t>)</a:t>
-            </a:r>
-            <a:br>
-              <a:rPr lang="es-ES" sz="2000" dirty="0" smtClean="0"/>
-            </a:br>
-            <a:r>
-              <a:rPr lang="es-ES" sz="2000" dirty="0" smtClean="0"/>
-              <a:t>	y </a:t>
-            </a:r>
-            <a:r>
-              <a:rPr lang="es-ES" sz="2000" dirty="0" smtClean="0"/>
-              <a:t>:= y ⊕ ((y &lt;&lt; t) · c</a:t>
-            </a:r>
-            <a:r>
-              <a:rPr lang="es-ES" sz="2000" dirty="0" smtClean="0"/>
-              <a:t>)</a:t>
-            </a:r>
-            <a:br>
-              <a:rPr lang="es-ES" sz="2000" dirty="0" smtClean="0"/>
-            </a:br>
-            <a:r>
-              <a:rPr lang="es-ES" sz="2000" dirty="0" smtClean="0"/>
-              <a:t>	</a:t>
-            </a:r>
-            <a:r>
-              <a:rPr lang="es-ES" sz="2000" dirty="0" smtClean="0"/>
-              <a:t>y := y ⊕ (y &gt;&gt; l) </a:t>
-            </a:r>
-            <a:endParaRPr lang="pl-PL" sz="2000" dirty="0" smtClean="0"/>
-          </a:p>
-          <a:p>
-            <a:endParaRPr lang="es-ES" dirty="0" smtClean="0"/>
-          </a:p>
-        </p:txBody>
-      </p:sp>
-      <p:sp>
-        <p:nvSpPr>
-          <p:cNvPr id="3074" name="Rectangle 2"/>
-          <p:cNvSpPr>
-            <a:spLocks noChangeArrowheads="1"/>
-          </p:cNvSpPr>
-          <p:nvPr/>
-        </p:nvSpPr>
-        <p:spPr bwMode="auto">
-          <a:xfrm>
-            <a:off x="0" y="0"/>
-            <a:ext cx="9144000" cy="457200"/>
-          </a:xfrm>
-          <a:prstGeom prst="rect">
-            <a:avLst/>
-          </a:prstGeom>
-          <a:noFill/>
-          <a:ln w="9525">
-            <a:noFill/>
-            <a:miter lim="800000"/>
-            <a:headEnd/>
-            <a:tailEnd/>
-          </a:ln>
-          <a:effectLst/>
-        </p:spPr>
-        <p:txBody>
-          <a:bodyPr vert="horz" wrap="none" lIns="91440" tIns="45720" rIns="91440" bIns="45720" numCol="1" anchor="ctr" anchorCtr="0" compatLnSpc="1">
-            <a:prstTxWarp prst="textNoShape">
-              <a:avLst/>
-            </a:prstTxWarp>
-            <a:spAutoFit/>
-          </a:bodyPr>
-          <a:lstStyle/>
-          <a:p>
-            <a:endParaRPr lang="en-US"/>
-          </a:p>
-        </p:txBody>
-      </p:sp>
-      <p:pic>
-        <p:nvPicPr>
-          <p:cNvPr id="3073" name="Picture 1"/>
-          <p:cNvPicPr>
-            <a:picLocks noChangeAspect="1" noChangeArrowheads="1"/>
-          </p:cNvPicPr>
-          <p:nvPr/>
-        </p:nvPicPr>
-        <p:blipFill>
-          <a:blip r:embed="rId2">
-            <a:clrChange>
-              <a:clrFrom>
-                <a:srgbClr val="FFFFFF"/>
-              </a:clrFrom>
-              <a:clrTo>
-                <a:srgbClr val="FFFFFF">
-                  <a:alpha val="0"/>
-                </a:srgbClr>
-              </a:clrTo>
-            </a:clrChange>
-          </a:blip>
-          <a:srcRect/>
-          <a:stretch>
-            <a:fillRect/>
-          </a:stretch>
-        </p:blipFill>
-        <p:spPr bwMode="auto">
-          <a:xfrm>
-            <a:off x="0" y="457200"/>
-            <a:ext cx="171450" cy="190500"/>
-          </a:xfrm>
-          <a:prstGeom prst="rect">
-            <a:avLst/>
-          </a:prstGeom>
-          <a:noFill/>
-        </p:spPr>
-      </p:pic>
-      <p:sp>
-        <p:nvSpPr>
-          <p:cNvPr id="3076" name="Rectangle 4"/>
-          <p:cNvSpPr>
-            <a:spLocks noChangeArrowheads="1"/>
-          </p:cNvSpPr>
-          <p:nvPr/>
-        </p:nvSpPr>
-        <p:spPr bwMode="auto">
-          <a:xfrm>
-            <a:off x="0" y="0"/>
-            <a:ext cx="9144000" cy="457200"/>
-          </a:xfrm>
-          <a:prstGeom prst="rect">
-            <a:avLst/>
-          </a:prstGeom>
-          <a:noFill/>
-          <a:ln w="9525">
-            <a:noFill/>
-            <a:miter lim="800000"/>
-            <a:headEnd/>
-            <a:tailEnd/>
-          </a:ln>
-          <a:effectLst/>
-        </p:spPr>
-        <p:txBody>
-          <a:bodyPr vert="horz" wrap="none" lIns="91440" tIns="45720" rIns="91440" bIns="45720" numCol="1" anchor="ctr" anchorCtr="0" compatLnSpc="1">
-            <a:prstTxWarp prst="textNoShape">
-              <a:avLst/>
-            </a:prstTxWarp>
-            <a:spAutoFit/>
-          </a:bodyPr>
-          <a:lstStyle/>
-          <a:p>
-            <a:endParaRPr lang="en-US"/>
-          </a:p>
-        </p:txBody>
-      </p:sp>
-      <p:pic>
-        <p:nvPicPr>
-          <p:cNvPr id="3075" name="Picture 3"/>
-          <p:cNvPicPr>
-            <a:picLocks noChangeAspect="1" noChangeArrowheads="1"/>
-          </p:cNvPicPr>
-          <p:nvPr/>
-        </p:nvPicPr>
-        <p:blipFill>
-          <a:blip r:embed="rId2">
-            <a:clrChange>
-              <a:clrFrom>
-                <a:srgbClr val="FFFFFF"/>
-              </a:clrFrom>
-              <a:clrTo>
-                <a:srgbClr val="FFFFFF">
-                  <a:alpha val="0"/>
-                </a:srgbClr>
-              </a:clrTo>
-            </a:clrChange>
-          </a:blip>
-          <a:srcRect/>
-          <a:stretch>
-            <a:fillRect/>
-          </a:stretch>
-        </p:blipFill>
-        <p:spPr bwMode="auto">
-          <a:xfrm>
-            <a:off x="0" y="457200"/>
-            <a:ext cx="171450" cy="190500"/>
-          </a:xfrm>
-          <a:prstGeom prst="rect">
-            <a:avLst/>
-          </a:prstGeom>
-          <a:noFill/>
-        </p:spPr>
-      </p:pic>
-      <p:sp>
-        <p:nvSpPr>
-          <p:cNvPr id="3078" name="Rectangle 6"/>
-          <p:cNvSpPr>
-            <a:spLocks noChangeArrowheads="1"/>
-          </p:cNvSpPr>
-          <p:nvPr/>
-        </p:nvSpPr>
-        <p:spPr bwMode="auto">
-          <a:xfrm>
-            <a:off x="0" y="0"/>
-            <a:ext cx="9144000" cy="457200"/>
-          </a:xfrm>
-          <a:prstGeom prst="rect">
-            <a:avLst/>
-          </a:prstGeom>
-          <a:noFill/>
-          <a:ln w="9525">
-            <a:noFill/>
-            <a:miter lim="800000"/>
-            <a:headEnd/>
-            <a:tailEnd/>
-          </a:ln>
-          <a:effectLst/>
-        </p:spPr>
-        <p:txBody>
-          <a:bodyPr vert="horz" wrap="none" lIns="91440" tIns="45720" rIns="91440" bIns="45720" numCol="1" anchor="ctr" anchorCtr="0" compatLnSpc="1">
-            <a:prstTxWarp prst="textNoShape">
-              <a:avLst/>
-            </a:prstTxWarp>
-            <a:spAutoFit/>
-          </a:bodyPr>
-          <a:lstStyle/>
-          <a:p>
-            <a:endParaRPr lang="en-US"/>
-          </a:p>
-        </p:txBody>
-      </p:sp>
-      <p:pic>
-        <p:nvPicPr>
-          <p:cNvPr id="3077" name="Picture 5"/>
-          <p:cNvPicPr>
-            <a:picLocks noChangeAspect="1" noChangeArrowheads="1"/>
-          </p:cNvPicPr>
-          <p:nvPr/>
-        </p:nvPicPr>
-        <p:blipFill>
-          <a:blip r:embed="rId2">
-            <a:clrChange>
-              <a:clrFrom>
-                <a:srgbClr val="FFFFFF"/>
-              </a:clrFrom>
-              <a:clrTo>
-                <a:srgbClr val="FFFFFF">
-                  <a:alpha val="0"/>
-                </a:srgbClr>
-              </a:clrTo>
-            </a:clrChange>
-          </a:blip>
-          <a:srcRect/>
-          <a:stretch>
-            <a:fillRect/>
-          </a:stretch>
-        </p:blipFill>
-        <p:spPr bwMode="auto">
-          <a:xfrm>
-            <a:off x="0" y="457200"/>
-            <a:ext cx="171450" cy="190500"/>
-          </a:xfrm>
-          <a:prstGeom prst="rect">
-            <a:avLst/>
-          </a:prstGeom>
-          <a:noFill/>
-        </p:spPr>
-      </p:pic>
+              <a:rPr lang="pt-BR" baseline="-25000" dirty="0" smtClean="0"/>
+              <a:t>n−r</a:t>
+            </a:r>
+            <a:r>
+              <a:rPr lang="pt-BR" dirty="0" smtClean="0"/>
+              <a:t> - X</a:t>
+            </a:r>
+            <a:r>
+              <a:rPr lang="pt-BR" baseline="-25000" dirty="0" smtClean="0"/>
+              <a:t>n−s </a:t>
+            </a:r>
+            <a:r>
+              <a:rPr lang="pt-BR" dirty="0" smtClean="0"/>
+              <a:t>– c</a:t>
+            </a:r>
+            <a:r>
+              <a:rPr lang="pt-BR" baseline="-25000" dirty="0" smtClean="0"/>
+              <a:t>n-1 </a:t>
+            </a:r>
+            <a:r>
+              <a:rPr lang="pt-BR" baseline="-25000" dirty="0" smtClean="0"/>
+              <a:t> </a:t>
+            </a:r>
+            <a:r>
+              <a:rPr lang="en-US" dirty="0" smtClean="0"/>
+              <a:t>≥ 0, or 0 otherwise</a:t>
+            </a:r>
+          </a:p>
+          <a:p>
+            <a:r>
+              <a:rPr lang="en-US" dirty="0" smtClean="0"/>
+              <a:t>Additional state information allows for a greater period than conventional Lagged Fibonacci generators</a:t>
+            </a:r>
+          </a:p>
+          <a:p>
+            <a:r>
+              <a:rPr lang="en-US" dirty="0" smtClean="0"/>
+              <a:t>RANLUX variant further improves the quality of the output by discarding a number of values at regular periods, at the cost of performance</a:t>
+            </a:r>
+          </a:p>
+        </p:txBody>
+      </p:sp>
     </p:spTree>
   </p:cSld>
   <p:clrMapOvr>
@@ -5124,12 +6182,8 @@
           <a:lstStyle/>
           <a:p>
             <a:r>
-              <a:rPr lang="en-US" dirty="0" err="1" smtClean="0"/>
-              <a:t>Mersenne</a:t>
-            </a:r>
-            <a:r>
-              <a:rPr lang="en-US" dirty="0" smtClean="0"/>
-              <a:t> Twister</a:t>
+              <a:rPr lang="en-US" dirty="0" smtClean="0"/>
+              <a:t>Multiply with Carry</a:t>
             </a:r>
             <a:endParaRPr lang="en-US" dirty="0"/>
           </a:p>
@@ -5153,20 +6207,138 @@
           <a:lstStyle/>
           <a:p>
             <a:r>
+              <a:rPr lang="pt-BR" dirty="0" smtClean="0"/>
+              <a:t>Has the general form:</a:t>
+            </a:r>
+            <a:br>
+              <a:rPr lang="pt-BR" dirty="0" smtClean="0"/>
+            </a:br>
+            <a:r>
+              <a:rPr lang="pt-BR" dirty="0" smtClean="0"/>
+              <a:t>	X</a:t>
+            </a:r>
+            <a:r>
+              <a:rPr lang="pt-BR" baseline="-25000" dirty="0" smtClean="0"/>
+              <a:t>n+1</a:t>
+            </a:r>
+            <a:r>
+              <a:rPr lang="pt-BR" dirty="0" smtClean="0"/>
+              <a:t> </a:t>
+            </a:r>
+            <a:r>
+              <a:rPr lang="pt-BR" dirty="0" smtClean="0"/>
+              <a:t>= (</a:t>
+            </a:r>
+            <a:r>
+              <a:rPr lang="pt-BR" dirty="0" smtClean="0"/>
+              <a:t>aX</a:t>
+            </a:r>
+            <a:r>
+              <a:rPr lang="pt-BR" baseline="-25000" dirty="0" smtClean="0"/>
+              <a:t>n</a:t>
+            </a:r>
+            <a:r>
+              <a:rPr lang="pt-BR" baseline="-25000" dirty="0" smtClean="0"/>
+              <a:t>−r</a:t>
+            </a:r>
+            <a:r>
+              <a:rPr lang="pt-BR" dirty="0" smtClean="0"/>
+              <a:t> + </a:t>
+            </a:r>
+            <a:r>
+              <a:rPr lang="pt-BR" dirty="0" smtClean="0"/>
+              <a:t>c</a:t>
+            </a:r>
+            <a:r>
+              <a:rPr lang="pt-BR" baseline="-25000" dirty="0" smtClean="0"/>
+              <a:t>n</a:t>
+            </a:r>
+            <a:r>
+              <a:rPr lang="pt-BR" dirty="0" smtClean="0"/>
+              <a:t>) </a:t>
+            </a:r>
+            <a:r>
+              <a:rPr lang="pt-BR" dirty="0" smtClean="0"/>
+              <a:t>mod </a:t>
+            </a:r>
+            <a:r>
+              <a:rPr lang="pt-BR" dirty="0" smtClean="0"/>
+              <a:t>m</a:t>
+            </a:r>
+          </a:p>
+          <a:p>
+            <a:r>
+              <a:rPr lang="pt-BR" dirty="0" smtClean="0"/>
+              <a:t>In practice, Complementary Multiply with Carry is used:</a:t>
+            </a:r>
+            <a:r>
+              <a:rPr lang="pt-BR" dirty="0" smtClean="0"/>
+              <a:t/>
+            </a:r>
+            <a:br>
+              <a:rPr lang="pt-BR" dirty="0" smtClean="0"/>
+            </a:br>
+            <a:r>
+              <a:rPr lang="pt-BR" dirty="0" smtClean="0"/>
+              <a:t>	X</a:t>
+            </a:r>
+            <a:r>
+              <a:rPr lang="pt-BR" baseline="-25000" dirty="0" smtClean="0"/>
+              <a:t>n+1</a:t>
+            </a:r>
+            <a:r>
+              <a:rPr lang="pt-BR" dirty="0" smtClean="0"/>
+              <a:t> = </a:t>
+            </a:r>
+            <a:r>
+              <a:rPr lang="pt-BR" dirty="0" smtClean="0"/>
+              <a:t>(b - 1) - (aX</a:t>
+            </a:r>
+            <a:r>
+              <a:rPr lang="pt-BR" baseline="-25000" dirty="0" smtClean="0"/>
+              <a:t>n</a:t>
+            </a:r>
+            <a:r>
+              <a:rPr lang="pt-BR" baseline="-25000" dirty="0" smtClean="0"/>
+              <a:t>−r</a:t>
+            </a:r>
+            <a:r>
+              <a:rPr lang="pt-BR" dirty="0" smtClean="0"/>
+              <a:t> + c</a:t>
+            </a:r>
+            <a:r>
+              <a:rPr lang="pt-BR" baseline="-25000" dirty="0" smtClean="0"/>
+              <a:t>n</a:t>
+            </a:r>
+            <a:r>
+              <a:rPr lang="pt-BR" dirty="0" smtClean="0"/>
+              <a:t>) mod </a:t>
+            </a:r>
+            <a:r>
+              <a:rPr lang="pt-BR" dirty="0" smtClean="0"/>
+              <a:t>m</a:t>
+            </a:r>
+          </a:p>
+          <a:p>
+            <a:r>
+              <a:rPr lang="pt-BR" dirty="0" smtClean="0"/>
+              <a:t>Period heavily dependent on parameter selection</a:t>
+            </a:r>
+          </a:p>
+          <a:p>
+            <a:r>
+              <a:rPr lang="pt-BR" dirty="0" smtClean="0"/>
+              <a:t>Proofs regarding periods are easier on the complementary variant while not sacrificing other benefits of the generator</a:t>
+            </a:r>
+          </a:p>
+          <a:p>
+            <a:r>
               <a:rPr lang="en-US" dirty="0" smtClean="0"/>
               <a:t>Strengths</a:t>
             </a:r>
             <a:r>
               <a:rPr lang="en-US" dirty="0" smtClean="0"/>
-              <a:t>: Very large period, high quality </a:t>
-            </a:r>
-            <a:r>
-              <a:rPr lang="en-US" dirty="0" err="1" smtClean="0"/>
-              <a:t>equidistributed</a:t>
-            </a:r>
-            <a:r>
-              <a:rPr lang="en-US" dirty="0" smtClean="0"/>
-              <a:t> outputs</a:t>
+              <a:t>: Very long period, relatively fast, high quality outputs</a:t>
             </a:r>
             <a:endParaRPr lang="en-US" dirty="0" smtClean="0"/>
           </a:p>
@@ -5177,244 +6349,12 @@
             </a:r>
             <a:r>
               <a:rPr lang="en-US" dirty="0" smtClean="0"/>
-              <a:t>: Complex and slow, requires a great deal of memory to store state</a:t>
-            </a:r>
-            <a:r>
-              <a:rPr lang="en-US" smtClean="0"/>
-              <a:t>, difficult to seed</a:t>
+              <a:t>: Stores a fair amount of state, difficult to seed</a:t>
             </a:r>
             <a:endParaRPr lang="en-US" dirty="0" smtClean="0"/>
           </a:p>
-          <a:p>
-            <a:endParaRPr lang="es-ES" dirty="0" smtClean="0"/>
-          </a:p>
-        </p:txBody>
-      </p:sp>
-      <p:sp>
-        <p:nvSpPr>
-          <p:cNvPr id="3074" name="Rectangle 2"/>
-          <p:cNvSpPr>
-            <a:spLocks noChangeArrowheads="1"/>
-          </p:cNvSpPr>
-          <p:nvPr/>
-        </p:nvSpPr>
-        <p:spPr bwMode="auto">
-          <a:xfrm>
-            <a:off x="0" y="0"/>
-            <a:ext cx="9144000" cy="457200"/>
-          </a:xfrm>
-          <a:prstGeom prst="rect">
-            <a:avLst/>
-          </a:prstGeom>
-          <a:noFill/>
-          <a:ln w="9525">
-            <a:noFill/>
-            <a:miter lim="800000"/>
-            <a:headEnd/>
-            <a:tailEnd/>
-          </a:ln>
-          <a:effectLst/>
-        </p:spPr>
-        <p:txBody>
-          <a:bodyPr vert="horz" wrap="none" lIns="91440" tIns="45720" rIns="91440" bIns="45720" numCol="1" anchor="ctr" anchorCtr="0" compatLnSpc="1">
-            <a:prstTxWarp prst="textNoShape">
-              <a:avLst/>
-            </a:prstTxWarp>
-            <a:spAutoFit/>
-          </a:bodyPr>
-          <a:lstStyle/>
-          <a:p>
-            <a:endParaRPr lang="en-US"/>
-          </a:p>
-        </p:txBody>
-      </p:sp>
-      <p:pic>
-        <p:nvPicPr>
-          <p:cNvPr id="3073" name="Picture 1"/>
-          <p:cNvPicPr>
-            <a:picLocks noChangeAspect="1" noChangeArrowheads="1"/>
-          </p:cNvPicPr>
-          <p:nvPr/>
-        </p:nvPicPr>
-        <p:blipFill>
-          <a:blip r:embed="rId2">
-            <a:clrChange>
-              <a:clrFrom>
-                <a:srgbClr val="FFFFFF"/>
-              </a:clrFrom>
-              <a:clrTo>
-                <a:srgbClr val="FFFFFF">
-                  <a:alpha val="0"/>
-                </a:srgbClr>
-              </a:clrTo>
-            </a:clrChange>
-          </a:blip>
-          <a:srcRect/>
-          <a:stretch>
-            <a:fillRect/>
-          </a:stretch>
-        </p:blipFill>
-        <p:spPr bwMode="auto">
-          <a:xfrm>
-            <a:off x="0" y="457200"/>
-            <a:ext cx="171450" cy="190500"/>
-          </a:xfrm>
-          <a:prstGeom prst="rect">
-            <a:avLst/>
-          </a:prstGeom>
-          <a:noFill/>
-        </p:spPr>
-      </p:pic>
-      <p:sp>
-        <p:nvSpPr>
-          <p:cNvPr id="3076" name="Rectangle 4"/>
-          <p:cNvSpPr>
-            <a:spLocks noChangeArrowheads="1"/>
-          </p:cNvSpPr>
-          <p:nvPr/>
-        </p:nvSpPr>
-        <p:spPr bwMode="auto">
-          <a:xfrm>
-            <a:off x="0" y="0"/>
-            <a:ext cx="9144000" cy="457200"/>
-          </a:xfrm>
-          <a:prstGeom prst="rect">
-            <a:avLst/>
-          </a:prstGeom>
-          <a:noFill/>
-          <a:ln w="9525">
-            <a:noFill/>
-            <a:miter lim="800000"/>
-            <a:headEnd/>
-            <a:tailEnd/>
-          </a:ln>
-          <a:effectLst/>
-        </p:spPr>
-        <p:txBody>
-          <a:bodyPr vert="horz" wrap="none" lIns="91440" tIns="45720" rIns="91440" bIns="45720" numCol="1" anchor="ctr" anchorCtr="0" compatLnSpc="1">
-            <a:prstTxWarp prst="textNoShape">
-              <a:avLst/>
-            </a:prstTxWarp>
-            <a:spAutoFit/>
-          </a:bodyPr>
-          <a:lstStyle/>
-          <a:p>
-            <a:endParaRPr lang="en-US"/>
-          </a:p>
-        </p:txBody>
-      </p:sp>
-      <p:pic>
-        <p:nvPicPr>
-          <p:cNvPr id="3075" name="Picture 3"/>
-          <p:cNvPicPr>
-            <a:picLocks noChangeAspect="1" noChangeArrowheads="1"/>
-          </p:cNvPicPr>
-          <p:nvPr/>
-        </p:nvPicPr>
-        <p:blipFill>
-          <a:blip r:embed="rId2">
-            <a:clrChange>
-              <a:clrFrom>
-                <a:srgbClr val="FFFFFF"/>
-              </a:clrFrom>
-              <a:clrTo>
-                <a:srgbClr val="FFFFFF">
-                  <a:alpha val="0"/>
-                </a:srgbClr>
-              </a:clrTo>
-            </a:clrChange>
-          </a:blip>
-          <a:srcRect/>
-          <a:stretch>
-            <a:fillRect/>
-          </a:stretch>
-        </p:blipFill>
-        <p:spPr bwMode="auto">
-          <a:xfrm>
-            <a:off x="0" y="457200"/>
-            <a:ext cx="171450" cy="190500"/>
-          </a:xfrm>
-          <a:prstGeom prst="rect">
-            <a:avLst/>
-          </a:prstGeom>
-          <a:noFill/>
-        </p:spPr>
-      </p:pic>
-      <p:sp>
-        <p:nvSpPr>
-          <p:cNvPr id="3078" name="Rectangle 6"/>
-          <p:cNvSpPr>
-            <a:spLocks noChangeArrowheads="1"/>
-          </p:cNvSpPr>
-          <p:nvPr/>
-        </p:nvSpPr>
-        <p:spPr bwMode="auto">
-          <a:xfrm>
-            <a:off x="0" y="0"/>
-            <a:ext cx="9144000" cy="457200"/>
-          </a:xfrm>
-          <a:prstGeom prst="rect">
-            <a:avLst/>
-          </a:prstGeom>
-          <a:noFill/>
-          <a:ln w="9525">
-            <a:noFill/>
-            <a:miter lim="800000"/>
-            <a:headEnd/>
-            <a:tailEnd/>
-          </a:ln>
-          <a:effectLst/>
-        </p:spPr>
-        <p:txBody>
-          <a:bodyPr vert="horz" wrap="none" lIns="91440" tIns="45720" rIns="91440" bIns="45720" numCol="1" anchor="ctr" anchorCtr="0" compatLnSpc="1">
-            <a:prstTxWarp prst="textNoShape">
-              <a:avLst/>
-            </a:prstTxWarp>
-            <a:spAutoFit/>
-          </a:bodyPr>
-          <a:lstStyle/>
-          <a:p>
-            <a:endParaRPr lang="en-US"/>
-          </a:p>
-        </p:txBody>
-      </p:sp>
-      <p:pic>
-        <p:nvPicPr>
-          <p:cNvPr id="3077" name="Picture 5"/>
-          <p:cNvPicPr>
-            <a:picLocks noChangeAspect="1" noChangeArrowheads="1"/>
-          </p:cNvPicPr>
-          <p:nvPr/>
-        </p:nvPicPr>
-        <p:blipFill>
-          <a:blip r:embed="rId2">
-            <a:clrChange>
-              <a:clrFrom>
-                <a:srgbClr val="FFFFFF"/>
-              </a:clrFrom>
-              <a:clrTo>
-                <a:srgbClr val="FFFFFF">
-                  <a:alpha val="0"/>
-                </a:srgbClr>
-              </a:clrTo>
-            </a:clrChange>
-          </a:blip>
-          <a:srcRect/>
-          <a:stretch>
-            <a:fillRect/>
-          </a:stretch>
-        </p:blipFill>
-        <p:spPr bwMode="auto">
-          <a:xfrm>
-            <a:off x="0" y="457200"/>
-            <a:ext cx="171450" cy="190500"/>
-          </a:xfrm>
-          <a:prstGeom prst="rect">
-            <a:avLst/>
-          </a:prstGeom>
-          <a:noFill/>
-        </p:spPr>
-      </p:pic>
+        </p:txBody>
+      </p:sp>
     </p:spTree>
   </p:cSld>
   <p:clrMapOvr>
@@ -5691,4 +6631,287 @@
   <a:objectDefaults/>
   <a:extraClrSchemeLst/>
 </a:theme>
+</file>
+
+<file path=ppt/theme/theme2.xml><?xml version="1.0" encoding="utf-8"?>
+<a:theme xmlns:a="http://schemas.openxmlformats.org/drawingml/2006/main" name="Office Theme">
+  <a:themeElements>
+    <a:clrScheme name="Office">
+      <a:dk1>
+        <a:sysClr val="windowText" lastClr="000000"/>
+      </a:dk1>
+      <a:lt1>
+        <a:sysClr val="window" lastClr="FFFFFF"/>
+      </a:lt1>
+      <a:dk2>
+        <a:srgbClr val="1F497D"/>
+      </a:dk2>
+      <a:lt2>
+        <a:srgbClr val="EEECE1"/>
+      </a:lt2>
+      <a:accent1>
+        <a:srgbClr val="4F81BD"/>
+      </a:accent1>
+      <a:accent2>
+        <a:srgbClr val="C0504D"/>
+      </a:accent2>
+      <a:accent3>
+        <a:srgbClr val="9BBB59"/>
+      </a:accent3>
+      <a:accent4>
+        <a:srgbClr val="8064A2"/>
+      </a:accent4>
+      <a:accent5>
+        <a:srgbClr val="4BACC6"/>
+      </a:accent5>
+      <a:accent6>
+        <a:srgbClr val="F79646"/>
+      </a:accent6>
+      <a:hlink>
+        <a:srgbClr val="0000FF"/>
+      </a:hlink>
+      <a:folHlink>
+        <a:srgbClr val="800080"/>
+      </a:folHlink>
+    </a:clrScheme>
+    <a:fontScheme name="Office">
+      <a:majorFont>
+        <a:latin typeface="Calibri"/>
+        <a:ea typeface=""/>
+        <a:cs typeface=""/>
+        <a:font script="Jpan" typeface="ＭＳ Ｐゴシック"/>
+        <a:font script="Hang" typeface="맑은 고딕"/>
+        <a:font script="Hans" typeface="宋体"/>
+        <a:font script="Hant" typeface="新細明體"/>
+        <a:font script="Arab" typeface="Times New Roman"/>
+        <a:font script="Hebr" typeface="Times New Roman"/>
+        <a:font script="Thai" typeface="Angsana New"/>
+        <a:font script="Ethi" typeface="Nyala"/>
+        <a:font script="Beng" typeface="Vrinda"/>
+        <a:font script="Gujr" typeface="Shruti"/>
+        <a:font script="Khmr" typeface="MoolBoran"/>
+        <a:font script="Knda" typeface="Tunga"/>
+        <a:font script="Guru" typeface="Raavi"/>
+        <a:font script="Cans" typeface="Euphemia"/>
+        <a:font script="Cher" typeface="Plantagenet Cherokee"/>
+        <a:font script="Yiii" typeface="Microsoft Yi Baiti"/>
+        <a:font script="Tibt" typeface="Microsoft Himalaya"/>
+        <a:font script="Thaa" typeface="MV Boli"/>
+        <a:font script="Deva" typeface="Mangal"/>
+        <a:font script="Telu" typeface="Gautami"/>
+        <a:font script="Taml" typeface="Latha"/>
+        <a:font script="Syrc" typeface="Estrangelo Edessa"/>
+        <a:font script="Orya" typeface="Kalinga"/>
+        <a:font script="Mlym" typeface="Kartika"/>
+        <a:font script="Laoo" typeface="DokChampa"/>
+        <a:font script="Sinh" typeface="Iskoola Pota"/>
+        <a:font script="Mong" typeface="Mongolian Baiti"/>
+        <a:font script="Viet" typeface="Times New Roman"/>
+        <a:font script="Uigh" typeface="Microsoft Uighur"/>
+      </a:majorFont>
+      <a:minorFont>
+        <a:latin typeface="Calibri"/>
+        <a:ea typeface=""/>
+        <a:cs typeface=""/>
+        <a:font script="Jpan" typeface="ＭＳ Ｐゴシック"/>
+        <a:font script="Hang" typeface="맑은 고딕"/>
+        <a:font script="Hans" typeface="宋体"/>
+        <a:font script="Hant" typeface="新細明體"/>
+        <a:font script="Arab" typeface="Arial"/>
+        <a:font script="Hebr" typeface="Arial"/>
+        <a:font script="Thai" typeface="Cordia New"/>
+        <a:font script="Ethi" typeface="Nyala"/>
+        <a:font script="Beng" typeface="Vrinda"/>
+        <a:font script="Gujr" typeface="Shruti"/>
+        <a:font script="Khmr" typeface="DaunPenh"/>
+        <a:font script="Knda" typeface="Tunga"/>
+        <a:font script="Guru" typeface="Raavi"/>
+        <a:font script="Cans" typeface="Euphemia"/>
+        <a:font script="Cher" typeface="Plantagenet Cherokee"/>
+        <a:font script="Yiii" typeface="Microsoft Yi Baiti"/>
+        <a:font script="Tibt" typeface="Microsoft Himalaya"/>
+        <a:font script="Thaa" typeface="MV Boli"/>
+        <a:font script="Deva" typeface="Mangal"/>
+        <a:font script="Telu" typeface="Gautami"/>
+        <a:font script="Taml" typeface="Latha"/>
+        <a:font script="Syrc" typeface="Estrangelo Edessa"/>
+        <a:font script="Orya" typeface="Kalinga"/>
+        <a:font script="Mlym" typeface="Kartika"/>
+        <a:font script="Laoo" typeface="DokChampa"/>
+        <a:font script="Sinh" typeface="Iskoola Pota"/>
+        <a:font script="Mong" typeface="Mongolian Baiti"/>
+        <a:font script="Viet" typeface="Arial"/>
+        <a:font script="Uigh" typeface="Microsoft Uighur"/>
+      </a:minorFont>
+    </a:fontScheme>
+    <a:fmtScheme name="Office">
+      <a:fillStyleLst>
+        <a:solidFill>
+          <a:schemeClr val="phClr"/>
+        </a:solidFill>
+        <a:gradFill rotWithShape="1">
+          <a:gsLst>
+            <a:gs pos="0">
+              <a:schemeClr val="phClr">
+                <a:tint val="50000"/>
+                <a:satMod val="300000"/>
+              </a:schemeClr>
+            </a:gs>
+            <a:gs pos="35000">
+              <a:schemeClr val="phClr">
+                <a:tint val="37000"/>
+                <a:satMod val="300000"/>
+              </a:schemeClr>
+            </a:gs>
+            <a:gs pos="100000">
+              <a:schemeClr val="phClr">
+                <a:tint val="15000"/>
+                <a:satMod val="350000"/>
+              </a:schemeClr>
+            </a:gs>
+          </a:gsLst>
+          <a:lin ang="16200000" scaled="1"/>
+        </a:gradFill>
+        <a:gradFill rotWithShape="1">
+          <a:gsLst>
+            <a:gs pos="0">
+              <a:schemeClr val="phClr">
+                <a:shade val="51000"/>
+                <a:satMod val="130000"/>
+              </a:schemeClr>
+            </a:gs>
+            <a:gs pos="80000">
+              <a:schemeClr val="phClr">
+                <a:shade val="93000"/>
+                <a:satMod val="130000"/>
+              </a:schemeClr>
+            </a:gs>
+            <a:gs pos="100000">
+              <a:schemeClr val="phClr">
+                <a:shade val="94000"/>
+                <a:satMod val="135000"/>
+              </a:schemeClr>
+            </a:gs>
+          </a:gsLst>
+          <a:lin ang="16200000" scaled="0"/>
+        </a:gradFill>
+      </a:fillStyleLst>
+      <a:lnStyleLst>
+        <a:ln w="9525" cap="flat" cmpd="sng" algn="ctr">
+          <a:solidFill>
+            <a:schemeClr val="phClr">
+              <a:shade val="95000"/>
+              <a:satMod val="105000"/>
+            </a:schemeClr>
+          </a:solidFill>
+          <a:prstDash val="solid"/>
+        </a:ln>
+        <a:ln w="25400" cap="flat" cmpd="sng" algn="ctr">
+          <a:solidFill>
+            <a:schemeClr val="phClr"/>
+          </a:solidFill>
+          <a:prstDash val="solid"/>
+        </a:ln>
+        <a:ln w="38100" cap="flat" cmpd="sng" algn="ctr">
+          <a:solidFill>
+            <a:schemeClr val="phClr"/>
+          </a:solidFill>
+          <a:prstDash val="solid"/>
+        </a:ln>
+      </a:lnStyleLst>
+      <a:effectStyleLst>
+        <a:effectStyle>
+          <a:effectLst>
+            <a:outerShdw blurRad="40000" dist="20000" dir="5400000" rotWithShape="0">
+              <a:srgbClr val="000000">
+                <a:alpha val="38000"/>
+              </a:srgbClr>
+            </a:outerShdw>
+          </a:effectLst>
+        </a:effectStyle>
+        <a:effectStyle>
+          <a:effectLst>
+            <a:outerShdw blurRad="40000" dist="23000" dir="5400000" rotWithShape="0">
+              <a:srgbClr val="000000">
+                <a:alpha val="35000"/>
+              </a:srgbClr>
+            </a:outerShdw>
+          </a:effectLst>
+        </a:effectStyle>
+        <a:effectStyle>
+          <a:effectLst>
+            <a:outerShdw blurRad="40000" dist="23000" dir="5400000" rotWithShape="0">
+              <a:srgbClr val="000000">
+                <a:alpha val="35000"/>
+              </a:srgbClr>
+            </a:outerShdw>
+          </a:effectLst>
+          <a:scene3d>
+            <a:camera prst="orthographicFront">
+              <a:rot lat="0" lon="0" rev="0"/>
+            </a:camera>
+            <a:lightRig rig="threePt" dir="t">
+              <a:rot lat="0" lon="0" rev="1200000"/>
+            </a:lightRig>
+          </a:scene3d>
+          <a:sp3d>
+            <a:bevelT w="63500" h="25400"/>
+          </a:sp3d>
+        </a:effectStyle>
+      </a:effectStyleLst>
+      <a:bgFillStyleLst>
+        <a:solidFill>
+          <a:schemeClr val="phClr"/>
+        </a:solidFill>
+        <a:gradFill rotWithShape="1">
+          <a:gsLst>
+            <a:gs pos="0">
+              <a:schemeClr val="phClr">
+                <a:tint val="40000"/>
+                <a:satMod val="350000"/>
+              </a:schemeClr>
+            </a:gs>
+            <a:gs pos="40000">
+              <a:schemeClr val="phClr">
+                <a:tint val="45000"/>
+                <a:shade val="99000"/>
+                <a:satMod val="350000"/>
+              </a:schemeClr>
+            </a:gs>
+            <a:gs pos="100000">
+              <a:schemeClr val="phClr">
+                <a:shade val="20000"/>
+                <a:satMod val="255000"/>
+              </a:schemeClr>
+            </a:gs>
+          </a:gsLst>
+          <a:path path="circle">
+            <a:fillToRect l="50000" t="-80000" r="50000" b="180000"/>
+          </a:path>
+        </a:gradFill>
+        <a:gradFill rotWithShape="1">
+          <a:gsLst>
+            <a:gs pos="0">
+              <a:schemeClr val="phClr">
+                <a:tint val="80000"/>
+                <a:satMod val="300000"/>
+              </a:schemeClr>
+            </a:gs>
+            <a:gs pos="100000">
+              <a:schemeClr val="phClr">
+                <a:shade val="30000"/>
+                <a:satMod val="200000"/>
+              </a:schemeClr>
+            </a:gs>
+          </a:gsLst>
+          <a:path path="circle">
+            <a:fillToRect l="50000" t="50000" r="50000" b="50000"/>
+          </a:path>
+        </a:gradFill>
+      </a:bgFillStyleLst>
+    </a:fmtScheme>
+  </a:themeElements>
+  <a:objectDefaults/>
+  <a:extraClrSchemeLst/>
+</a:theme>
 </file>
</xml_diff>

<commit_message>
Add conclusion slide and minor fixes to report
</commit_message>
<xml_diff>
--- a/presentation/pres.pptx
+++ b/presentation/pres.pptx
@@ -205,6 +205,7 @@
           <a:p>
             <a:fld id="{D343ACFE-C986-4655-9665-E2DF4EB3913C}" type="datetimeFigureOut">
               <a:rPr lang="en-US" smtClean="0"/>
+              <a:pPr/>
               <a:t>12/4/2014</a:t>
             </a:fld>
             <a:endParaRPr lang="en-US"/>
@@ -366,6 +367,7 @@
           <a:p>
             <a:fld id="{429E84A2-4872-4E06-AFDF-C221812919E9}" type="slidenum">
               <a:rPr lang="en-US" smtClean="0"/>
+              <a:pPr/>
               <a:t>‹#›</a:t>
             </a:fld>
             <a:endParaRPr lang="en-US"/>
@@ -537,6 +539,7 @@
           <a:p>
             <a:fld id="{429E84A2-4872-4E06-AFDF-C221812919E9}" type="slidenum">
               <a:rPr lang="en-US" smtClean="0"/>
+              <a:pPr/>
               <a:t>10</a:t>
             </a:fld>
             <a:endParaRPr lang="en-US"/>
@@ -4256,11 +4259,7 @@
             </a:r>
             <a:r>
               <a:rPr lang="en-US" dirty="0" smtClean="0"/>
-              <a:t> </a:t>
-            </a:r>
-            <a:r>
-              <a:rPr lang="en-US" dirty="0" smtClean="0"/>
-              <a:t>Twister</a:t>
+              <a:t> Twister</a:t>
             </a:r>
             <a:endParaRPr lang="en-US" dirty="0"/>
           </a:p>
@@ -4382,15 +4381,7 @@
             </a:r>
             <a:r>
               <a:rPr lang="en-US" dirty="0" smtClean="0"/>
-              <a:t> </a:t>
-            </a:r>
-            <a:r>
-              <a:rPr lang="en-US" dirty="0" smtClean="0"/>
-              <a:t>| </a:t>
-            </a:r>
-            <a:r>
-              <a:rPr lang="en-US" dirty="0" smtClean="0"/>
-              <a:t>X</a:t>
+              <a:t> | X</a:t>
             </a:r>
             <a:r>
               <a:rPr lang="en-US" baseline="30000" dirty="0" smtClean="0"/>
@@ -4530,7 +4521,7 @@
           <p:nvPr/>
         </p:nvPicPr>
         <p:blipFill>
-          <a:blip r:embed="rId3"/>
+          <a:blip r:embed="rId3" cstate="print"/>
           <a:srcRect/>
           <a:stretch>
             <a:fillRect/>
@@ -4601,7 +4592,7 @@
           <p:nvPr/>
         </p:nvPicPr>
         <p:blipFill>
-          <a:blip r:embed="rId4">
+          <a:blip r:embed="rId4" cstate="print">
             <a:clrChange>
               <a:clrFrom>
                 <a:srgbClr val="FFFFFF"/>
@@ -4739,11 +4730,7 @@
             </a:r>
             <a:r>
               <a:rPr lang="en-US" dirty="0" smtClean="0"/>
-              <a:t> </a:t>
-            </a:r>
-            <a:r>
-              <a:rPr lang="en-US" dirty="0" smtClean="0"/>
-              <a:t>Twister</a:t>
+              <a:t> Twister</a:t>
             </a:r>
             <a:endParaRPr lang="en-US" dirty="0"/>
           </a:p>
@@ -4802,7 +4789,6 @@
               <a:rPr lang="es-ES" sz="2000" dirty="0" smtClean="0"/>
               <a:t>	y := y ⊕ (y &gt;&gt; l) </a:t>
             </a:r>
-            <a:endParaRPr lang="es-ES" sz="2000" dirty="0" smtClean="0"/>
           </a:p>
           <a:p>
             <a:r>
@@ -5014,11 +5000,7 @@
           <a:p>
             <a:r>
               <a:rPr lang="en-US" dirty="0" smtClean="0"/>
-              <a:t>Strengths</a:t>
-            </a:r>
-            <a:r>
-              <a:rPr lang="en-US" dirty="0" smtClean="0"/>
-              <a:t>: Very large period, high quality </a:t>
+              <a:t>Strengths: Very large period, high quality </a:t>
             </a:r>
             <a:r>
               <a:rPr lang="en-US" dirty="0" err="1" smtClean="0"/>
@@ -5028,18 +5010,12 @@
               <a:rPr lang="en-US" dirty="0" smtClean="0"/>
               <a:t> outputs</a:t>
             </a:r>
-            <a:endParaRPr lang="en-US" dirty="0" smtClean="0"/>
           </a:p>
           <a:p>
             <a:r>
               <a:rPr lang="en-US" dirty="0" smtClean="0"/>
-              <a:t>Weaknesses</a:t>
-            </a:r>
-            <a:r>
-              <a:rPr lang="en-US" dirty="0" smtClean="0"/>
-              <a:t>: Complex and slow, requires a great deal of memory to store state, difficult to seed</a:t>
-            </a:r>
-            <a:endParaRPr lang="en-US" dirty="0" smtClean="0"/>
+              <a:t>Weaknesses: Complex and slow, requires a great deal of memory to store state, difficult to seed</a:t>
+            </a:r>
           </a:p>
           <a:p>
             <a:endParaRPr lang="es-ES" dirty="0" smtClean="0"/>
@@ -5290,6 +5266,37 @@
           <a:bodyPr/>
           <a:lstStyle/>
           <a:p>
+            <a:r>
+              <a:rPr lang="en-US" dirty="0" smtClean="0"/>
+              <a:t>The </a:t>
+            </a:r>
+            <a:r>
+              <a:rPr lang="en-US" dirty="0" err="1" smtClean="0"/>
+              <a:t>Mersenne</a:t>
+            </a:r>
+            <a:r>
+              <a:rPr lang="en-US" dirty="0" smtClean="0"/>
+              <a:t> Twister is currently the most widely adopted generator type, despite its slower performance</a:t>
+            </a:r>
+          </a:p>
+          <a:p>
+            <a:r>
+              <a:rPr lang="en-US" dirty="0" smtClean="0"/>
+              <a:t>New cutting-edge generators (WELL, SFMT, etc.) help address some of the problems of MT but have yet to be widely adopted</a:t>
+            </a:r>
+          </a:p>
+          <a:p>
+            <a:r>
+              <a:rPr lang="en-US" dirty="0" smtClean="0"/>
+              <a:t>Like most engineering problems, the choice of RNG may depend heavily on the application but MT </a:t>
+            </a:r>
+            <a:r>
+              <a:rPr lang="en-US" dirty="0" smtClean="0"/>
+              <a:t>seems to fit for most contexts</a:t>
+            </a:r>
+            <a:endParaRPr lang="en-US" dirty="0" smtClean="0"/>
+          </a:p>
+          <a:p>
             <a:endParaRPr lang="en-US" dirty="0"/>
           </a:p>
         </p:txBody>
@@ -5677,7 +5684,7 @@
           <p:nvPr/>
         </p:nvPicPr>
         <p:blipFill>
-          <a:blip r:embed="rId2"/>
+          <a:blip r:embed="rId2" cstate="print"/>
           <a:srcRect/>
           <a:stretch>
             <a:fillRect/>
@@ -5759,15 +5766,7 @@
           <a:p>
             <a:r>
               <a:rPr lang="en-US" dirty="0" smtClean="0"/>
-              <a:t>In general, </a:t>
-            </a:r>
-            <a:r>
-              <a:rPr lang="en-US" dirty="0" smtClean="0"/>
-              <a:t>s</a:t>
-            </a:r>
-            <a:r>
-              <a:rPr lang="en-US" dirty="0" smtClean="0"/>
-              <a:t>equence produced by shifting and </a:t>
+              <a:t>In general, sequence produced by shifting and </a:t>
             </a:r>
             <a:r>
               <a:rPr lang="en-US" dirty="0" err="1" smtClean="0"/>
@@ -5873,43 +5872,19 @@
             </a:r>
             <a:r>
               <a:rPr lang="pt-BR" dirty="0" smtClean="0"/>
-              <a:t> = </a:t>
+              <a:t> = (X</a:t>
+            </a:r>
+            <a:r>
+              <a:rPr lang="pt-BR" baseline="-25000" dirty="0" smtClean="0"/>
+              <a:t>n−r</a:t>
             </a:r>
             <a:r>
               <a:rPr lang="pt-BR" dirty="0" smtClean="0"/>
-              <a:t>(</a:t>
-            </a:r>
-            <a:r>
-              <a:rPr lang="pt-BR" dirty="0" smtClean="0"/>
-              <a:t>X</a:t>
+              <a:t> * X</a:t>
             </a:r>
             <a:r>
               <a:rPr lang="pt-BR" baseline="-25000" dirty="0" smtClean="0"/>
-              <a:t>n</a:t>
-            </a:r>
-            <a:r>
-              <a:rPr lang="pt-BR" baseline="-25000" dirty="0" smtClean="0"/>
-              <a:t>−r</a:t>
-            </a:r>
-            <a:r>
-              <a:rPr lang="pt-BR" dirty="0" smtClean="0"/>
-              <a:t> </a:t>
-            </a:r>
-            <a:r>
-              <a:rPr lang="pt-BR" dirty="0" smtClean="0"/>
-              <a:t>* X</a:t>
-            </a:r>
-            <a:r>
-              <a:rPr lang="pt-BR" baseline="-25000" dirty="0" smtClean="0"/>
-              <a:t>n</a:t>
-            </a:r>
-            <a:r>
-              <a:rPr lang="pt-BR" baseline="-25000" dirty="0" smtClean="0"/>
-              <a:t>−</a:t>
-            </a:r>
-            <a:r>
-              <a:rPr lang="pt-BR" baseline="-25000" dirty="0" smtClean="0"/>
-              <a:t>s</a:t>
+              <a:t>n−s</a:t>
             </a:r>
             <a:r>
               <a:rPr lang="pt-BR" dirty="0" smtClean="0"/>
@@ -5925,24 +5900,14 @@
           <a:p>
             <a:r>
               <a:rPr lang="en-US" dirty="0" smtClean="0"/>
-              <a:t>Strengths</a:t>
-            </a:r>
+              <a:t>Strengths: Generally fast performance, flexible</a:t>
+            </a:r>
+          </a:p>
+          <a:p>
             <a:r>
               <a:rPr lang="en-US" dirty="0" smtClean="0"/>
-              <a:t>: Generally fast performance, flexible</a:t>
-            </a:r>
-            <a:endParaRPr lang="en-US" dirty="0" smtClean="0"/>
-          </a:p>
-          <a:p>
-            <a:r>
-              <a:rPr lang="en-US" dirty="0" smtClean="0"/>
-              <a:t>Weaknesses</a:t>
-            </a:r>
-            <a:r>
-              <a:rPr lang="en-US" dirty="0" smtClean="0"/>
-              <a:t>: Stores a sizeable amount of state, output quality highly dependent on seeding method and parameter selection</a:t>
-            </a:r>
-            <a:endParaRPr lang="en-US" dirty="0" smtClean="0"/>
+              <a:t>Weaknesses: Stores a sizeable amount of state, output quality highly dependent on seeding method and parameter selection</a:t>
+            </a:r>
           </a:p>
         </p:txBody>
       </p:sp>
@@ -5988,11 +5953,7 @@
           <a:p>
             <a:r>
               <a:rPr lang="en-US" dirty="0" smtClean="0"/>
-              <a:t>Lagged </a:t>
-            </a:r>
-            <a:r>
-              <a:rPr lang="en-US" dirty="0" smtClean="0"/>
-              <a:t>Fibonacci</a:t>
+              <a:t>Lagged Fibonacci</a:t>
             </a:r>
             <a:endParaRPr lang="en-US" dirty="0"/>
           </a:p>
@@ -6030,11 +5991,45 @@
             </a:r>
             <a:r>
               <a:rPr lang="pt-BR" dirty="0" smtClean="0"/>
-              <a:t> = </a:t>
+              <a:t> = (X</a:t>
+            </a:r>
+            <a:r>
+              <a:rPr lang="pt-BR" baseline="-25000" dirty="0" smtClean="0"/>
+              <a:t>n−r</a:t>
             </a:r>
             <a:r>
               <a:rPr lang="pt-BR" dirty="0" smtClean="0"/>
-              <a:t>(</a:t>
+              <a:t> - X</a:t>
+            </a:r>
+            <a:r>
+              <a:rPr lang="pt-BR" baseline="-25000" dirty="0" smtClean="0"/>
+              <a:t>n−s </a:t>
+            </a:r>
+            <a:r>
+              <a:rPr lang="pt-BR" dirty="0" smtClean="0"/>
+              <a:t>– c</a:t>
+            </a:r>
+            <a:r>
+              <a:rPr lang="pt-BR" baseline="-25000" dirty="0" smtClean="0"/>
+              <a:t>n-1</a:t>
+            </a:r>
+            <a:r>
+              <a:rPr lang="pt-BR" dirty="0" smtClean="0"/>
+              <a:t>) mod m, 0 &lt; s &lt; r</a:t>
+            </a:r>
+          </a:p>
+          <a:p>
+            <a:r>
+              <a:rPr lang="en-US" dirty="0" err="1" smtClean="0"/>
+              <a:t>c</a:t>
+            </a:r>
+            <a:r>
+              <a:rPr lang="en-US" baseline="-25000" dirty="0" err="1" smtClean="0"/>
+              <a:t>n</a:t>
+            </a:r>
+            <a:r>
+              <a:rPr lang="en-US" dirty="0" smtClean="0"/>
+              <a:t> = 1 if </a:t>
             </a:r>
             <a:r>
               <a:rPr lang="pt-BR" dirty="0" smtClean="0"/>
@@ -6042,31 +6037,15 @@
             </a:r>
             <a:r>
               <a:rPr lang="pt-BR" baseline="-25000" dirty="0" smtClean="0"/>
-              <a:t>n</a:t>
+              <a:t>n−r</a:t>
+            </a:r>
+            <a:r>
+              <a:rPr lang="pt-BR" dirty="0" smtClean="0"/>
+              <a:t> - X</a:t>
             </a:r>
             <a:r>
               <a:rPr lang="pt-BR" baseline="-25000" dirty="0" smtClean="0"/>
-              <a:t>−r</a:t>
-            </a:r>
-            <a:r>
-              <a:rPr lang="pt-BR" dirty="0" smtClean="0"/>
-              <a:t> -</a:t>
-            </a:r>
-            <a:r>
-              <a:rPr lang="pt-BR" dirty="0" smtClean="0"/>
-              <a:t> X</a:t>
-            </a:r>
-            <a:r>
-              <a:rPr lang="pt-BR" baseline="-25000" dirty="0" smtClean="0"/>
-              <a:t>n</a:t>
-            </a:r>
-            <a:r>
-              <a:rPr lang="pt-BR" baseline="-25000" dirty="0" smtClean="0"/>
-              <a:t>−</a:t>
-            </a:r>
-            <a:r>
-              <a:rPr lang="pt-BR" baseline="-25000" dirty="0" smtClean="0"/>
-              <a:t>s </a:t>
+              <a:t>n−s </a:t>
             </a:r>
             <a:r>
               <a:rPr lang="pt-BR" dirty="0" smtClean="0"/>
@@ -6074,53 +6053,7 @@
             </a:r>
             <a:r>
               <a:rPr lang="pt-BR" baseline="-25000" dirty="0" smtClean="0"/>
-              <a:t>n-1</a:t>
-            </a:r>
-            <a:r>
-              <a:rPr lang="pt-BR" dirty="0" smtClean="0"/>
-              <a:t>) mod m, 0 &lt; s &lt; r</a:t>
-            </a:r>
-          </a:p>
-          <a:p>
-            <a:r>
-              <a:rPr lang="en-US" dirty="0" err="1" smtClean="0"/>
-              <a:t>c</a:t>
-            </a:r>
-            <a:r>
-              <a:rPr lang="en-US" baseline="-25000" dirty="0" err="1" smtClean="0"/>
-              <a:t>n</a:t>
-            </a:r>
-            <a:r>
-              <a:rPr lang="en-US" dirty="0" smtClean="0"/>
-              <a:t> = 1 if </a:t>
-            </a:r>
-            <a:r>
-              <a:rPr lang="pt-BR" dirty="0" smtClean="0"/>
-              <a:t>X</a:t>
-            </a:r>
-            <a:r>
-              <a:rPr lang="pt-BR" baseline="-25000" dirty="0" smtClean="0"/>
-              <a:t>n−r</a:t>
-            </a:r>
-            <a:r>
-              <a:rPr lang="pt-BR" dirty="0" smtClean="0"/>
-              <a:t> - X</a:t>
-            </a:r>
-            <a:r>
-              <a:rPr lang="pt-BR" baseline="-25000" dirty="0" smtClean="0"/>
-              <a:t>n−s </a:t>
-            </a:r>
-            <a:r>
-              <a:rPr lang="pt-BR" dirty="0" smtClean="0"/>
-              <a:t>– c</a:t>
-            </a:r>
-            <a:r>
-              <a:rPr lang="pt-BR" baseline="-25000" dirty="0" smtClean="0"/>
-              <a:t>n-1 </a:t>
-            </a:r>
-            <a:r>
-              <a:rPr lang="pt-BR" baseline="-25000" dirty="0" smtClean="0"/>
-              <a:t> </a:t>
+              <a:t>n-1  </a:t>
             </a:r>
             <a:r>
               <a:rPr lang="en-US" dirty="0" smtClean="0"/>
@@ -6223,57 +6156,29 @@
             </a:r>
             <a:r>
               <a:rPr lang="pt-BR" dirty="0" smtClean="0"/>
-              <a:t> </a:t>
+              <a:t> = (aX</a:t>
+            </a:r>
+            <a:r>
+              <a:rPr lang="pt-BR" baseline="-25000" dirty="0" smtClean="0"/>
+              <a:t>n−r</a:t>
             </a:r>
             <a:r>
               <a:rPr lang="pt-BR" dirty="0" smtClean="0"/>
-              <a:t>= (</a:t>
-            </a:r>
-            <a:r>
-              <a:rPr lang="pt-BR" dirty="0" smtClean="0"/>
-              <a:t>aX</a:t>
+              <a:t> + c</a:t>
             </a:r>
             <a:r>
               <a:rPr lang="pt-BR" baseline="-25000" dirty="0" smtClean="0"/>
               <a:t>n</a:t>
             </a:r>
             <a:r>
-              <a:rPr lang="pt-BR" baseline="-25000" dirty="0" smtClean="0"/>
-              <a:t>−r</a:t>
-            </a:r>
-            <a:r>
               <a:rPr lang="pt-BR" dirty="0" smtClean="0"/>
-              <a:t> + </a:t>
-            </a:r>
-            <a:r>
-              <a:rPr lang="pt-BR" dirty="0" smtClean="0"/>
-              <a:t>c</a:t>
-            </a:r>
-            <a:r>
-              <a:rPr lang="pt-BR" baseline="-25000" dirty="0" smtClean="0"/>
-              <a:t>n</a:t>
-            </a:r>
-            <a:r>
-              <a:rPr lang="pt-BR" dirty="0" smtClean="0"/>
-              <a:t>) </a:t>
-            </a:r>
-            <a:r>
-              <a:rPr lang="pt-BR" dirty="0" smtClean="0"/>
-              <a:t>mod </a:t>
-            </a:r>
-            <a:r>
-              <a:rPr lang="pt-BR" dirty="0" smtClean="0"/>
-              <a:t>m</a:t>
+              <a:t>) mod m</a:t>
             </a:r>
           </a:p>
           <a:p>
             <a:r>
               <a:rPr lang="pt-BR" dirty="0" smtClean="0"/>
               <a:t>In practice, Complementary Multiply with Carry is used:</a:t>
-            </a:r>
-            <a:r>
-              <a:rPr lang="pt-BR" dirty="0" smtClean="0"/>
-              <a:t/>
             </a:r>
             <a:br>
               <a:rPr lang="pt-BR" dirty="0" smtClean="0"/>
@@ -6288,35 +6193,23 @@
             </a:r>
             <a:r>
               <a:rPr lang="pt-BR" dirty="0" smtClean="0"/>
-              <a:t> = </a:t>
+              <a:t> = (b - 1) - (aX</a:t>
+            </a:r>
+            <a:r>
+              <a:rPr lang="pt-BR" baseline="-25000" dirty="0" smtClean="0"/>
+              <a:t>n−r</a:t>
             </a:r>
             <a:r>
               <a:rPr lang="pt-BR" dirty="0" smtClean="0"/>
-              <a:t>(b - 1) - (aX</a:t>
+              <a:t> + c</a:t>
             </a:r>
             <a:r>
               <a:rPr lang="pt-BR" baseline="-25000" dirty="0" smtClean="0"/>
               <a:t>n</a:t>
             </a:r>
             <a:r>
-              <a:rPr lang="pt-BR" baseline="-25000" dirty="0" smtClean="0"/>
-              <a:t>−r</a:t>
-            </a:r>
-            <a:r>
               <a:rPr lang="pt-BR" dirty="0" smtClean="0"/>
-              <a:t> + c</a:t>
-            </a:r>
-            <a:r>
-              <a:rPr lang="pt-BR" baseline="-25000" dirty="0" smtClean="0"/>
-              <a:t>n</a:t>
-            </a:r>
-            <a:r>
-              <a:rPr lang="pt-BR" dirty="0" smtClean="0"/>
-              <a:t>) mod </a:t>
-            </a:r>
-            <a:r>
-              <a:rPr lang="pt-BR" dirty="0" smtClean="0"/>
-              <a:t>m</a:t>
+              <a:t>) mod m</a:t>
             </a:r>
           </a:p>
           <a:p>
@@ -6334,24 +6227,14 @@
           <a:p>
             <a:r>
               <a:rPr lang="en-US" dirty="0" smtClean="0"/>
-              <a:t>Strengths</a:t>
-            </a:r>
+              <a:t>Strengths: Very long period, relatively fast, high quality outputs</a:t>
+            </a:r>
+          </a:p>
+          <a:p>
             <a:r>
               <a:rPr lang="en-US" dirty="0" smtClean="0"/>
-              <a:t>: Very long period, relatively fast, high quality outputs</a:t>
-            </a:r>
-            <a:endParaRPr lang="en-US" dirty="0" smtClean="0"/>
-          </a:p>
-          <a:p>
-            <a:r>
-              <a:rPr lang="en-US" dirty="0" smtClean="0"/>
-              <a:t>Weaknesses</a:t>
-            </a:r>
-            <a:r>
-              <a:rPr lang="en-US" dirty="0" smtClean="0"/>
-              <a:t>: Stores a fair amount of state, difficult to seed</a:t>
-            </a:r>
-            <a:endParaRPr lang="en-US" dirty="0" smtClean="0"/>
+              <a:t>Weaknesses: Stores a fair amount of state, difficult to seed</a:t>
+            </a:r>
           </a:p>
         </p:txBody>
       </p:sp>

</xml_diff>

<commit_message>
Add incomplete stuff about KS testing
</commit_message>
<xml_diff>
--- a/presentation/pres.pptx
+++ b/presentation/pres.pptx
@@ -5,23 +5,24 @@
     <p:sldMasterId id="2147483684" r:id="rId1"/>
   </p:sldMasterIdLst>
   <p:notesMasterIdLst>
-    <p:notesMasterId r:id="rId16"/>
+    <p:notesMasterId r:id="rId17"/>
   </p:notesMasterIdLst>
   <p:sldIdLst>
     <p:sldId id="256" r:id="rId2"/>
     <p:sldId id="257" r:id="rId3"/>
     <p:sldId id="258" r:id="rId4"/>
-    <p:sldId id="259" r:id="rId5"/>
-    <p:sldId id="267" r:id="rId6"/>
-    <p:sldId id="261" r:id="rId7"/>
-    <p:sldId id="260" r:id="rId8"/>
-    <p:sldId id="269" r:id="rId9"/>
-    <p:sldId id="262" r:id="rId10"/>
-    <p:sldId id="263" r:id="rId11"/>
-    <p:sldId id="268" r:id="rId12"/>
-    <p:sldId id="266" r:id="rId13"/>
-    <p:sldId id="264" r:id="rId14"/>
-    <p:sldId id="265" r:id="rId15"/>
+    <p:sldId id="270" r:id="rId5"/>
+    <p:sldId id="259" r:id="rId6"/>
+    <p:sldId id="267" r:id="rId7"/>
+    <p:sldId id="261" r:id="rId8"/>
+    <p:sldId id="260" r:id="rId9"/>
+    <p:sldId id="269" r:id="rId10"/>
+    <p:sldId id="262" r:id="rId11"/>
+    <p:sldId id="263" r:id="rId12"/>
+    <p:sldId id="268" r:id="rId13"/>
+    <p:sldId id="266" r:id="rId14"/>
+    <p:sldId id="264" r:id="rId15"/>
+    <p:sldId id="265" r:id="rId16"/>
   </p:sldIdLst>
   <p:sldSz cx="9144000" cy="6858000" type="screen4x3"/>
   <p:notesSz cx="6858000" cy="9144000"/>
@@ -540,7 +541,7 @@
             <a:fld id="{429E84A2-4872-4E06-AFDF-C221812919E9}" type="slidenum">
               <a:rPr lang="en-US" smtClean="0"/>
               <a:pPr/>
-              <a:t>10</a:t>
+              <a:t>11</a:t>
             </a:fld>
             <a:endParaRPr lang="en-US"/>
           </a:p>
@@ -4254,6 +4255,170 @@
           <a:lstStyle/>
           <a:p>
             <a:r>
+              <a:rPr lang="en-US" dirty="0" smtClean="0"/>
+              <a:t>Multiply with Carry</a:t>
+            </a:r>
+            <a:endParaRPr lang="en-US" dirty="0"/>
+          </a:p>
+        </p:txBody>
+      </p:sp>
+      <p:sp>
+        <p:nvSpPr>
+          <p:cNvPr id="3" name="Content Placeholder 2"/>
+          <p:cNvSpPr>
+            <a:spLocks noGrp="1"/>
+          </p:cNvSpPr>
+          <p:nvPr>
+            <p:ph sz="quarter" idx="1"/>
+          </p:nvPr>
+        </p:nvSpPr>
+        <p:spPr/>
+        <p:txBody>
+          <a:bodyPr>
+            <a:normAutofit/>
+          </a:bodyPr>
+          <a:lstStyle/>
+          <a:p>
+            <a:r>
+              <a:rPr lang="pt-BR" dirty="0" smtClean="0"/>
+              <a:t>Has the general form:</a:t>
+            </a:r>
+            <a:br>
+              <a:rPr lang="pt-BR" dirty="0" smtClean="0"/>
+            </a:br>
+            <a:r>
+              <a:rPr lang="pt-BR" dirty="0" smtClean="0"/>
+              <a:t>	X</a:t>
+            </a:r>
+            <a:r>
+              <a:rPr lang="pt-BR" baseline="-25000" dirty="0" smtClean="0"/>
+              <a:t>n+1</a:t>
+            </a:r>
+            <a:r>
+              <a:rPr lang="pt-BR" dirty="0" smtClean="0"/>
+              <a:t> = (aX</a:t>
+            </a:r>
+            <a:r>
+              <a:rPr lang="pt-BR" baseline="-25000" dirty="0" smtClean="0"/>
+              <a:t>n−r</a:t>
+            </a:r>
+            <a:r>
+              <a:rPr lang="pt-BR" dirty="0" smtClean="0"/>
+              <a:t> + c</a:t>
+            </a:r>
+            <a:r>
+              <a:rPr lang="pt-BR" baseline="-25000" dirty="0" smtClean="0"/>
+              <a:t>n</a:t>
+            </a:r>
+            <a:r>
+              <a:rPr lang="pt-BR" dirty="0" smtClean="0"/>
+              <a:t>) mod m</a:t>
+            </a:r>
+          </a:p>
+          <a:p>
+            <a:r>
+              <a:rPr lang="pt-BR" dirty="0" smtClean="0"/>
+              <a:t>In practice, Complementary Multiply with Carry is used:</a:t>
+            </a:r>
+            <a:br>
+              <a:rPr lang="pt-BR" dirty="0" smtClean="0"/>
+            </a:br>
+            <a:r>
+              <a:rPr lang="pt-BR" dirty="0" smtClean="0"/>
+              <a:t>	X</a:t>
+            </a:r>
+            <a:r>
+              <a:rPr lang="pt-BR" baseline="-25000" dirty="0" smtClean="0"/>
+              <a:t>n+1</a:t>
+            </a:r>
+            <a:r>
+              <a:rPr lang="pt-BR" dirty="0" smtClean="0"/>
+              <a:t> = (b - 1) - (aX</a:t>
+            </a:r>
+            <a:r>
+              <a:rPr lang="pt-BR" baseline="-25000" dirty="0" smtClean="0"/>
+              <a:t>n−r</a:t>
+            </a:r>
+            <a:r>
+              <a:rPr lang="pt-BR" dirty="0" smtClean="0"/>
+              <a:t> + c</a:t>
+            </a:r>
+            <a:r>
+              <a:rPr lang="pt-BR" baseline="-25000" dirty="0" smtClean="0"/>
+              <a:t>n</a:t>
+            </a:r>
+            <a:r>
+              <a:rPr lang="pt-BR" dirty="0" smtClean="0"/>
+              <a:t>) mod m</a:t>
+            </a:r>
+          </a:p>
+          <a:p>
+            <a:r>
+              <a:rPr lang="pt-BR" dirty="0" smtClean="0"/>
+              <a:t>Period heavily dependent on parameter selection</a:t>
+            </a:r>
+          </a:p>
+          <a:p>
+            <a:r>
+              <a:rPr lang="pt-BR" dirty="0" smtClean="0"/>
+              <a:t>Proofs regarding periods are easier on the complementary variant while not sacrificing other benefits of the generator</a:t>
+            </a:r>
+          </a:p>
+          <a:p>
+            <a:r>
+              <a:rPr lang="en-US" dirty="0" smtClean="0"/>
+              <a:t>Strengths: Very long period, relatively fast, high quality outputs</a:t>
+            </a:r>
+          </a:p>
+          <a:p>
+            <a:r>
+              <a:rPr lang="en-US" dirty="0" smtClean="0"/>
+              <a:t>Weaknesses: Stores a fair amount of state, difficult to seed</a:t>
+            </a:r>
+          </a:p>
+        </p:txBody>
+      </p:sp>
+    </p:spTree>
+  </p:cSld>
+  <p:clrMapOvr>
+    <a:masterClrMapping/>
+  </p:clrMapOvr>
+</p:sld>
+</file>
+
+<file path=ppt/slides/slide11.xml><?xml version="1.0" encoding="utf-8"?>
+<p:sld xmlns:a="http://schemas.openxmlformats.org/drawingml/2006/main" xmlns:r="http://schemas.openxmlformats.org/officeDocument/2006/relationships" xmlns:p="http://schemas.openxmlformats.org/presentationml/2006/main">
+  <p:cSld>
+    <p:spTree>
+      <p:nvGrpSpPr>
+        <p:cNvPr id="1" name=""/>
+        <p:cNvGrpSpPr/>
+        <p:nvPr/>
+      </p:nvGrpSpPr>
+      <p:grpSpPr>
+        <a:xfrm>
+          <a:off x="0" y="0"/>
+          <a:ext cx="0" cy="0"/>
+          <a:chOff x="0" y="0"/>
+          <a:chExt cx="0" cy="0"/>
+        </a:xfrm>
+      </p:grpSpPr>
+      <p:sp>
+        <p:nvSpPr>
+          <p:cNvPr id="2" name="Title 1"/>
+          <p:cNvSpPr>
+            <a:spLocks noGrp="1"/>
+          </p:cNvSpPr>
+          <p:nvPr>
+            <p:ph type="title"/>
+          </p:nvPr>
+        </p:nvSpPr>
+        <p:spPr/>
+        <p:txBody>
+          <a:bodyPr/>
+          <a:lstStyle/>
+          <a:p>
+            <a:r>
               <a:rPr lang="en-US" dirty="0" err="1" smtClean="0"/>
               <a:t>Mersenne</a:t>
             </a:r>
@@ -4692,251 +4857,6 @@
 </p:sld>
 </file>
 
-<file path=ppt/slides/slide11.xml><?xml version="1.0" encoding="utf-8"?>
-<p:sld xmlns:a="http://schemas.openxmlformats.org/drawingml/2006/main" xmlns:r="http://schemas.openxmlformats.org/officeDocument/2006/relationships" xmlns:p="http://schemas.openxmlformats.org/presentationml/2006/main">
-  <p:cSld>
-    <p:spTree>
-      <p:nvGrpSpPr>
-        <p:cNvPr id="1" name=""/>
-        <p:cNvGrpSpPr/>
-        <p:nvPr/>
-      </p:nvGrpSpPr>
-      <p:grpSpPr>
-        <a:xfrm>
-          <a:off x="0" y="0"/>
-          <a:ext cx="0" cy="0"/>
-          <a:chOff x="0" y="0"/>
-          <a:chExt cx="0" cy="0"/>
-        </a:xfrm>
-      </p:grpSpPr>
-      <p:sp>
-        <p:nvSpPr>
-          <p:cNvPr id="2" name="Title 1"/>
-          <p:cNvSpPr>
-            <a:spLocks noGrp="1"/>
-          </p:cNvSpPr>
-          <p:nvPr>
-            <p:ph type="title"/>
-          </p:nvPr>
-        </p:nvSpPr>
-        <p:spPr/>
-        <p:txBody>
-          <a:bodyPr/>
-          <a:lstStyle/>
-          <a:p>
-            <a:r>
-              <a:rPr lang="en-US" dirty="0" err="1" smtClean="0"/>
-              <a:t>Mersenne</a:t>
-            </a:r>
-            <a:r>
-              <a:rPr lang="en-US" dirty="0" smtClean="0"/>
-              <a:t> Twister</a:t>
-            </a:r>
-            <a:endParaRPr lang="en-US" dirty="0"/>
-          </a:p>
-        </p:txBody>
-      </p:sp>
-      <p:sp>
-        <p:nvSpPr>
-          <p:cNvPr id="3" name="Content Placeholder 2"/>
-          <p:cNvSpPr>
-            <a:spLocks noGrp="1"/>
-          </p:cNvSpPr>
-          <p:nvPr>
-            <p:ph sz="quarter" idx="1"/>
-          </p:nvPr>
-        </p:nvSpPr>
-        <p:spPr/>
-        <p:txBody>
-          <a:bodyPr>
-            <a:normAutofit/>
-          </a:bodyPr>
-          <a:lstStyle/>
-          <a:p>
-            <a:r>
-              <a:rPr lang="en-US" dirty="0" smtClean="0"/>
-              <a:t>Results produced by a tempering function on the state:</a:t>
-            </a:r>
-            <a:br>
-              <a:rPr lang="en-US" dirty="0" smtClean="0"/>
-            </a:br>
-            <a:r>
-              <a:rPr lang="en-US" sz="2000" dirty="0" smtClean="0"/>
-              <a:t>	</a:t>
-            </a:r>
-            <a:r>
-              <a:rPr lang="es-ES" sz="2000" dirty="0" smtClean="0"/>
-              <a:t>y := x ⊕ (x &gt;&gt; u)</a:t>
-            </a:r>
-            <a:br>
-              <a:rPr lang="es-ES" sz="2000" dirty="0" smtClean="0"/>
-            </a:br>
-            <a:r>
-              <a:rPr lang="es-ES" sz="2000" dirty="0" smtClean="0"/>
-              <a:t>	y := y ⊕ ((y &lt;&lt; s) · b)</a:t>
-            </a:r>
-            <a:br>
-              <a:rPr lang="es-ES" sz="2000" dirty="0" smtClean="0"/>
-            </a:br>
-            <a:r>
-              <a:rPr lang="es-ES" sz="2000" dirty="0" smtClean="0"/>
-              <a:t>	y := y ⊕ ((y &lt;&lt; t) · c)</a:t>
-            </a:r>
-            <a:br>
-              <a:rPr lang="es-ES" sz="2000" dirty="0" smtClean="0"/>
-            </a:br>
-            <a:r>
-              <a:rPr lang="es-ES" sz="2000" dirty="0" smtClean="0"/>
-              <a:t>	y := y ⊕ (y &gt;&gt; l) </a:t>
-            </a:r>
-          </a:p>
-          <a:p>
-            <a:r>
-              <a:rPr lang="en-US" dirty="0" smtClean="0"/>
-              <a:t>This is done to ensure </a:t>
-            </a:r>
-            <a:r>
-              <a:rPr lang="en-US" dirty="0" err="1" smtClean="0"/>
-              <a:t>equidistributed</a:t>
-            </a:r>
-            <a:r>
-              <a:rPr lang="en-US" dirty="0" smtClean="0"/>
-              <a:t> outputs</a:t>
-            </a:r>
-          </a:p>
-          <a:p>
-            <a:r>
-              <a:rPr lang="en-US" dirty="0" smtClean="0"/>
-              <a:t>In practice, sequences are generated in batches and outputs are produced upon request using the tempering function</a:t>
-            </a:r>
-          </a:p>
-          <a:p>
-            <a:endParaRPr lang="pl-PL" dirty="0" smtClean="0"/>
-          </a:p>
-        </p:txBody>
-      </p:sp>
-      <p:sp>
-        <p:nvSpPr>
-          <p:cNvPr id="3074" name="Rectangle 2"/>
-          <p:cNvSpPr>
-            <a:spLocks noChangeArrowheads="1"/>
-          </p:cNvSpPr>
-          <p:nvPr/>
-        </p:nvSpPr>
-        <p:spPr bwMode="auto">
-          <a:xfrm>
-            <a:off x="0" y="0"/>
-            <a:ext cx="9144000" cy="457200"/>
-          </a:xfrm>
-          <a:prstGeom prst="rect">
-            <a:avLst/>
-          </a:prstGeom>
-          <a:noFill/>
-          <a:ln w="9525">
-            <a:noFill/>
-            <a:miter lim="800000"/>
-            <a:headEnd/>
-            <a:tailEnd/>
-          </a:ln>
-          <a:effectLst/>
-        </p:spPr>
-        <p:txBody>
-          <a:bodyPr vert="horz" wrap="none" lIns="91440" tIns="45720" rIns="91440" bIns="45720" numCol="1" anchor="ctr" anchorCtr="0" compatLnSpc="1">
-            <a:prstTxWarp prst="textNoShape">
-              <a:avLst/>
-            </a:prstTxWarp>
-            <a:spAutoFit/>
-          </a:bodyPr>
-          <a:lstStyle/>
-          <a:p>
-            <a:endParaRPr lang="en-US"/>
-          </a:p>
-        </p:txBody>
-      </p:sp>
-      <p:sp>
-        <p:nvSpPr>
-          <p:cNvPr id="3076" name="Rectangle 4"/>
-          <p:cNvSpPr>
-            <a:spLocks noChangeArrowheads="1"/>
-          </p:cNvSpPr>
-          <p:nvPr/>
-        </p:nvSpPr>
-        <p:spPr bwMode="auto">
-          <a:xfrm>
-            <a:off x="0" y="0"/>
-            <a:ext cx="9144000" cy="457200"/>
-          </a:xfrm>
-          <a:prstGeom prst="rect">
-            <a:avLst/>
-          </a:prstGeom>
-          <a:noFill/>
-          <a:ln w="9525">
-            <a:noFill/>
-            <a:miter lim="800000"/>
-            <a:headEnd/>
-            <a:tailEnd/>
-          </a:ln>
-          <a:effectLst/>
-        </p:spPr>
-        <p:txBody>
-          <a:bodyPr vert="horz" wrap="none" lIns="91440" tIns="45720" rIns="91440" bIns="45720" numCol="1" anchor="ctr" anchorCtr="0" compatLnSpc="1">
-            <a:prstTxWarp prst="textNoShape">
-              <a:avLst/>
-            </a:prstTxWarp>
-            <a:spAutoFit/>
-          </a:bodyPr>
-          <a:lstStyle/>
-          <a:p>
-            <a:endParaRPr lang="en-US"/>
-          </a:p>
-        </p:txBody>
-      </p:sp>
-      <p:sp>
-        <p:nvSpPr>
-          <p:cNvPr id="3078" name="Rectangle 6"/>
-          <p:cNvSpPr>
-            <a:spLocks noChangeArrowheads="1"/>
-          </p:cNvSpPr>
-          <p:nvPr/>
-        </p:nvSpPr>
-        <p:spPr bwMode="auto">
-          <a:xfrm>
-            <a:off x="0" y="0"/>
-            <a:ext cx="9144000" cy="457200"/>
-          </a:xfrm>
-          <a:prstGeom prst="rect">
-            <a:avLst/>
-          </a:prstGeom>
-          <a:noFill/>
-          <a:ln w="9525">
-            <a:noFill/>
-            <a:miter lim="800000"/>
-            <a:headEnd/>
-            <a:tailEnd/>
-          </a:ln>
-          <a:effectLst/>
-        </p:spPr>
-        <p:txBody>
-          <a:bodyPr vert="horz" wrap="none" lIns="91440" tIns="45720" rIns="91440" bIns="45720" numCol="1" anchor="ctr" anchorCtr="0" compatLnSpc="1">
-            <a:prstTxWarp prst="textNoShape">
-              <a:avLst/>
-            </a:prstTxWarp>
-            <a:spAutoFit/>
-          </a:bodyPr>
-          <a:lstStyle/>
-          <a:p>
-            <a:endParaRPr lang="en-US"/>
-          </a:p>
-        </p:txBody>
-      </p:sp>
-    </p:spTree>
-  </p:cSld>
-  <p:clrMapOvr>
-    <a:masterClrMapping/>
-  </p:clrMapOvr>
-</p:sld>
-</file>
-
 <file path=ppt/slides/slide12.xml><?xml version="1.0" encoding="utf-8"?>
 <p:sld xmlns:a="http://schemas.openxmlformats.org/drawingml/2006/main" xmlns:r="http://schemas.openxmlformats.org/officeDocument/2006/relationships" xmlns:p="http://schemas.openxmlformats.org/presentationml/2006/main">
   <p:cSld>
@@ -5000,7 +4920,45 @@
           <a:p>
             <a:r>
               <a:rPr lang="en-US" dirty="0" smtClean="0"/>
-              <a:t>Strengths: Very large period, high quality </a:t>
+              <a:t>Results produced by a tempering function on the state:</a:t>
+            </a:r>
+            <a:br>
+              <a:rPr lang="en-US" dirty="0" smtClean="0"/>
+            </a:br>
+            <a:r>
+              <a:rPr lang="en-US" sz="2000" dirty="0" smtClean="0"/>
+              <a:t>	</a:t>
+            </a:r>
+            <a:r>
+              <a:rPr lang="es-ES" sz="2000" dirty="0" smtClean="0"/>
+              <a:t>y := x ⊕ (x &gt;&gt; u)</a:t>
+            </a:r>
+            <a:br>
+              <a:rPr lang="es-ES" sz="2000" dirty="0" smtClean="0"/>
+            </a:br>
+            <a:r>
+              <a:rPr lang="es-ES" sz="2000" dirty="0" smtClean="0"/>
+              <a:t>	y := y ⊕ ((y &lt;&lt; s) · b)</a:t>
+            </a:r>
+            <a:br>
+              <a:rPr lang="es-ES" sz="2000" dirty="0" smtClean="0"/>
+            </a:br>
+            <a:r>
+              <a:rPr lang="es-ES" sz="2000" dirty="0" smtClean="0"/>
+              <a:t>	y := y ⊕ ((y &lt;&lt; t) · c)</a:t>
+            </a:r>
+            <a:br>
+              <a:rPr lang="es-ES" sz="2000" dirty="0" smtClean="0"/>
+            </a:br>
+            <a:r>
+              <a:rPr lang="es-ES" sz="2000" dirty="0" smtClean="0"/>
+              <a:t>	y := y ⊕ (y &gt;&gt; l) </a:t>
+            </a:r>
+          </a:p>
+          <a:p>
+            <a:r>
+              <a:rPr lang="en-US" dirty="0" smtClean="0"/>
+              <a:t>This is done to ensure </a:t>
             </a:r>
             <a:r>
               <a:rPr lang="en-US" dirty="0" err="1" smtClean="0"/>
@@ -5014,11 +4972,11 @@
           <a:p>
             <a:r>
               <a:rPr lang="en-US" dirty="0" smtClean="0"/>
-              <a:t>Weaknesses: Complex and slow, requires a great deal of memory to store state, difficult to seed</a:t>
-            </a:r>
-          </a:p>
-          <a:p>
-            <a:endParaRPr lang="es-ES" dirty="0" smtClean="0"/>
+              <a:t>In practice, sequences are generated in batches and outputs are produced upon request using the tempering function</a:t>
+            </a:r>
+          </a:p>
+          <a:p>
+            <a:endParaRPr lang="pl-PL" dirty="0" smtClean="0"/>
           </a:p>
         </p:txBody>
       </p:sp>
@@ -5177,8 +5135,12 @@
           <a:lstStyle/>
           <a:p>
             <a:r>
+              <a:rPr lang="en-US" dirty="0" err="1" smtClean="0"/>
+              <a:t>Mersenne</a:t>
+            </a:r>
+            <a:r>
               <a:rPr lang="en-US" dirty="0" smtClean="0"/>
-              <a:t>Results</a:t>
+              <a:t> Twister</a:t>
             </a:r>
             <a:endParaRPr lang="en-US" dirty="0"/>
           </a:p>
@@ -5196,10 +5158,146 @@
         </p:nvSpPr>
         <p:spPr/>
         <p:txBody>
-          <a:bodyPr/>
-          <a:lstStyle/>
-          <a:p>
-            <a:endParaRPr lang="en-US" dirty="0"/>
+          <a:bodyPr>
+            <a:normAutofit/>
+          </a:bodyPr>
+          <a:lstStyle/>
+          <a:p>
+            <a:r>
+              <a:rPr lang="en-US" dirty="0" smtClean="0"/>
+              <a:t>Strengths: Very large period, high quality </a:t>
+            </a:r>
+            <a:r>
+              <a:rPr lang="en-US" dirty="0" err="1" smtClean="0"/>
+              <a:t>equidistributed</a:t>
+            </a:r>
+            <a:r>
+              <a:rPr lang="en-US" dirty="0" smtClean="0"/>
+              <a:t> outputs</a:t>
+            </a:r>
+          </a:p>
+          <a:p>
+            <a:r>
+              <a:rPr lang="en-US" dirty="0" smtClean="0"/>
+              <a:t>Weaknesses: Complex and slow, requires a great deal of memory to store state, difficult to seed</a:t>
+            </a:r>
+          </a:p>
+          <a:p>
+            <a:endParaRPr lang="es-ES" dirty="0" smtClean="0"/>
+          </a:p>
+        </p:txBody>
+      </p:sp>
+      <p:sp>
+        <p:nvSpPr>
+          <p:cNvPr id="3074" name="Rectangle 2"/>
+          <p:cNvSpPr>
+            <a:spLocks noChangeArrowheads="1"/>
+          </p:cNvSpPr>
+          <p:nvPr/>
+        </p:nvSpPr>
+        <p:spPr bwMode="auto">
+          <a:xfrm>
+            <a:off x="0" y="0"/>
+            <a:ext cx="9144000" cy="457200"/>
+          </a:xfrm>
+          <a:prstGeom prst="rect">
+            <a:avLst/>
+          </a:prstGeom>
+          <a:noFill/>
+          <a:ln w="9525">
+            <a:noFill/>
+            <a:miter lim="800000"/>
+            <a:headEnd/>
+            <a:tailEnd/>
+          </a:ln>
+          <a:effectLst/>
+        </p:spPr>
+        <p:txBody>
+          <a:bodyPr vert="horz" wrap="none" lIns="91440" tIns="45720" rIns="91440" bIns="45720" numCol="1" anchor="ctr" anchorCtr="0" compatLnSpc="1">
+            <a:prstTxWarp prst="textNoShape">
+              <a:avLst/>
+            </a:prstTxWarp>
+            <a:spAutoFit/>
+          </a:bodyPr>
+          <a:lstStyle/>
+          <a:p>
+            <a:endParaRPr lang="en-US"/>
+          </a:p>
+        </p:txBody>
+      </p:sp>
+      <p:sp>
+        <p:nvSpPr>
+          <p:cNvPr id="3076" name="Rectangle 4"/>
+          <p:cNvSpPr>
+            <a:spLocks noChangeArrowheads="1"/>
+          </p:cNvSpPr>
+          <p:nvPr/>
+        </p:nvSpPr>
+        <p:spPr bwMode="auto">
+          <a:xfrm>
+            <a:off x="0" y="0"/>
+            <a:ext cx="9144000" cy="457200"/>
+          </a:xfrm>
+          <a:prstGeom prst="rect">
+            <a:avLst/>
+          </a:prstGeom>
+          <a:noFill/>
+          <a:ln w="9525">
+            <a:noFill/>
+            <a:miter lim="800000"/>
+            <a:headEnd/>
+            <a:tailEnd/>
+          </a:ln>
+          <a:effectLst/>
+        </p:spPr>
+        <p:txBody>
+          <a:bodyPr vert="horz" wrap="none" lIns="91440" tIns="45720" rIns="91440" bIns="45720" numCol="1" anchor="ctr" anchorCtr="0" compatLnSpc="1">
+            <a:prstTxWarp prst="textNoShape">
+              <a:avLst/>
+            </a:prstTxWarp>
+            <a:spAutoFit/>
+          </a:bodyPr>
+          <a:lstStyle/>
+          <a:p>
+            <a:endParaRPr lang="en-US"/>
+          </a:p>
+        </p:txBody>
+      </p:sp>
+      <p:sp>
+        <p:nvSpPr>
+          <p:cNvPr id="3078" name="Rectangle 6"/>
+          <p:cNvSpPr>
+            <a:spLocks noChangeArrowheads="1"/>
+          </p:cNvSpPr>
+          <p:nvPr/>
+        </p:nvSpPr>
+        <p:spPr bwMode="auto">
+          <a:xfrm>
+            <a:off x="0" y="0"/>
+            <a:ext cx="9144000" cy="457200"/>
+          </a:xfrm>
+          <a:prstGeom prst="rect">
+            <a:avLst/>
+          </a:prstGeom>
+          <a:noFill/>
+          <a:ln w="9525">
+            <a:noFill/>
+            <a:miter lim="800000"/>
+            <a:headEnd/>
+            <a:tailEnd/>
+          </a:ln>
+          <a:effectLst/>
+        </p:spPr>
+        <p:txBody>
+          <a:bodyPr vert="horz" wrap="none" lIns="91440" tIns="45720" rIns="91440" bIns="45720" numCol="1" anchor="ctr" anchorCtr="0" compatLnSpc="1">
+            <a:prstTxWarp prst="textNoShape">
+              <a:avLst/>
+            </a:prstTxWarp>
+            <a:spAutoFit/>
+          </a:bodyPr>
+          <a:lstStyle/>
+          <a:p>
+            <a:endParaRPr lang="en-US"/>
           </a:p>
         </p:txBody>
       </p:sp>
@@ -5245,6 +5343,73 @@
           <a:p>
             <a:r>
               <a:rPr lang="en-US" dirty="0" smtClean="0"/>
+              <a:t>Results</a:t>
+            </a:r>
+            <a:endParaRPr lang="en-US" dirty="0"/>
+          </a:p>
+        </p:txBody>
+      </p:sp>
+      <p:sp>
+        <p:nvSpPr>
+          <p:cNvPr id="3" name="Content Placeholder 2"/>
+          <p:cNvSpPr>
+            <a:spLocks noGrp="1"/>
+          </p:cNvSpPr>
+          <p:nvPr>
+            <p:ph sz="quarter" idx="1"/>
+          </p:nvPr>
+        </p:nvSpPr>
+        <p:spPr/>
+        <p:txBody>
+          <a:bodyPr/>
+          <a:lstStyle/>
+          <a:p>
+            <a:endParaRPr lang="en-US" dirty="0"/>
+          </a:p>
+        </p:txBody>
+      </p:sp>
+    </p:spTree>
+  </p:cSld>
+  <p:clrMapOvr>
+    <a:masterClrMapping/>
+  </p:clrMapOvr>
+</p:sld>
+</file>
+
+<file path=ppt/slides/slide15.xml><?xml version="1.0" encoding="utf-8"?>
+<p:sld xmlns:a="http://schemas.openxmlformats.org/drawingml/2006/main" xmlns:r="http://schemas.openxmlformats.org/officeDocument/2006/relationships" xmlns:p="http://schemas.openxmlformats.org/presentationml/2006/main">
+  <p:cSld>
+    <p:spTree>
+      <p:nvGrpSpPr>
+        <p:cNvPr id="1" name=""/>
+        <p:cNvGrpSpPr/>
+        <p:nvPr/>
+      </p:nvGrpSpPr>
+      <p:grpSpPr>
+        <a:xfrm>
+          <a:off x="0" y="0"/>
+          <a:ext cx="0" cy="0"/>
+          <a:chOff x="0" y="0"/>
+          <a:chExt cx="0" cy="0"/>
+        </a:xfrm>
+      </p:grpSpPr>
+      <p:sp>
+        <p:nvSpPr>
+          <p:cNvPr id="2" name="Title 1"/>
+          <p:cNvSpPr>
+            <a:spLocks noGrp="1"/>
+          </p:cNvSpPr>
+          <p:nvPr>
+            <p:ph type="title"/>
+          </p:nvPr>
+        </p:nvSpPr>
+        <p:spPr/>
+        <p:txBody>
+          <a:bodyPr/>
+          <a:lstStyle/>
+          <a:p>
+            <a:r>
+              <a:rPr lang="en-US" dirty="0" smtClean="0"/>
               <a:t>Conclusion</a:t>
             </a:r>
             <a:endParaRPr lang="en-US" dirty="0"/>
@@ -5518,8 +5683,12 @@
           <a:lstStyle/>
           <a:p>
             <a:r>
+              <a:rPr lang="en-US" dirty="0" err="1" smtClean="0"/>
+              <a:t>Kolmogorov</a:t>
+            </a:r>
+            <a:r>
               <a:rPr lang="en-US" dirty="0" smtClean="0"/>
-              <a:t>Linear Congruent</a:t>
+              <a:t>-Smirnov Test</a:t>
             </a:r>
             <a:endParaRPr lang="en-US" dirty="0"/>
           </a:p>
@@ -5542,57 +5711,54 @@
           <a:p>
             <a:r>
               <a:rPr lang="en-US" dirty="0" smtClean="0"/>
-              <a:t>Sequence defined by the formula for a line:</a:t>
+              <a:t>Provides a quantifiable method to determine the quality of a distribution fit</a:t>
+            </a:r>
+          </a:p>
+          <a:p>
+            <a:r>
+              <a:rPr lang="en-US" dirty="0" smtClean="0"/>
+              <a:t>Test statistic D is the maximum between the empirical distribution function and the fitted distribution</a:t>
             </a:r>
             <a:br>
               <a:rPr lang="en-US" dirty="0" smtClean="0"/>
             </a:br>
-            <a:r>
-              <a:rPr lang="en-US" dirty="0" smtClean="0"/>
-              <a:t>	</a:t>
-            </a:r>
-            <a:r>
-              <a:rPr lang="pt-BR" dirty="0" smtClean="0"/>
-              <a:t>X</a:t>
-            </a:r>
-            <a:r>
-              <a:rPr lang="pt-BR" baseline="-25000" dirty="0" smtClean="0"/>
-              <a:t>n+1</a:t>
-            </a:r>
-            <a:r>
-              <a:rPr lang="pt-BR" dirty="0" smtClean="0"/>
-              <a:t> = (aX</a:t>
-            </a:r>
-            <a:r>
-              <a:rPr lang="pt-BR" baseline="-25000" dirty="0" smtClean="0"/>
-              <a:t>n</a:t>
-            </a:r>
-            <a:r>
-              <a:rPr lang="pt-BR" dirty="0" smtClean="0"/>
-              <a:t> + c) mod m</a:t>
-            </a:r>
-          </a:p>
-          <a:p>
-            <a:r>
-              <a:rPr lang="en-US" dirty="0" smtClean="0"/>
-              <a:t>Popular parameter sets include MINSTD and RANDU</a:t>
-            </a:r>
+            <a:endParaRPr lang="en-US" dirty="0" smtClean="0"/>
+          </a:p>
+          <a:p>
+            <a:pPr marL="777240" lvl="1" indent="-457200">
+              <a:buFont typeface="+mj-lt"/>
+              <a:buAutoNum type="arabicPeriod"/>
+            </a:pPr>
             <a:endParaRPr lang="en-US" dirty="0"/>
           </a:p>
-          <a:p>
-            <a:r>
-              <a:rPr lang="en-US" dirty="0" smtClean="0"/>
-              <a:t>Strengths: Lightweight, stores little state, fast and easy to compute</a:t>
-            </a:r>
-          </a:p>
-          <a:p>
-            <a:r>
-              <a:rPr lang="en-US" dirty="0" smtClean="0"/>
-              <a:t>Weaknesses: Short period, outputs are planar and of poor quality</a:t>
-            </a:r>
-          </a:p>
-        </p:txBody>
-      </p:sp>
+        </p:txBody>
+      </p:sp>
+      <p:pic>
+        <p:nvPicPr>
+          <p:cNvPr id="1026" name="Picture 2" descr="F_n(x)={1 \over n}\sum_{i=1}^n I_{X_i\leq x}"/>
+          <p:cNvPicPr>
+            <a:picLocks noChangeAspect="1" noChangeArrowheads="1"/>
+          </p:cNvPicPr>
+          <p:nvPr/>
+        </p:nvPicPr>
+        <p:blipFill>
+          <a:blip r:embed="rId2" cstate="print"/>
+          <a:srcRect/>
+          <a:stretch>
+            <a:fillRect/>
+          </a:stretch>
+        </p:blipFill>
+        <p:spPr bwMode="auto">
+          <a:xfrm>
+            <a:off x="3505200" y="3352800"/>
+            <a:ext cx="1833563" cy="533400"/>
+          </a:xfrm>
+          <a:prstGeom prst="rect">
+            <a:avLst/>
+          </a:prstGeom>
+          <a:noFill/>
+        </p:spPr>
+      </p:pic>
     </p:spTree>
   </p:cSld>
   <p:clrMapOvr>
@@ -5602,6 +5768,122 @@
 </file>
 
 <file path=ppt/slides/slide5.xml><?xml version="1.0" encoding="utf-8"?>
+<p:sld xmlns:a="http://schemas.openxmlformats.org/drawingml/2006/main" xmlns:r="http://schemas.openxmlformats.org/officeDocument/2006/relationships" xmlns:p="http://schemas.openxmlformats.org/presentationml/2006/main">
+  <p:cSld>
+    <p:spTree>
+      <p:nvGrpSpPr>
+        <p:cNvPr id="1" name=""/>
+        <p:cNvGrpSpPr/>
+        <p:nvPr/>
+      </p:nvGrpSpPr>
+      <p:grpSpPr>
+        <a:xfrm>
+          <a:off x="0" y="0"/>
+          <a:ext cx="0" cy="0"/>
+          <a:chOff x="0" y="0"/>
+          <a:chExt cx="0" cy="0"/>
+        </a:xfrm>
+      </p:grpSpPr>
+      <p:sp>
+        <p:nvSpPr>
+          <p:cNvPr id="2" name="Title 1"/>
+          <p:cNvSpPr>
+            <a:spLocks noGrp="1"/>
+          </p:cNvSpPr>
+          <p:nvPr>
+            <p:ph type="title"/>
+          </p:nvPr>
+        </p:nvSpPr>
+        <p:spPr/>
+        <p:txBody>
+          <a:bodyPr/>
+          <a:lstStyle/>
+          <a:p>
+            <a:r>
+              <a:rPr lang="en-US" dirty="0" smtClean="0"/>
+              <a:t>Linear Congruent</a:t>
+            </a:r>
+            <a:endParaRPr lang="en-US" dirty="0"/>
+          </a:p>
+        </p:txBody>
+      </p:sp>
+      <p:sp>
+        <p:nvSpPr>
+          <p:cNvPr id="3" name="Content Placeholder 2"/>
+          <p:cNvSpPr>
+            <a:spLocks noGrp="1"/>
+          </p:cNvSpPr>
+          <p:nvPr>
+            <p:ph sz="quarter" idx="1"/>
+          </p:nvPr>
+        </p:nvSpPr>
+        <p:spPr/>
+        <p:txBody>
+          <a:bodyPr/>
+          <a:lstStyle/>
+          <a:p>
+            <a:r>
+              <a:rPr lang="en-US" dirty="0" smtClean="0"/>
+              <a:t>Sequence defined by the formula for a line:</a:t>
+            </a:r>
+            <a:br>
+              <a:rPr lang="en-US" dirty="0" smtClean="0"/>
+            </a:br>
+            <a:r>
+              <a:rPr lang="en-US" dirty="0" smtClean="0"/>
+              <a:t>	</a:t>
+            </a:r>
+            <a:r>
+              <a:rPr lang="pt-BR" dirty="0" smtClean="0"/>
+              <a:t>X</a:t>
+            </a:r>
+            <a:r>
+              <a:rPr lang="pt-BR" baseline="-25000" dirty="0" smtClean="0"/>
+              <a:t>n+1</a:t>
+            </a:r>
+            <a:r>
+              <a:rPr lang="pt-BR" dirty="0" smtClean="0"/>
+              <a:t> = (aX</a:t>
+            </a:r>
+            <a:r>
+              <a:rPr lang="pt-BR" baseline="-25000" dirty="0" smtClean="0"/>
+              <a:t>n</a:t>
+            </a:r>
+            <a:r>
+              <a:rPr lang="pt-BR" dirty="0" smtClean="0"/>
+              <a:t> + c) mod m</a:t>
+            </a:r>
+          </a:p>
+          <a:p>
+            <a:r>
+              <a:rPr lang="en-US" dirty="0" smtClean="0"/>
+              <a:t>Popular parameter sets include MINSTD and RANDU</a:t>
+            </a:r>
+            <a:endParaRPr lang="en-US" dirty="0"/>
+          </a:p>
+          <a:p>
+            <a:r>
+              <a:rPr lang="en-US" dirty="0" smtClean="0"/>
+              <a:t>Strengths: Lightweight, stores little state, fast and easy to compute</a:t>
+            </a:r>
+          </a:p>
+          <a:p>
+            <a:r>
+              <a:rPr lang="en-US" dirty="0" smtClean="0"/>
+              <a:t>Weaknesses: Short period, outputs are planar and of poor quality</a:t>
+            </a:r>
+          </a:p>
+        </p:txBody>
+      </p:sp>
+    </p:spTree>
+  </p:cSld>
+  <p:clrMapOvr>
+    <a:masterClrMapping/>
+  </p:clrMapOvr>
+</p:sld>
+</file>
+
+<file path=ppt/slides/slide6.xml><?xml version="1.0" encoding="utf-8"?>
 <p:sld xmlns:a="http://schemas.openxmlformats.org/drawingml/2006/main" xmlns:r="http://schemas.openxmlformats.org/officeDocument/2006/relationships" xmlns:p="http://schemas.openxmlformats.org/presentationml/2006/main">
   <p:cSld>
     <p:spTree>
@@ -5709,97 +5991,6 @@
 </p:sld>
 </file>
 
-<file path=ppt/slides/slide6.xml><?xml version="1.0" encoding="utf-8"?>
-<p:sld xmlns:a="http://schemas.openxmlformats.org/drawingml/2006/main" xmlns:r="http://schemas.openxmlformats.org/officeDocument/2006/relationships" xmlns:p="http://schemas.openxmlformats.org/presentationml/2006/main">
-  <p:cSld>
-    <p:spTree>
-      <p:nvGrpSpPr>
-        <p:cNvPr id="1" name=""/>
-        <p:cNvGrpSpPr/>
-        <p:nvPr/>
-      </p:nvGrpSpPr>
-      <p:grpSpPr>
-        <a:xfrm>
-          <a:off x="0" y="0"/>
-          <a:ext cx="0" cy="0"/>
-          <a:chOff x="0" y="0"/>
-          <a:chExt cx="0" cy="0"/>
-        </a:xfrm>
-      </p:grpSpPr>
-      <p:sp>
-        <p:nvSpPr>
-          <p:cNvPr id="2" name="Title 1"/>
-          <p:cNvSpPr>
-            <a:spLocks noGrp="1"/>
-          </p:cNvSpPr>
-          <p:nvPr>
-            <p:ph type="title"/>
-          </p:nvPr>
-        </p:nvSpPr>
-        <p:spPr/>
-        <p:txBody>
-          <a:bodyPr/>
-          <a:lstStyle/>
-          <a:p>
-            <a:r>
-              <a:rPr lang="en-US" dirty="0" err="1" smtClean="0"/>
-              <a:t>Xorshift</a:t>
-            </a:r>
-            <a:endParaRPr lang="en-US" dirty="0"/>
-          </a:p>
-        </p:txBody>
-      </p:sp>
-      <p:sp>
-        <p:nvSpPr>
-          <p:cNvPr id="3" name="Content Placeholder 2"/>
-          <p:cNvSpPr>
-            <a:spLocks noGrp="1"/>
-          </p:cNvSpPr>
-          <p:nvPr>
-            <p:ph sz="quarter" idx="1"/>
-          </p:nvPr>
-        </p:nvSpPr>
-        <p:spPr/>
-        <p:txBody>
-          <a:bodyPr/>
-          <a:lstStyle/>
-          <a:p>
-            <a:r>
-              <a:rPr lang="en-US" dirty="0" smtClean="0"/>
-              <a:t>In general, sequence produced by shifting and </a:t>
-            </a:r>
-            <a:r>
-              <a:rPr lang="en-US" dirty="0" err="1" smtClean="0"/>
-              <a:t>XORing</a:t>
-            </a:r>
-            <a:r>
-              <a:rPr lang="en-US" dirty="0" smtClean="0"/>
-              <a:t> together past values</a:t>
-            </a:r>
-          </a:p>
-          <a:p>
-            <a:r>
-              <a:rPr lang="en-US" dirty="0" smtClean="0"/>
-              <a:t>Strengths: Stores relatively little state, fast performance, good period to performance ratio, generally high quality outputs</a:t>
-            </a:r>
-          </a:p>
-          <a:p>
-            <a:r>
-              <a:rPr lang="en-US" dirty="0" smtClean="0"/>
-              <a:t>Weaknesses: Overall short period length</a:t>
-            </a:r>
-            <a:endParaRPr lang="en-US" dirty="0"/>
-          </a:p>
-        </p:txBody>
-      </p:sp>
-    </p:spTree>
-  </p:cSld>
-  <p:clrMapOvr>
-    <a:masterClrMapping/>
-  </p:clrMapOvr>
-</p:sld>
-</file>
-
 <file path=ppt/slides/slide7.xml><?xml version="1.0" encoding="utf-8"?>
 <p:sld xmlns:a="http://schemas.openxmlformats.org/drawingml/2006/main" xmlns:r="http://schemas.openxmlformats.org/officeDocument/2006/relationships" xmlns:p="http://schemas.openxmlformats.org/presentationml/2006/main">
   <p:cSld>
@@ -5833,81 +6024,53 @@
           <a:lstStyle/>
           <a:p>
             <a:r>
+              <a:rPr lang="en-US" dirty="0" err="1" smtClean="0"/>
+              <a:t>Xorshift</a:t>
+            </a:r>
+            <a:endParaRPr lang="en-US" dirty="0"/>
+          </a:p>
+        </p:txBody>
+      </p:sp>
+      <p:sp>
+        <p:nvSpPr>
+          <p:cNvPr id="3" name="Content Placeholder 2"/>
+          <p:cNvSpPr>
+            <a:spLocks noGrp="1"/>
+          </p:cNvSpPr>
+          <p:nvPr>
+            <p:ph sz="quarter" idx="1"/>
+          </p:nvPr>
+        </p:nvSpPr>
+        <p:spPr/>
+        <p:txBody>
+          <a:bodyPr/>
+          <a:lstStyle/>
+          <a:p>
+            <a:r>
               <a:rPr lang="en-US" dirty="0" smtClean="0"/>
-              <a:t>Lagged Fibonacci</a:t>
+              <a:t>In general, sequence produced by shifting and </a:t>
+            </a:r>
+            <a:r>
+              <a:rPr lang="en-US" dirty="0" err="1" smtClean="0"/>
+              <a:t>XORing</a:t>
+            </a:r>
+            <a:r>
+              <a:rPr lang="en-US" dirty="0" smtClean="0"/>
+              <a:t> together past values</a:t>
+            </a:r>
+          </a:p>
+          <a:p>
+            <a:r>
+              <a:rPr lang="en-US" dirty="0" smtClean="0"/>
+              <a:t>Strengths: Stores relatively little state, fast performance, good period to performance ratio, generally high quality outputs</a:t>
+            </a:r>
+          </a:p>
+          <a:p>
+            <a:r>
+              <a:rPr lang="en-US" dirty="0" smtClean="0"/>
+              <a:t>Weaknesses: Overall short period length</a:t>
             </a:r>
             <a:endParaRPr lang="en-US" dirty="0"/>
-          </a:p>
-        </p:txBody>
-      </p:sp>
-      <p:sp>
-        <p:nvSpPr>
-          <p:cNvPr id="3" name="Content Placeholder 2"/>
-          <p:cNvSpPr>
-            <a:spLocks noGrp="1"/>
-          </p:cNvSpPr>
-          <p:nvPr>
-            <p:ph sz="quarter" idx="1"/>
-          </p:nvPr>
-        </p:nvSpPr>
-        <p:spPr/>
-        <p:txBody>
-          <a:bodyPr/>
-          <a:lstStyle/>
-          <a:p>
-            <a:r>
-              <a:rPr lang="pt-BR" dirty="0" smtClean="0"/>
-              <a:t>Has the general form:</a:t>
-            </a:r>
-            <a:br>
-              <a:rPr lang="pt-BR" dirty="0" smtClean="0"/>
-            </a:br>
-            <a:r>
-              <a:rPr lang="pt-BR" dirty="0" smtClean="0"/>
-              <a:t>	X</a:t>
-            </a:r>
-            <a:r>
-              <a:rPr lang="pt-BR" baseline="-25000" dirty="0" smtClean="0"/>
-              <a:t>n</a:t>
-            </a:r>
-            <a:r>
-              <a:rPr lang="pt-BR" dirty="0" smtClean="0"/>
-              <a:t> = (X</a:t>
-            </a:r>
-            <a:r>
-              <a:rPr lang="pt-BR" baseline="-25000" dirty="0" smtClean="0"/>
-              <a:t>n−r</a:t>
-            </a:r>
-            <a:r>
-              <a:rPr lang="pt-BR" dirty="0" smtClean="0"/>
-              <a:t> * X</a:t>
-            </a:r>
-            <a:r>
-              <a:rPr lang="pt-BR" baseline="-25000" dirty="0" smtClean="0"/>
-              <a:t>n−s</a:t>
-            </a:r>
-            <a:r>
-              <a:rPr lang="pt-BR" dirty="0" smtClean="0"/>
-              <a:t>) mod m, 0 &lt; s &lt; r</a:t>
-            </a:r>
-          </a:p>
-          <a:p>
-            <a:r>
-              <a:rPr lang="pt-BR" dirty="0" smtClean="0"/>
-              <a:t>r and s are lag parameters and determine the size of the state space and * can be any operation</a:t>
-            </a:r>
-          </a:p>
-          <a:p>
-            <a:r>
-              <a:rPr lang="en-US" dirty="0" smtClean="0"/>
-              <a:t>Strengths: Generally fast performance, flexible</a:t>
-            </a:r>
-          </a:p>
-          <a:p>
-            <a:r>
-              <a:rPr lang="en-US" dirty="0" smtClean="0"/>
-              <a:t>Weaknesses: Stores a sizeable amount of state, output quality highly dependent on seeding method and parameter selection</a:t>
-            </a:r>
           </a:p>
         </p:txBody>
       </p:sp>
@@ -5976,7 +6139,7 @@
           <a:p>
             <a:r>
               <a:rPr lang="pt-BR" dirty="0" smtClean="0"/>
-              <a:t>Subtract with Carry variant has form:</a:t>
+              <a:t>Has the general form:</a:t>
             </a:r>
             <a:br>
               <a:rPr lang="pt-BR" dirty="0" smtClean="0"/>
@@ -5999,19 +6162,11 @@
             </a:r>
             <a:r>
               <a:rPr lang="pt-BR" dirty="0" smtClean="0"/>
-              <a:t> - X</a:t>
+              <a:t> * X</a:t>
             </a:r>
             <a:r>
               <a:rPr lang="pt-BR" baseline="-25000" dirty="0" smtClean="0"/>
-              <a:t>n−s </a:t>
-            </a:r>
-            <a:r>
-              <a:rPr lang="pt-BR" dirty="0" smtClean="0"/>
-              <a:t>– c</a:t>
-            </a:r>
-            <a:r>
-              <a:rPr lang="pt-BR" baseline="-25000" dirty="0" smtClean="0"/>
-              <a:t>n-1</a:t>
+              <a:t>n−s</a:t>
             </a:r>
             <a:r>
               <a:rPr lang="pt-BR" dirty="0" smtClean="0"/>
@@ -6020,56 +6175,20 @@
           </a:p>
           <a:p>
             <a:r>
-              <a:rPr lang="en-US" dirty="0" err="1" smtClean="0"/>
-              <a:t>c</a:t>
-            </a:r>
-            <a:r>
-              <a:rPr lang="en-US" baseline="-25000" dirty="0" err="1" smtClean="0"/>
-              <a:t>n</a:t>
-            </a:r>
+              <a:rPr lang="pt-BR" dirty="0" smtClean="0"/>
+              <a:t>r and s are lag parameters and determine the size of the state space and * can be any operation</a:t>
+            </a:r>
+          </a:p>
+          <a:p>
             <a:r>
               <a:rPr lang="en-US" dirty="0" smtClean="0"/>
-              <a:t> = 1 if </a:t>
-            </a:r>
-            <a:r>
-              <a:rPr lang="pt-BR" dirty="0" smtClean="0"/>
-              <a:t>X</a:t>
-            </a:r>
-            <a:r>
-              <a:rPr lang="pt-BR" baseline="-25000" dirty="0" smtClean="0"/>
-              <a:t>n−r</a:t>
-            </a:r>
-            <a:r>
-              <a:rPr lang="pt-BR" dirty="0" smtClean="0"/>
-              <a:t> - X</a:t>
-            </a:r>
-            <a:r>
-              <a:rPr lang="pt-BR" baseline="-25000" dirty="0" smtClean="0"/>
-              <a:t>n−s </a:t>
-            </a:r>
-            <a:r>
-              <a:rPr lang="pt-BR" dirty="0" smtClean="0"/>
-              <a:t>– c</a:t>
-            </a:r>
-            <a:r>
-              <a:rPr lang="pt-BR" baseline="-25000" dirty="0" smtClean="0"/>
-              <a:t>n-1  </a:t>
-            </a:r>
+              <a:t>Strengths: Generally fast performance, flexible</a:t>
+            </a:r>
+          </a:p>
+          <a:p>
             <a:r>
               <a:rPr lang="en-US" dirty="0" smtClean="0"/>
-              <a:t>≥ 0, or 0 otherwise</a:t>
-            </a:r>
-          </a:p>
-          <a:p>
-            <a:r>
-              <a:rPr lang="en-US" dirty="0" smtClean="0"/>
-              <a:t>Additional state information allows for a greater period than conventional Lagged Fibonacci generators</a:t>
-            </a:r>
-          </a:p>
-          <a:p>
-            <a:r>
-              <a:rPr lang="en-US" dirty="0" smtClean="0"/>
-              <a:t>RANLUX variant further improves the quality of the output by discarding a number of values at regular periods, at the cost of performance</a:t>
+              <a:t>Weaknesses: Stores a sizeable amount of state, output quality highly dependent on seeding method and parameter selection</a:t>
             </a:r>
           </a:p>
         </p:txBody>
@@ -6116,7 +6235,7 @@
           <a:p>
             <a:r>
               <a:rPr lang="en-US" dirty="0" smtClean="0"/>
-              <a:t>Multiply with Carry</a:t>
+              <a:t>Lagged Fibonacci</a:t>
             </a:r>
             <a:endParaRPr lang="en-US" dirty="0"/>
           </a:p>
@@ -6134,14 +6253,12 @@
         </p:nvSpPr>
         <p:spPr/>
         <p:txBody>
-          <a:bodyPr>
-            <a:normAutofit/>
-          </a:bodyPr>
+          <a:bodyPr/>
           <a:lstStyle/>
           <a:p>
             <a:r>
               <a:rPr lang="pt-BR" dirty="0" smtClean="0"/>
-              <a:t>Has the general form:</a:t>
+              <a:t>Subtract with Carry variant has form:</a:t>
             </a:r>
             <a:br>
               <a:rPr lang="pt-BR" dirty="0" smtClean="0"/>
@@ -6152,11 +6269,11 @@
             </a:r>
             <a:r>
               <a:rPr lang="pt-BR" baseline="-25000" dirty="0" smtClean="0"/>
-              <a:t>n+1</a:t>
+              <a:t>n</a:t>
             </a:r>
             <a:r>
               <a:rPr lang="pt-BR" dirty="0" smtClean="0"/>
-              <a:t> = (aX</a:t>
+              <a:t> = (X</a:t>
             </a:r>
             <a:r>
               <a:rPr lang="pt-BR" baseline="-25000" dirty="0" smtClean="0"/>
@@ -6164,36 +6281,41 @@
             </a:r>
             <a:r>
               <a:rPr lang="pt-BR" dirty="0" smtClean="0"/>
-              <a:t> + c</a:t>
+              <a:t> - X</a:t>
             </a:r>
             <a:r>
               <a:rPr lang="pt-BR" baseline="-25000" dirty="0" smtClean="0"/>
+              <a:t>n−s </a:t>
+            </a:r>
+            <a:r>
+              <a:rPr lang="pt-BR" dirty="0" smtClean="0"/>
+              <a:t>– c</a:t>
+            </a:r>
+            <a:r>
+              <a:rPr lang="pt-BR" baseline="-25000" dirty="0" smtClean="0"/>
+              <a:t>n-1</a:t>
+            </a:r>
+            <a:r>
+              <a:rPr lang="pt-BR" dirty="0" smtClean="0"/>
+              <a:t>) mod m, 0 &lt; s &lt; r</a:t>
+            </a:r>
+          </a:p>
+          <a:p>
+            <a:r>
+              <a:rPr lang="en-US" dirty="0" err="1" smtClean="0"/>
+              <a:t>c</a:t>
+            </a:r>
+            <a:r>
+              <a:rPr lang="en-US" baseline="-25000" dirty="0" err="1" smtClean="0"/>
               <a:t>n</a:t>
             </a:r>
             <a:r>
+              <a:rPr lang="en-US" dirty="0" smtClean="0"/>
+              <a:t> = 1 if </a:t>
+            </a:r>
+            <a:r>
               <a:rPr lang="pt-BR" dirty="0" smtClean="0"/>
-              <a:t>) mod m</a:t>
-            </a:r>
-          </a:p>
-          <a:p>
-            <a:r>
-              <a:rPr lang="pt-BR" dirty="0" smtClean="0"/>
-              <a:t>In practice, Complementary Multiply with Carry is used:</a:t>
-            </a:r>
-            <a:br>
-              <a:rPr lang="pt-BR" dirty="0" smtClean="0"/>
-            </a:br>
-            <a:r>
-              <a:rPr lang="pt-BR" dirty="0" smtClean="0"/>
-              <a:t>	X</a:t>
-            </a:r>
-            <a:r>
-              <a:rPr lang="pt-BR" baseline="-25000" dirty="0" smtClean="0"/>
-              <a:t>n+1</a:t>
-            </a:r>
-            <a:r>
-              <a:rPr lang="pt-BR" dirty="0" smtClean="0"/>
-              <a:t> = (b - 1) - (aX</a:t>
+              <a:t>X</a:t>
             </a:r>
             <a:r>
               <a:rPr lang="pt-BR" baseline="-25000" dirty="0" smtClean="0"/>
@@ -6201,39 +6323,35 @@
             </a:r>
             <a:r>
               <a:rPr lang="pt-BR" dirty="0" smtClean="0"/>
-              <a:t> + c</a:t>
+              <a:t> - X</a:t>
             </a:r>
             <a:r>
               <a:rPr lang="pt-BR" baseline="-25000" dirty="0" smtClean="0"/>
-              <a:t>n</a:t>
+              <a:t>n−s </a:t>
             </a:r>
             <a:r>
               <a:rPr lang="pt-BR" dirty="0" smtClean="0"/>
-              <a:t>) mod m</a:t>
-            </a:r>
-          </a:p>
-          <a:p>
-            <a:r>
-              <a:rPr lang="pt-BR" dirty="0" smtClean="0"/>
-              <a:t>Period heavily dependent on parameter selection</a:t>
-            </a:r>
-          </a:p>
-          <a:p>
-            <a:r>
-              <a:rPr lang="pt-BR" dirty="0" smtClean="0"/>
-              <a:t>Proofs regarding periods are easier on the complementary variant while not sacrificing other benefits of the generator</a:t>
-            </a:r>
-          </a:p>
-          <a:p>
+              <a:t>– c</a:t>
+            </a:r>
+            <a:r>
+              <a:rPr lang="pt-BR" baseline="-25000" dirty="0" smtClean="0"/>
+              <a:t>n-1  </a:t>
+            </a:r>
             <a:r>
               <a:rPr lang="en-US" dirty="0" smtClean="0"/>
-              <a:t>Strengths: Very long period, relatively fast, high quality outputs</a:t>
+              <a:t>≥ 0, or 0 otherwise</a:t>
             </a:r>
           </a:p>
           <a:p>
             <a:r>
               <a:rPr lang="en-US" dirty="0" smtClean="0"/>
-              <a:t>Weaknesses: Stores a fair amount of state, difficult to seed</a:t>
+              <a:t>Additional state information allows for a greater period than conventional Lagged Fibonacci generators</a:t>
+            </a:r>
+          </a:p>
+          <a:p>
+            <a:r>
+              <a:rPr lang="en-US" dirty="0" smtClean="0"/>
+              <a:t>RANLUX variant further improves the quality of the output by discarding a number of values at regular periods, at the cost of performance</a:t>
             </a:r>
           </a:p>
         </p:txBody>

</xml_diff>